<commit_message>
UPDATE material funciones y procedimientos
</commit_message>
<xml_diff>
--- a/material/Tecnicas/ClasesTutoriales/1.Presentación-pseudocodigo-lenguajes compilados- c.pptx
+++ b/material/Tecnicas/ClasesTutoriales/1.Presentación-pseudocodigo-lenguajes compilados- c.pptx
@@ -5,7 +5,7 @@
     <p:sldMasterId id="2147483648" r:id="rId1"/>
   </p:sldMasterIdLst>
   <p:notesMasterIdLst>
-    <p:notesMasterId r:id="rId53"/>
+    <p:notesMasterId r:id="rId52"/>
   </p:notesMasterIdLst>
   <p:sldIdLst>
     <p:sldId id="365" r:id="rId2"/>
@@ -18,47 +18,46 @@
     <p:sldId id="375" r:id="rId9"/>
     <p:sldId id="376" r:id="rId10"/>
     <p:sldId id="381" r:id="rId11"/>
-    <p:sldId id="382" r:id="rId12"/>
-    <p:sldId id="385" r:id="rId13"/>
-    <p:sldId id="386" r:id="rId14"/>
-    <p:sldId id="388" r:id="rId15"/>
-    <p:sldId id="389" r:id="rId16"/>
-    <p:sldId id="390" r:id="rId17"/>
-    <p:sldId id="391" r:id="rId18"/>
-    <p:sldId id="392" r:id="rId19"/>
-    <p:sldId id="393" r:id="rId20"/>
-    <p:sldId id="394" r:id="rId21"/>
-    <p:sldId id="395" r:id="rId22"/>
-    <p:sldId id="396" r:id="rId23"/>
-    <p:sldId id="397" r:id="rId24"/>
-    <p:sldId id="398" r:id="rId25"/>
-    <p:sldId id="399" r:id="rId26"/>
-    <p:sldId id="400" r:id="rId27"/>
-    <p:sldId id="401" r:id="rId28"/>
-    <p:sldId id="402" r:id="rId29"/>
-    <p:sldId id="403" r:id="rId30"/>
-    <p:sldId id="404" r:id="rId31"/>
-    <p:sldId id="405" r:id="rId32"/>
-    <p:sldId id="406" r:id="rId33"/>
-    <p:sldId id="407" r:id="rId34"/>
-    <p:sldId id="408" r:id="rId35"/>
-    <p:sldId id="409" r:id="rId36"/>
-    <p:sldId id="410" r:id="rId37"/>
-    <p:sldId id="411" r:id="rId38"/>
-    <p:sldId id="412" r:id="rId39"/>
-    <p:sldId id="413" r:id="rId40"/>
-    <p:sldId id="414" r:id="rId41"/>
-    <p:sldId id="415" r:id="rId42"/>
-    <p:sldId id="417" r:id="rId43"/>
-    <p:sldId id="418" r:id="rId44"/>
-    <p:sldId id="419" r:id="rId45"/>
-    <p:sldId id="420" r:id="rId46"/>
-    <p:sldId id="370" r:id="rId47"/>
-    <p:sldId id="421" r:id="rId48"/>
-    <p:sldId id="372" r:id="rId49"/>
-    <p:sldId id="422" r:id="rId50"/>
-    <p:sldId id="374" r:id="rId51"/>
-    <p:sldId id="416" r:id="rId52"/>
+    <p:sldId id="385" r:id="rId12"/>
+    <p:sldId id="386" r:id="rId13"/>
+    <p:sldId id="388" r:id="rId14"/>
+    <p:sldId id="389" r:id="rId15"/>
+    <p:sldId id="390" r:id="rId16"/>
+    <p:sldId id="391" r:id="rId17"/>
+    <p:sldId id="392" r:id="rId18"/>
+    <p:sldId id="393" r:id="rId19"/>
+    <p:sldId id="394" r:id="rId20"/>
+    <p:sldId id="395" r:id="rId21"/>
+    <p:sldId id="396" r:id="rId22"/>
+    <p:sldId id="397" r:id="rId23"/>
+    <p:sldId id="398" r:id="rId24"/>
+    <p:sldId id="399" r:id="rId25"/>
+    <p:sldId id="400" r:id="rId26"/>
+    <p:sldId id="401" r:id="rId27"/>
+    <p:sldId id="402" r:id="rId28"/>
+    <p:sldId id="403" r:id="rId29"/>
+    <p:sldId id="404" r:id="rId30"/>
+    <p:sldId id="405" r:id="rId31"/>
+    <p:sldId id="406" r:id="rId32"/>
+    <p:sldId id="407" r:id="rId33"/>
+    <p:sldId id="408" r:id="rId34"/>
+    <p:sldId id="409" r:id="rId35"/>
+    <p:sldId id="410" r:id="rId36"/>
+    <p:sldId id="411" r:id="rId37"/>
+    <p:sldId id="412" r:id="rId38"/>
+    <p:sldId id="413" r:id="rId39"/>
+    <p:sldId id="414" r:id="rId40"/>
+    <p:sldId id="415" r:id="rId41"/>
+    <p:sldId id="417" r:id="rId42"/>
+    <p:sldId id="418" r:id="rId43"/>
+    <p:sldId id="419" r:id="rId44"/>
+    <p:sldId id="420" r:id="rId45"/>
+    <p:sldId id="370" r:id="rId46"/>
+    <p:sldId id="421" r:id="rId47"/>
+    <p:sldId id="372" r:id="rId48"/>
+    <p:sldId id="422" r:id="rId49"/>
+    <p:sldId id="374" r:id="rId50"/>
+    <p:sldId id="416" r:id="rId51"/>
   </p:sldIdLst>
   <p:sldSz cx="9144000" cy="6858000" type="screen4x3"/>
   <p:notesSz cx="6858000" cy="9144000"/>
@@ -23704,7 +23703,7 @@
             <a:fld id="{72F64849-FDB5-4298-A413-9D70FF7B4EB1}" type="datetimeFigureOut">
               <a:rPr lang="es-CO" smtClean="0"/>
               <a:pPr/>
-              <a:t>1/02/2020</a:t>
+              <a:t>4/02/2020</a:t>
             </a:fld>
             <a:endParaRPr lang="es-CO"/>
           </a:p>
@@ -24023,14 +24022,12 @@
           <a:p>
             <a:r>
               <a:rPr lang="es-CO" dirty="0"/>
-              <a:t>Poner tema po</a:t>
+              <a:t>Constantes:</a:t>
             </a:r>
             <a:r>
               <a:rPr lang="es-CO" baseline="0" dirty="0"/>
-              <a:t>r objetivos, después de revisarlo con quien corresponda</a:t>
+              <a:t> no cambian en ningún momento</a:t>
             </a:r>
-          </a:p>
-          <a:p>
             <a:endParaRPr lang="es-CO" dirty="0"/>
           </a:p>
         </p:txBody>
@@ -24053,7 +24050,7 @@
             <a:fld id="{E21E405C-8F13-4C14-8D34-C311A8C5D90E}" type="slidenum">
               <a:rPr lang="es-CO" smtClean="0"/>
               <a:pPr/>
-              <a:t>11</a:t>
+              <a:t>14</a:t>
             </a:fld>
             <a:endParaRPr lang="es-CO"/>
           </a:p>
@@ -24062,7 +24059,7 @@
     </p:spTree>
     <p:extLst>
       <p:ext uri="{BB962C8B-B14F-4D97-AF65-F5344CB8AC3E}">
-        <p14:creationId xmlns:p14="http://schemas.microsoft.com/office/powerpoint/2010/main" val="2938145305"/>
+        <p14:creationId xmlns:p14="http://schemas.microsoft.com/office/powerpoint/2010/main" val="690171966"/>
       </p:ext>
     </p:extLst>
   </p:cSld>
@@ -24073,205 +24070,6 @@
 </file>
 
 <file path=ppt/notesSlides/notesSlide10.xml><?xml version="1.0" encoding="utf-8"?>
-<p:notes xmlns:a="http://schemas.openxmlformats.org/drawingml/2006/main" xmlns:r="http://schemas.openxmlformats.org/officeDocument/2006/relationships" xmlns:p="http://schemas.openxmlformats.org/presentationml/2006/main">
-  <p:cSld>
-    <p:spTree>
-      <p:nvGrpSpPr>
-        <p:cNvPr id="1" name=""/>
-        <p:cNvGrpSpPr/>
-        <p:nvPr/>
-      </p:nvGrpSpPr>
-      <p:grpSpPr>
-        <a:xfrm>
-          <a:off x="0" y="0"/>
-          <a:ext cx="0" cy="0"/>
-          <a:chOff x="0" y="0"/>
-          <a:chExt cx="0" cy="0"/>
-        </a:xfrm>
-      </p:grpSpPr>
-      <p:sp>
-        <p:nvSpPr>
-          <p:cNvPr id="2" name="1 Marcador de imagen de diapositiva"/>
-          <p:cNvSpPr>
-            <a:spLocks noGrp="1" noRot="1" noChangeAspect="1"/>
-          </p:cNvSpPr>
-          <p:nvPr>
-            <p:ph type="sldImg"/>
-          </p:nvPr>
-        </p:nvSpPr>
-        <p:spPr/>
-      </p:sp>
-      <p:sp>
-        <p:nvSpPr>
-          <p:cNvPr id="3" name="2 Marcador de notas"/>
-          <p:cNvSpPr>
-            <a:spLocks noGrp="1"/>
-          </p:cNvSpPr>
-          <p:nvPr>
-            <p:ph type="body" idx="1"/>
-          </p:nvPr>
-        </p:nvSpPr>
-        <p:spPr/>
-        <p:txBody>
-          <a:bodyPr>
-            <a:normAutofit/>
-          </a:bodyPr>
-          <a:lstStyle/>
-          <a:p>
-            <a:pPr marL="0" marR="0" indent="0" algn="l" defTabSz="914400" rtl="0" eaLnBrk="1" fontAlgn="auto" latinLnBrk="0" hangingPunct="1">
-              <a:lnSpc>
-                <a:spcPct val="100000"/>
-              </a:lnSpc>
-              <a:spcBef>
-                <a:spcPts val="0"/>
-              </a:spcBef>
-              <a:spcAft>
-                <a:spcPts val="0"/>
-              </a:spcAft>
-              <a:buClrTx/>
-              <a:buSzTx/>
-              <a:buFontTx/>
-              <a:buNone/>
-              <a:tabLst/>
-              <a:defRPr/>
-            </a:pPr>
-            <a:r>
-              <a:rPr lang="es-CO" sz="1200" b="0" i="0" kern="1200" dirty="0">
-                <a:solidFill>
-                  <a:schemeClr val="tx1"/>
-                </a:solidFill>
-                <a:latin typeface="+mn-lt"/>
-                <a:ea typeface="+mn-ea"/>
-                <a:cs typeface="+mn-cs"/>
-              </a:rPr>
-              <a:t>El </a:t>
-            </a:r>
-            <a:r>
-              <a:rPr lang="es-CO" sz="1200" b="0" i="1" kern="1200" dirty="0">
-                <a:solidFill>
-                  <a:schemeClr val="tx1"/>
-                </a:solidFill>
-                <a:latin typeface="+mn-lt"/>
-                <a:ea typeface="+mn-ea"/>
-                <a:cs typeface="+mn-cs"/>
-              </a:rPr>
-              <a:t>lenguaje máquina</a:t>
-            </a:r>
-            <a:r>
-              <a:rPr lang="es-CO" sz="1200" b="0" i="0" kern="1200" dirty="0">
-                <a:solidFill>
-                  <a:schemeClr val="tx1"/>
-                </a:solidFill>
-                <a:latin typeface="+mn-lt"/>
-                <a:ea typeface="+mn-ea"/>
-                <a:cs typeface="+mn-cs"/>
-              </a:rPr>
-              <a:t> de una </a:t>
-            </a:r>
-            <a:r>
-              <a:rPr lang="es-CO" sz="1200" b="0" i="0" u="none" strike="noStrike" kern="1200" dirty="0">
-                <a:solidFill>
-                  <a:schemeClr val="tx1"/>
-                </a:solidFill>
-                <a:latin typeface="+mn-lt"/>
-                <a:ea typeface="+mn-ea"/>
-                <a:cs typeface="+mn-cs"/>
-                <a:hlinkClick r:id="rId3"/>
-              </a:rPr>
-              <a:t>computadora</a:t>
-            </a:r>
-            <a:r>
-              <a:rPr lang="es-CO" sz="1200" b="0" i="0" kern="1200" dirty="0">
-                <a:solidFill>
-                  <a:schemeClr val="tx1"/>
-                </a:solidFill>
-                <a:latin typeface="+mn-lt"/>
-                <a:ea typeface="+mn-ea"/>
-                <a:cs typeface="+mn-cs"/>
-              </a:rPr>
-              <a:t> consta de cadenas de números binarios (ceros y unos) y es el único que "entienden" directamente los </a:t>
-            </a:r>
-            <a:r>
-              <a:rPr lang="es-CO" sz="1200" b="0" i="0" u="none" strike="noStrike" kern="1200" dirty="0">
-                <a:solidFill>
-                  <a:schemeClr val="tx1"/>
-                </a:solidFill>
-                <a:latin typeface="+mn-lt"/>
-                <a:ea typeface="+mn-ea"/>
-                <a:cs typeface="+mn-cs"/>
-                <a:hlinkClick r:id="rId4"/>
-              </a:rPr>
-              <a:t>procesadores</a:t>
-            </a:r>
-            <a:r>
-              <a:rPr lang="es-CO" sz="1200" b="0" i="0" kern="1200" dirty="0">
-                <a:solidFill>
-                  <a:schemeClr val="tx1"/>
-                </a:solidFill>
-                <a:latin typeface="+mn-lt"/>
-                <a:ea typeface="+mn-ea"/>
-                <a:cs typeface="+mn-cs"/>
-              </a:rPr>
-              <a:t>. </a:t>
-            </a:r>
-            <a:br>
-              <a:rPr lang="es-CO" sz="1200" b="0" i="0" kern="1200" dirty="0">
-                <a:solidFill>
-                  <a:schemeClr val="tx1"/>
-                </a:solidFill>
-                <a:latin typeface="+mn-lt"/>
-                <a:ea typeface="+mn-ea"/>
-                <a:cs typeface="+mn-cs"/>
-              </a:rPr>
-            </a:br>
-            <a:r>
-              <a:rPr lang="es-CO" dirty="0"/>
-              <a:t>Existen dos formas de obtener un código ejecutable a partir de un programa fuente: los intérpretes y los compiladores</a:t>
-            </a:r>
-          </a:p>
-          <a:p>
-            <a:endParaRPr lang="es-CO" dirty="0"/>
-          </a:p>
-        </p:txBody>
-      </p:sp>
-      <p:sp>
-        <p:nvSpPr>
-          <p:cNvPr id="4" name="3 Marcador de número de diapositiva"/>
-          <p:cNvSpPr>
-            <a:spLocks noGrp="1"/>
-          </p:cNvSpPr>
-          <p:nvPr>
-            <p:ph type="sldNum" sz="quarter" idx="10"/>
-          </p:nvPr>
-        </p:nvSpPr>
-        <p:spPr/>
-        <p:txBody>
-          <a:bodyPr/>
-          <a:lstStyle/>
-          <a:p>
-            <a:fld id="{E21E405C-8F13-4C14-8D34-C311A8C5D90E}" type="slidenum">
-              <a:rPr lang="es-CO" smtClean="0"/>
-              <a:pPr/>
-              <a:t>37</a:t>
-            </a:fld>
-            <a:endParaRPr lang="es-CO"/>
-          </a:p>
-        </p:txBody>
-      </p:sp>
-    </p:spTree>
-    <p:extLst>
-      <p:ext uri="{BB962C8B-B14F-4D97-AF65-F5344CB8AC3E}">
-        <p14:creationId xmlns:p14="http://schemas.microsoft.com/office/powerpoint/2010/main" val="1384588865"/>
-      </p:ext>
-    </p:extLst>
-  </p:cSld>
-  <p:clrMapOvr>
-    <a:masterClrMapping/>
-  </p:clrMapOvr>
-</p:notes>
-</file>
-
-<file path=ppt/notesSlides/notesSlide11.xml><?xml version="1.0" encoding="utf-8"?>
 <p:notes xmlns:a="http://schemas.openxmlformats.org/drawingml/2006/main" xmlns:r="http://schemas.openxmlformats.org/officeDocument/2006/relationships" xmlns:p="http://schemas.openxmlformats.org/presentationml/2006/main">
   <p:cSld>
     <p:spTree>
@@ -24362,7 +24160,7 @@
             <a:fld id="{E21E405C-8F13-4C14-8D34-C311A8C5D90E}" type="slidenum">
               <a:rPr lang="es-CO" smtClean="0"/>
               <a:pPr/>
-              <a:t>40</a:t>
+              <a:t>39</a:t>
             </a:fld>
             <a:endParaRPr lang="es-CO"/>
           </a:p>
@@ -24381,7 +24179,7 @@
 </p:notes>
 </file>
 
-<file path=ppt/notesSlides/notesSlide12.xml><?xml version="1.0" encoding="utf-8"?>
+<file path=ppt/notesSlides/notesSlide11.xml><?xml version="1.0" encoding="utf-8"?>
 <p:notes xmlns:a="http://schemas.openxmlformats.org/drawingml/2006/main" xmlns:r="http://schemas.openxmlformats.org/officeDocument/2006/relationships" xmlns:p="http://schemas.openxmlformats.org/presentationml/2006/main">
   <p:cSld>
     <p:spTree>
@@ -24472,7 +24270,7 @@
             <a:fld id="{E21E405C-8F13-4C14-8D34-C311A8C5D90E}" type="slidenum">
               <a:rPr lang="es-CO" smtClean="0"/>
               <a:pPr/>
-              <a:t>42</a:t>
+              <a:t>41</a:t>
             </a:fld>
             <a:endParaRPr lang="es-CO"/>
           </a:p>
@@ -24491,7 +24289,7 @@
 </p:notes>
 </file>
 
-<file path=ppt/notesSlides/notesSlide13.xml><?xml version="1.0" encoding="utf-8"?>
+<file path=ppt/notesSlides/notesSlide12.xml><?xml version="1.0" encoding="utf-8"?>
 <p:notes xmlns:a="http://schemas.openxmlformats.org/drawingml/2006/main" xmlns:r="http://schemas.openxmlformats.org/officeDocument/2006/relationships" xmlns:p="http://schemas.openxmlformats.org/presentationml/2006/main">
   <p:cSld>
     <p:spTree>
@@ -24559,7 +24357,7 @@
             <a:fld id="{E21E405C-8F13-4C14-8D34-C311A8C5D90E}" type="slidenum">
               <a:rPr lang="es-CO" smtClean="0"/>
               <a:pPr/>
-              <a:t>47</a:t>
+              <a:t>46</a:t>
             </a:fld>
             <a:endParaRPr lang="es-CO"/>
           </a:p>
@@ -24579,101 +24377,6 @@
 </file>
 
 <file path=ppt/notesSlides/notesSlide2.xml><?xml version="1.0" encoding="utf-8"?>
-<p:notes xmlns:a="http://schemas.openxmlformats.org/drawingml/2006/main" xmlns:r="http://schemas.openxmlformats.org/officeDocument/2006/relationships" xmlns:p="http://schemas.openxmlformats.org/presentationml/2006/main">
-  <p:cSld>
-    <p:spTree>
-      <p:nvGrpSpPr>
-        <p:cNvPr id="1" name=""/>
-        <p:cNvGrpSpPr/>
-        <p:nvPr/>
-      </p:nvGrpSpPr>
-      <p:grpSpPr>
-        <a:xfrm>
-          <a:off x="0" y="0"/>
-          <a:ext cx="0" cy="0"/>
-          <a:chOff x="0" y="0"/>
-          <a:chExt cx="0" cy="0"/>
-        </a:xfrm>
-      </p:grpSpPr>
-      <p:sp>
-        <p:nvSpPr>
-          <p:cNvPr id="2" name="1 Marcador de imagen de diapositiva"/>
-          <p:cNvSpPr>
-            <a:spLocks noGrp="1" noRot="1" noChangeAspect="1"/>
-          </p:cNvSpPr>
-          <p:nvPr>
-            <p:ph type="sldImg"/>
-          </p:nvPr>
-        </p:nvSpPr>
-        <p:spPr/>
-      </p:sp>
-      <p:sp>
-        <p:nvSpPr>
-          <p:cNvPr id="3" name="2 Marcador de notas"/>
-          <p:cNvSpPr>
-            <a:spLocks noGrp="1"/>
-          </p:cNvSpPr>
-          <p:nvPr>
-            <p:ph type="body" idx="1"/>
-          </p:nvPr>
-        </p:nvSpPr>
-        <p:spPr/>
-        <p:txBody>
-          <a:bodyPr>
-            <a:normAutofit/>
-          </a:bodyPr>
-          <a:lstStyle/>
-          <a:p>
-            <a:r>
-              <a:rPr lang="es-CO" dirty="0"/>
-              <a:t>Constantes:</a:t>
-            </a:r>
-            <a:r>
-              <a:rPr lang="es-CO" baseline="0" dirty="0"/>
-              <a:t> no cambian en ningún momento</a:t>
-            </a:r>
-            <a:endParaRPr lang="es-CO" dirty="0"/>
-          </a:p>
-        </p:txBody>
-      </p:sp>
-      <p:sp>
-        <p:nvSpPr>
-          <p:cNvPr id="4" name="3 Marcador de número de diapositiva"/>
-          <p:cNvSpPr>
-            <a:spLocks noGrp="1"/>
-          </p:cNvSpPr>
-          <p:nvPr>
-            <p:ph type="sldNum" sz="quarter" idx="10"/>
-          </p:nvPr>
-        </p:nvSpPr>
-        <p:spPr/>
-        <p:txBody>
-          <a:bodyPr/>
-          <a:lstStyle/>
-          <a:p>
-            <a:fld id="{E21E405C-8F13-4C14-8D34-C311A8C5D90E}" type="slidenum">
-              <a:rPr lang="es-CO" smtClean="0"/>
-              <a:pPr/>
-              <a:t>15</a:t>
-            </a:fld>
-            <a:endParaRPr lang="es-CO"/>
-          </a:p>
-        </p:txBody>
-      </p:sp>
-    </p:spTree>
-    <p:extLst>
-      <p:ext uri="{BB962C8B-B14F-4D97-AF65-F5344CB8AC3E}">
-        <p14:creationId xmlns:p14="http://schemas.microsoft.com/office/powerpoint/2010/main" val="690171966"/>
-      </p:ext>
-    </p:extLst>
-  </p:cSld>
-  <p:clrMapOvr>
-    <a:masterClrMapping/>
-  </p:clrMapOvr>
-</p:notes>
-</file>
-
-<file path=ppt/notesSlides/notesSlide3.xml><?xml version="1.0" encoding="utf-8"?>
 <p:notes xmlns:a="http://schemas.openxmlformats.org/drawingml/2006/main" xmlns:r="http://schemas.openxmlformats.org/officeDocument/2006/relationships" xmlns:p="http://schemas.openxmlformats.org/presentationml/2006/main">
   <p:cSld>
     <p:spTree>
@@ -24749,7 +24452,7 @@
             <a:fld id="{E21E405C-8F13-4C14-8D34-C311A8C5D90E}" type="slidenum">
               <a:rPr lang="es-CO" smtClean="0"/>
               <a:pPr/>
-              <a:t>17</a:t>
+              <a:t>16</a:t>
             </a:fld>
             <a:endParaRPr lang="es-CO"/>
           </a:p>
@@ -24768,7 +24471,7 @@
 </p:notes>
 </file>
 
-<file path=ppt/notesSlides/notesSlide4.xml><?xml version="1.0" encoding="utf-8"?>
+<file path=ppt/notesSlides/notesSlide3.xml><?xml version="1.0" encoding="utf-8"?>
 <p:notes xmlns:a="http://schemas.openxmlformats.org/drawingml/2006/main" xmlns:r="http://schemas.openxmlformats.org/officeDocument/2006/relationships" xmlns:p="http://schemas.openxmlformats.org/presentationml/2006/main">
   <p:cSld>
     <p:spTree>
@@ -24868,7 +24571,7 @@
             <a:fld id="{E21E405C-8F13-4C14-8D34-C311A8C5D90E}" type="slidenum">
               <a:rPr lang="es-CO" smtClean="0"/>
               <a:pPr/>
-              <a:t>19</a:t>
+              <a:t>18</a:t>
             </a:fld>
             <a:endParaRPr lang="es-CO"/>
           </a:p>
@@ -24887,7 +24590,7 @@
 </p:notes>
 </file>
 
-<file path=ppt/notesSlides/notesSlide5.xml><?xml version="1.0" encoding="utf-8"?>
+<file path=ppt/notesSlides/notesSlide4.xml><?xml version="1.0" encoding="utf-8"?>
 <p:notes xmlns:a="http://schemas.openxmlformats.org/drawingml/2006/main" xmlns:r="http://schemas.openxmlformats.org/officeDocument/2006/relationships" xmlns:p="http://schemas.openxmlformats.org/presentationml/2006/main">
   <p:cSld>
     <p:spTree>
@@ -24969,7 +24672,7 @@
             <a:fld id="{E21E405C-8F13-4C14-8D34-C311A8C5D90E}" type="slidenum">
               <a:rPr lang="es-CO" smtClean="0"/>
               <a:pPr/>
-              <a:t>20</a:t>
+              <a:t>19</a:t>
             </a:fld>
             <a:endParaRPr lang="es-CO"/>
           </a:p>
@@ -24979,6 +24682,338 @@
     <p:extLst>
       <p:ext uri="{BB962C8B-B14F-4D97-AF65-F5344CB8AC3E}">
         <p14:creationId xmlns:p14="http://schemas.microsoft.com/office/powerpoint/2010/main" val="1544027208"/>
+      </p:ext>
+    </p:extLst>
+  </p:cSld>
+  <p:clrMapOvr>
+    <a:masterClrMapping/>
+  </p:clrMapOvr>
+</p:notes>
+</file>
+
+<file path=ppt/notesSlides/notesSlide5.xml><?xml version="1.0" encoding="utf-8"?>
+<p:notes xmlns:a="http://schemas.openxmlformats.org/drawingml/2006/main" xmlns:r="http://schemas.openxmlformats.org/officeDocument/2006/relationships" xmlns:p="http://schemas.openxmlformats.org/presentationml/2006/main">
+  <p:cSld>
+    <p:spTree>
+      <p:nvGrpSpPr>
+        <p:cNvPr id="1" name=""/>
+        <p:cNvGrpSpPr/>
+        <p:nvPr/>
+      </p:nvGrpSpPr>
+      <p:grpSpPr>
+        <a:xfrm>
+          <a:off x="0" y="0"/>
+          <a:ext cx="0" cy="0"/>
+          <a:chOff x="0" y="0"/>
+          <a:chExt cx="0" cy="0"/>
+        </a:xfrm>
+      </p:grpSpPr>
+      <p:sp>
+        <p:nvSpPr>
+          <p:cNvPr id="2" name="1 Marcador de imagen de diapositiva"/>
+          <p:cNvSpPr>
+            <a:spLocks noGrp="1" noRot="1" noChangeAspect="1"/>
+          </p:cNvSpPr>
+          <p:nvPr>
+            <p:ph type="sldImg"/>
+          </p:nvPr>
+        </p:nvSpPr>
+        <p:spPr/>
+      </p:sp>
+      <p:sp>
+        <p:nvSpPr>
+          <p:cNvPr id="3" name="2 Marcador de notas"/>
+          <p:cNvSpPr>
+            <a:spLocks noGrp="1"/>
+          </p:cNvSpPr>
+          <p:nvPr>
+            <p:ph type="body" idx="1"/>
+          </p:nvPr>
+        </p:nvSpPr>
+        <p:spPr/>
+        <p:txBody>
+          <a:bodyPr>
+            <a:normAutofit/>
+          </a:bodyPr>
+          <a:lstStyle/>
+          <a:p>
+            <a:r>
+              <a:rPr lang="es-CO" dirty="0"/>
+              <a:t>Es independiente</a:t>
+            </a:r>
+            <a:r>
+              <a:rPr lang="es-CO" baseline="0" dirty="0"/>
+              <a:t> de la sintaxis de los lenguajes de programación. Lo que busca es representar la idea independientemente de la notación. Se pueden usar las palabras que se deseen para representar un programa en pseudocódigo. La idea es que cualquiera que lea el algoritmo, entienda la lógica del programa aunque no domine el lenguaje de programación en el que esté escrito. </a:t>
+            </a:r>
+          </a:p>
+          <a:p>
+            <a:endParaRPr lang="es-CO" baseline="0" dirty="0"/>
+          </a:p>
+          <a:p>
+            <a:r>
+              <a:rPr lang="es-CO" sz="1200" dirty="0"/>
+              <a:t>Son proposiciones informales que permiten expresar  detalladamente las instrucciones que llevan desde un estado inicial (problema) hasta un resultados deseado (solución), pero que no requiere de una sintaxis particular</a:t>
+            </a:r>
+          </a:p>
+          <a:p>
+            <a:pPr marL="0" marR="0" indent="0" algn="l" defTabSz="914400" rtl="0" eaLnBrk="1" fontAlgn="auto" latinLnBrk="0" hangingPunct="1">
+              <a:lnSpc>
+                <a:spcPct val="100000"/>
+              </a:lnSpc>
+              <a:spcBef>
+                <a:spcPts val="0"/>
+              </a:spcBef>
+              <a:spcAft>
+                <a:spcPts val="0"/>
+              </a:spcAft>
+              <a:buClrTx/>
+              <a:buSzTx/>
+              <a:buFontTx/>
+              <a:buNone/>
+              <a:tabLst/>
+              <a:defRPr/>
+            </a:pPr>
+            <a:endParaRPr lang="es-CO" dirty="0"/>
+          </a:p>
+          <a:p>
+            <a:pPr marL="0" marR="0" indent="0" algn="l" defTabSz="914400" rtl="0" eaLnBrk="1" fontAlgn="auto" latinLnBrk="0" hangingPunct="1">
+              <a:lnSpc>
+                <a:spcPct val="100000"/>
+              </a:lnSpc>
+              <a:spcBef>
+                <a:spcPts val="0"/>
+              </a:spcBef>
+              <a:spcAft>
+                <a:spcPts val="0"/>
+              </a:spcAft>
+              <a:buClrTx/>
+              <a:buSzTx/>
+              <a:buFontTx/>
+              <a:buNone/>
+              <a:tabLst/>
+              <a:defRPr/>
+            </a:pPr>
+            <a:r>
+              <a:rPr lang="es-CO" dirty="0"/>
+              <a:t>Pseudocódigo viene de falso código</a:t>
+            </a:r>
+          </a:p>
+          <a:p>
+            <a:pPr marL="0" marR="0" indent="0" algn="l" defTabSz="914400" rtl="0" eaLnBrk="1" fontAlgn="auto" latinLnBrk="0" hangingPunct="1">
+              <a:lnSpc>
+                <a:spcPct val="100000"/>
+              </a:lnSpc>
+              <a:spcBef>
+                <a:spcPts val="0"/>
+              </a:spcBef>
+              <a:spcAft>
+                <a:spcPts val="0"/>
+              </a:spcAft>
+              <a:buClrTx/>
+              <a:buSzTx/>
+              <a:buFontTx/>
+              <a:buNone/>
+              <a:tabLst/>
+              <a:defRPr/>
+            </a:pPr>
+            <a:endParaRPr lang="es-CO" dirty="0"/>
+          </a:p>
+          <a:p>
+            <a:pPr marL="0" marR="0" indent="0" algn="l" defTabSz="914400" rtl="0" eaLnBrk="1" fontAlgn="auto" latinLnBrk="0" hangingPunct="1">
+              <a:lnSpc>
+                <a:spcPct val="100000"/>
+              </a:lnSpc>
+              <a:spcBef>
+                <a:spcPts val="0"/>
+              </a:spcBef>
+              <a:spcAft>
+                <a:spcPts val="0"/>
+              </a:spcAft>
+              <a:buClrTx/>
+              <a:buSzTx/>
+              <a:buFontTx/>
+              <a:buNone/>
+              <a:tabLst/>
+              <a:defRPr/>
+            </a:pPr>
+            <a:r>
+              <a:rPr lang="es-CO" sz="1200" b="0" i="0" kern="1200" dirty="0">
+                <a:solidFill>
+                  <a:schemeClr val="tx1"/>
+                </a:solidFill>
+                <a:latin typeface="+mn-lt"/>
+                <a:ea typeface="+mn-ea"/>
+                <a:cs typeface="+mn-cs"/>
+              </a:rPr>
+              <a:t>El estudio de un idioma de </a:t>
+            </a:r>
+            <a:r>
+              <a:rPr lang="es-CO" sz="1200" b="0" i="0" kern="1200" dirty="0" err="1">
+                <a:solidFill>
+                  <a:schemeClr val="tx1"/>
+                </a:solidFill>
+                <a:latin typeface="+mn-lt"/>
+                <a:ea typeface="+mn-ea"/>
+                <a:cs typeface="+mn-cs"/>
+              </a:rPr>
+              <a:t>programacion</a:t>
+            </a:r>
+            <a:r>
+              <a:rPr lang="es-CO" sz="1200" b="0" i="0" kern="1200" dirty="0">
+                <a:solidFill>
+                  <a:schemeClr val="tx1"/>
+                </a:solidFill>
+                <a:latin typeface="+mn-lt"/>
+                <a:ea typeface="+mn-ea"/>
+                <a:cs typeface="+mn-cs"/>
+              </a:rPr>
+              <a:t>, requiere </a:t>
+            </a:r>
+            <a:r>
+              <a:rPr lang="es-CO" sz="1200" b="0" i="0" kern="1200" dirty="0" err="1">
+                <a:solidFill>
+                  <a:schemeClr val="tx1"/>
+                </a:solidFill>
+                <a:latin typeface="+mn-lt"/>
+                <a:ea typeface="+mn-ea"/>
+                <a:cs typeface="+mn-cs"/>
+              </a:rPr>
+              <a:t>ademas</a:t>
+            </a:r>
+            <a:r>
+              <a:rPr lang="es-CO" sz="1200" b="0" i="0" kern="1200" dirty="0">
+                <a:solidFill>
+                  <a:schemeClr val="tx1"/>
+                </a:solidFill>
+                <a:latin typeface="+mn-lt"/>
+                <a:ea typeface="+mn-ea"/>
+                <a:cs typeface="+mn-cs"/>
+              </a:rPr>
+              <a:t> de conocer la </a:t>
+            </a:r>
+            <a:r>
+              <a:rPr lang="es-CO" sz="1200" b="0" i="0" kern="1200" dirty="0" err="1">
+                <a:solidFill>
+                  <a:schemeClr val="tx1"/>
+                </a:solidFill>
+                <a:latin typeface="+mn-lt"/>
+                <a:ea typeface="+mn-ea"/>
+                <a:cs typeface="+mn-cs"/>
+              </a:rPr>
+              <a:t>logica</a:t>
+            </a:r>
+            <a:r>
+              <a:rPr lang="es-CO" sz="1200" b="0" i="0" kern="1200" dirty="0">
+                <a:solidFill>
+                  <a:schemeClr val="tx1"/>
+                </a:solidFill>
+                <a:latin typeface="+mn-lt"/>
+                <a:ea typeface="+mn-ea"/>
+                <a:cs typeface="+mn-cs"/>
+              </a:rPr>
+              <a:t> con que se desarrolla un algoritmo (que seria el </a:t>
+            </a:r>
+            <a:r>
+              <a:rPr lang="es-CO" sz="1200" b="0" i="0" kern="1200" dirty="0" err="1">
+                <a:solidFill>
+                  <a:schemeClr val="tx1"/>
+                </a:solidFill>
+                <a:latin typeface="+mn-lt"/>
+                <a:ea typeface="+mn-ea"/>
+                <a:cs typeface="+mn-cs"/>
+              </a:rPr>
+              <a:t>pseudocodigo</a:t>
+            </a:r>
+            <a:r>
+              <a:rPr lang="es-CO" sz="1200" b="0" i="0" kern="1200" dirty="0">
+                <a:solidFill>
+                  <a:schemeClr val="tx1"/>
+                </a:solidFill>
+                <a:latin typeface="+mn-lt"/>
+                <a:ea typeface="+mn-ea"/>
+                <a:cs typeface="+mn-cs"/>
+              </a:rPr>
+              <a:t>) conocer las funciones disponibles su sintaxis y a que </a:t>
+            </a:r>
+            <a:r>
+              <a:rPr lang="es-CO" sz="1200" b="0" i="0" kern="1200" dirty="0" err="1">
+                <a:solidFill>
+                  <a:schemeClr val="tx1"/>
+                </a:solidFill>
+                <a:latin typeface="+mn-lt"/>
+                <a:ea typeface="+mn-ea"/>
+                <a:cs typeface="+mn-cs"/>
+              </a:rPr>
+              <a:t>complememnto</a:t>
+            </a:r>
+            <a:r>
+              <a:rPr lang="es-CO" sz="1200" b="0" i="0" kern="1200" dirty="0">
+                <a:solidFill>
+                  <a:schemeClr val="tx1"/>
+                </a:solidFill>
+                <a:latin typeface="+mn-lt"/>
+                <a:ea typeface="+mn-ea"/>
+                <a:cs typeface="+mn-cs"/>
+              </a:rPr>
+              <a:t> o </a:t>
+            </a:r>
+            <a:r>
+              <a:rPr lang="es-CO" sz="1200" b="0" i="0" kern="1200" dirty="0" err="1">
+                <a:solidFill>
+                  <a:schemeClr val="tx1"/>
+                </a:solidFill>
+                <a:latin typeface="+mn-lt"/>
+                <a:ea typeface="+mn-ea"/>
+                <a:cs typeface="+mn-cs"/>
+              </a:rPr>
+              <a:t>libreria</a:t>
+            </a:r>
+            <a:r>
+              <a:rPr lang="es-CO" sz="1200" b="0" i="0" kern="1200" dirty="0">
+                <a:solidFill>
+                  <a:schemeClr val="tx1"/>
+                </a:solidFill>
+                <a:latin typeface="+mn-lt"/>
+                <a:ea typeface="+mn-ea"/>
+                <a:cs typeface="+mn-cs"/>
+              </a:rPr>
+              <a:t> pertenecen, ya que esta debe ser incluida en el proyecto.</a:t>
+            </a:r>
+            <a:endParaRPr lang="es-CO" dirty="0"/>
+          </a:p>
+          <a:p>
+            <a:endParaRPr lang="es-CO" dirty="0"/>
+          </a:p>
+        </p:txBody>
+      </p:sp>
+      <p:sp>
+        <p:nvSpPr>
+          <p:cNvPr id="4" name="3 Marcador de número de diapositiva"/>
+          <p:cNvSpPr>
+            <a:spLocks noGrp="1"/>
+          </p:cNvSpPr>
+          <p:nvPr>
+            <p:ph type="sldNum" sz="quarter" idx="10"/>
+          </p:nvPr>
+        </p:nvSpPr>
+        <p:spPr/>
+        <p:txBody>
+          <a:bodyPr/>
+          <a:lstStyle/>
+          <a:p>
+            <a:fld id="{E21E405C-8F13-4C14-8D34-C311A8C5D90E}" type="slidenum">
+              <a:rPr lang="es-CO" smtClean="0"/>
+              <a:pPr/>
+              <a:t>26</a:t>
+            </a:fld>
+            <a:endParaRPr lang="es-CO"/>
+          </a:p>
+        </p:txBody>
+      </p:sp>
+    </p:spTree>
+    <p:extLst>
+      <p:ext uri="{BB962C8B-B14F-4D97-AF65-F5344CB8AC3E}">
+        <p14:creationId xmlns:p14="http://schemas.microsoft.com/office/powerpoint/2010/main" val="654691346"/>
       </p:ext>
     </p:extLst>
   </p:cSld>
@@ -25310,7 +25345,7 @@
     </p:spTree>
     <p:extLst>
       <p:ext uri="{BB962C8B-B14F-4D97-AF65-F5344CB8AC3E}">
-        <p14:creationId xmlns:p14="http://schemas.microsoft.com/office/powerpoint/2010/main" val="654691346"/>
+        <p14:creationId xmlns:p14="http://schemas.microsoft.com/office/powerpoint/2010/main" val="1969508784"/>
       </p:ext>
     </p:extLst>
   </p:cSld>
@@ -25633,339 +25668,7 @@
             <a:fld id="{E21E405C-8F13-4C14-8D34-C311A8C5D90E}" type="slidenum">
               <a:rPr lang="es-CO" smtClean="0"/>
               <a:pPr/>
-              <a:t>28</a:t>
-            </a:fld>
-            <a:endParaRPr lang="es-CO"/>
-          </a:p>
-        </p:txBody>
-      </p:sp>
-    </p:spTree>
-    <p:extLst>
-      <p:ext uri="{BB962C8B-B14F-4D97-AF65-F5344CB8AC3E}">
-        <p14:creationId xmlns:p14="http://schemas.microsoft.com/office/powerpoint/2010/main" val="1969508784"/>
-      </p:ext>
-    </p:extLst>
-  </p:cSld>
-  <p:clrMapOvr>
-    <a:masterClrMapping/>
-  </p:clrMapOvr>
-</p:notes>
-</file>
-
-<file path=ppt/notesSlides/notesSlide8.xml><?xml version="1.0" encoding="utf-8"?>
-<p:notes xmlns:a="http://schemas.openxmlformats.org/drawingml/2006/main" xmlns:r="http://schemas.openxmlformats.org/officeDocument/2006/relationships" xmlns:p="http://schemas.openxmlformats.org/presentationml/2006/main">
-  <p:cSld>
-    <p:spTree>
-      <p:nvGrpSpPr>
-        <p:cNvPr id="1" name=""/>
-        <p:cNvGrpSpPr/>
-        <p:nvPr/>
-      </p:nvGrpSpPr>
-      <p:grpSpPr>
-        <a:xfrm>
-          <a:off x="0" y="0"/>
-          <a:ext cx="0" cy="0"/>
-          <a:chOff x="0" y="0"/>
-          <a:chExt cx="0" cy="0"/>
-        </a:xfrm>
-      </p:grpSpPr>
-      <p:sp>
-        <p:nvSpPr>
-          <p:cNvPr id="2" name="1 Marcador de imagen de diapositiva"/>
-          <p:cNvSpPr>
-            <a:spLocks noGrp="1" noRot="1" noChangeAspect="1"/>
-          </p:cNvSpPr>
-          <p:nvPr>
-            <p:ph type="sldImg"/>
-          </p:nvPr>
-        </p:nvSpPr>
-        <p:spPr/>
-      </p:sp>
-      <p:sp>
-        <p:nvSpPr>
-          <p:cNvPr id="3" name="2 Marcador de notas"/>
-          <p:cNvSpPr>
-            <a:spLocks noGrp="1"/>
-          </p:cNvSpPr>
-          <p:nvPr>
-            <p:ph type="body" idx="1"/>
-          </p:nvPr>
-        </p:nvSpPr>
-        <p:spPr/>
-        <p:txBody>
-          <a:bodyPr>
-            <a:normAutofit/>
-          </a:bodyPr>
-          <a:lstStyle/>
-          <a:p>
-            <a:r>
-              <a:rPr lang="es-CO" dirty="0"/>
-              <a:t>Es independiente</a:t>
-            </a:r>
-            <a:r>
-              <a:rPr lang="es-CO" baseline="0" dirty="0"/>
-              <a:t> de la sintaxis de los lenguajes de programación. Lo que busca es representar la idea independientemente de la notación. Se pueden usar las palabras que se deseen para representar un programa en pseudocódigo. La idea es que cualquiera que lea el algoritmo, entienda la lógica del programa aunque no domine el lenguaje de programación en el que esté escrito. </a:t>
-            </a:r>
-          </a:p>
-          <a:p>
-            <a:endParaRPr lang="es-CO" baseline="0" dirty="0"/>
-          </a:p>
-          <a:p>
-            <a:r>
-              <a:rPr lang="es-CO" sz="1200" dirty="0"/>
-              <a:t>Son proposiciones informales que permiten expresar  detalladamente las instrucciones que llevan desde un estado inicial (problema) hasta un resultados deseado (solución), pero que no requiere de una sintaxis particular</a:t>
-            </a:r>
-          </a:p>
-          <a:p>
-            <a:pPr marL="0" marR="0" indent="0" algn="l" defTabSz="914400" rtl="0" eaLnBrk="1" fontAlgn="auto" latinLnBrk="0" hangingPunct="1">
-              <a:lnSpc>
-                <a:spcPct val="100000"/>
-              </a:lnSpc>
-              <a:spcBef>
-                <a:spcPts val="0"/>
-              </a:spcBef>
-              <a:spcAft>
-                <a:spcPts val="0"/>
-              </a:spcAft>
-              <a:buClrTx/>
-              <a:buSzTx/>
-              <a:buFontTx/>
-              <a:buNone/>
-              <a:tabLst/>
-              <a:defRPr/>
-            </a:pPr>
-            <a:endParaRPr lang="es-CO" dirty="0"/>
-          </a:p>
-          <a:p>
-            <a:pPr marL="0" marR="0" indent="0" algn="l" defTabSz="914400" rtl="0" eaLnBrk="1" fontAlgn="auto" latinLnBrk="0" hangingPunct="1">
-              <a:lnSpc>
-                <a:spcPct val="100000"/>
-              </a:lnSpc>
-              <a:spcBef>
-                <a:spcPts val="0"/>
-              </a:spcBef>
-              <a:spcAft>
-                <a:spcPts val="0"/>
-              </a:spcAft>
-              <a:buClrTx/>
-              <a:buSzTx/>
-              <a:buFontTx/>
-              <a:buNone/>
-              <a:tabLst/>
-              <a:defRPr/>
-            </a:pPr>
-            <a:r>
-              <a:rPr lang="es-CO" dirty="0"/>
-              <a:t>Pseudocódigo viene de falso código</a:t>
-            </a:r>
-          </a:p>
-          <a:p>
-            <a:pPr marL="0" marR="0" indent="0" algn="l" defTabSz="914400" rtl="0" eaLnBrk="1" fontAlgn="auto" latinLnBrk="0" hangingPunct="1">
-              <a:lnSpc>
-                <a:spcPct val="100000"/>
-              </a:lnSpc>
-              <a:spcBef>
-                <a:spcPts val="0"/>
-              </a:spcBef>
-              <a:spcAft>
-                <a:spcPts val="0"/>
-              </a:spcAft>
-              <a:buClrTx/>
-              <a:buSzTx/>
-              <a:buFontTx/>
-              <a:buNone/>
-              <a:tabLst/>
-              <a:defRPr/>
-            </a:pPr>
-            <a:endParaRPr lang="es-CO" dirty="0"/>
-          </a:p>
-          <a:p>
-            <a:pPr marL="0" marR="0" indent="0" algn="l" defTabSz="914400" rtl="0" eaLnBrk="1" fontAlgn="auto" latinLnBrk="0" hangingPunct="1">
-              <a:lnSpc>
-                <a:spcPct val="100000"/>
-              </a:lnSpc>
-              <a:spcBef>
-                <a:spcPts val="0"/>
-              </a:spcBef>
-              <a:spcAft>
-                <a:spcPts val="0"/>
-              </a:spcAft>
-              <a:buClrTx/>
-              <a:buSzTx/>
-              <a:buFontTx/>
-              <a:buNone/>
-              <a:tabLst/>
-              <a:defRPr/>
-            </a:pPr>
-            <a:r>
-              <a:rPr lang="es-CO" sz="1200" b="0" i="0" kern="1200" dirty="0">
-                <a:solidFill>
-                  <a:schemeClr val="tx1"/>
-                </a:solidFill>
-                <a:latin typeface="+mn-lt"/>
-                <a:ea typeface="+mn-ea"/>
-                <a:cs typeface="+mn-cs"/>
-              </a:rPr>
-              <a:t>El estudio de un idioma de </a:t>
-            </a:r>
-            <a:r>
-              <a:rPr lang="es-CO" sz="1200" b="0" i="0" kern="1200" dirty="0" err="1">
-                <a:solidFill>
-                  <a:schemeClr val="tx1"/>
-                </a:solidFill>
-                <a:latin typeface="+mn-lt"/>
-                <a:ea typeface="+mn-ea"/>
-                <a:cs typeface="+mn-cs"/>
-              </a:rPr>
-              <a:t>programacion</a:t>
-            </a:r>
-            <a:r>
-              <a:rPr lang="es-CO" sz="1200" b="0" i="0" kern="1200" dirty="0">
-                <a:solidFill>
-                  <a:schemeClr val="tx1"/>
-                </a:solidFill>
-                <a:latin typeface="+mn-lt"/>
-                <a:ea typeface="+mn-ea"/>
-                <a:cs typeface="+mn-cs"/>
-              </a:rPr>
-              <a:t>, requiere </a:t>
-            </a:r>
-            <a:r>
-              <a:rPr lang="es-CO" sz="1200" b="0" i="0" kern="1200" dirty="0" err="1">
-                <a:solidFill>
-                  <a:schemeClr val="tx1"/>
-                </a:solidFill>
-                <a:latin typeface="+mn-lt"/>
-                <a:ea typeface="+mn-ea"/>
-                <a:cs typeface="+mn-cs"/>
-              </a:rPr>
-              <a:t>ademas</a:t>
-            </a:r>
-            <a:r>
-              <a:rPr lang="es-CO" sz="1200" b="0" i="0" kern="1200" dirty="0">
-                <a:solidFill>
-                  <a:schemeClr val="tx1"/>
-                </a:solidFill>
-                <a:latin typeface="+mn-lt"/>
-                <a:ea typeface="+mn-ea"/>
-                <a:cs typeface="+mn-cs"/>
-              </a:rPr>
-              <a:t> de conocer la </a:t>
-            </a:r>
-            <a:r>
-              <a:rPr lang="es-CO" sz="1200" b="0" i="0" kern="1200" dirty="0" err="1">
-                <a:solidFill>
-                  <a:schemeClr val="tx1"/>
-                </a:solidFill>
-                <a:latin typeface="+mn-lt"/>
-                <a:ea typeface="+mn-ea"/>
-                <a:cs typeface="+mn-cs"/>
-              </a:rPr>
-              <a:t>logica</a:t>
-            </a:r>
-            <a:r>
-              <a:rPr lang="es-CO" sz="1200" b="0" i="0" kern="1200" dirty="0">
-                <a:solidFill>
-                  <a:schemeClr val="tx1"/>
-                </a:solidFill>
-                <a:latin typeface="+mn-lt"/>
-                <a:ea typeface="+mn-ea"/>
-                <a:cs typeface="+mn-cs"/>
-              </a:rPr>
-              <a:t> con que se desarrolla un algoritmo (que seria el </a:t>
-            </a:r>
-            <a:r>
-              <a:rPr lang="es-CO" sz="1200" b="0" i="0" kern="1200" dirty="0" err="1">
-                <a:solidFill>
-                  <a:schemeClr val="tx1"/>
-                </a:solidFill>
-                <a:latin typeface="+mn-lt"/>
-                <a:ea typeface="+mn-ea"/>
-                <a:cs typeface="+mn-cs"/>
-              </a:rPr>
-              <a:t>pseudocodigo</a:t>
-            </a:r>
-            <a:r>
-              <a:rPr lang="es-CO" sz="1200" b="0" i="0" kern="1200" dirty="0">
-                <a:solidFill>
-                  <a:schemeClr val="tx1"/>
-                </a:solidFill>
-                <a:latin typeface="+mn-lt"/>
-                <a:ea typeface="+mn-ea"/>
-                <a:cs typeface="+mn-cs"/>
-              </a:rPr>
-              <a:t>) conocer las funciones disponibles su sintaxis y a que </a:t>
-            </a:r>
-            <a:r>
-              <a:rPr lang="es-CO" sz="1200" b="0" i="0" kern="1200" dirty="0" err="1">
-                <a:solidFill>
-                  <a:schemeClr val="tx1"/>
-                </a:solidFill>
-                <a:latin typeface="+mn-lt"/>
-                <a:ea typeface="+mn-ea"/>
-                <a:cs typeface="+mn-cs"/>
-              </a:rPr>
-              <a:t>complememnto</a:t>
-            </a:r>
-            <a:r>
-              <a:rPr lang="es-CO" sz="1200" b="0" i="0" kern="1200" dirty="0">
-                <a:solidFill>
-                  <a:schemeClr val="tx1"/>
-                </a:solidFill>
-                <a:latin typeface="+mn-lt"/>
-                <a:ea typeface="+mn-ea"/>
-                <a:cs typeface="+mn-cs"/>
-              </a:rPr>
-              <a:t> o </a:t>
-            </a:r>
-            <a:r>
-              <a:rPr lang="es-CO" sz="1200" b="0" i="0" kern="1200" dirty="0" err="1">
-                <a:solidFill>
-                  <a:schemeClr val="tx1"/>
-                </a:solidFill>
-                <a:latin typeface="+mn-lt"/>
-                <a:ea typeface="+mn-ea"/>
-                <a:cs typeface="+mn-cs"/>
-              </a:rPr>
-              <a:t>libreria</a:t>
-            </a:r>
-            <a:r>
-              <a:rPr lang="es-CO" sz="1200" b="0" i="0" kern="1200" dirty="0">
-                <a:solidFill>
-                  <a:schemeClr val="tx1"/>
-                </a:solidFill>
-                <a:latin typeface="+mn-lt"/>
-                <a:ea typeface="+mn-ea"/>
-                <a:cs typeface="+mn-cs"/>
-              </a:rPr>
-              <a:t> pertenecen, ya que esta debe ser incluida en el proyecto.</a:t>
-            </a:r>
-            <a:endParaRPr lang="es-CO" dirty="0"/>
-          </a:p>
-          <a:p>
-            <a:endParaRPr lang="es-CO" dirty="0"/>
-          </a:p>
-        </p:txBody>
-      </p:sp>
-      <p:sp>
-        <p:nvSpPr>
-          <p:cNvPr id="4" name="3 Marcador de número de diapositiva"/>
-          <p:cNvSpPr>
-            <a:spLocks noGrp="1"/>
-          </p:cNvSpPr>
-          <p:nvPr>
-            <p:ph type="sldNum" sz="quarter" idx="10"/>
-          </p:nvPr>
-        </p:nvSpPr>
-        <p:spPr/>
-        <p:txBody>
-          <a:bodyPr/>
-          <a:lstStyle/>
-          <a:p>
-            <a:fld id="{E21E405C-8F13-4C14-8D34-C311A8C5D90E}" type="slidenum">
-              <a:rPr lang="es-CO" smtClean="0"/>
-              <a:pPr/>
-              <a:t>32</a:t>
+              <a:t>31</a:t>
             </a:fld>
             <a:endParaRPr lang="es-CO"/>
           </a:p>
@@ -25984,7 +25687,7 @@
 </p:notes>
 </file>
 
-<file path=ppt/notesSlides/notesSlide9.xml><?xml version="1.0" encoding="utf-8"?>
+<file path=ppt/notesSlides/notesSlide8.xml><?xml version="1.0" encoding="utf-8"?>
 <p:notes xmlns:a="http://schemas.openxmlformats.org/drawingml/2006/main" xmlns:r="http://schemas.openxmlformats.org/officeDocument/2006/relationships" xmlns:p="http://schemas.openxmlformats.org/presentationml/2006/main">
   <p:cSld>
     <p:spTree>
@@ -26052,6 +25755,205 @@
             <a:fld id="{E21E405C-8F13-4C14-8D34-C311A8C5D90E}" type="slidenum">
               <a:rPr lang="es-CO" smtClean="0"/>
               <a:pPr/>
+              <a:t>35</a:t>
+            </a:fld>
+            <a:endParaRPr lang="es-CO"/>
+          </a:p>
+        </p:txBody>
+      </p:sp>
+    </p:spTree>
+    <p:extLst>
+      <p:ext uri="{BB962C8B-B14F-4D97-AF65-F5344CB8AC3E}">
+        <p14:creationId xmlns:p14="http://schemas.microsoft.com/office/powerpoint/2010/main" val="236557878"/>
+      </p:ext>
+    </p:extLst>
+  </p:cSld>
+  <p:clrMapOvr>
+    <a:masterClrMapping/>
+  </p:clrMapOvr>
+</p:notes>
+</file>
+
+<file path=ppt/notesSlides/notesSlide9.xml><?xml version="1.0" encoding="utf-8"?>
+<p:notes xmlns:a="http://schemas.openxmlformats.org/drawingml/2006/main" xmlns:r="http://schemas.openxmlformats.org/officeDocument/2006/relationships" xmlns:p="http://schemas.openxmlformats.org/presentationml/2006/main">
+  <p:cSld>
+    <p:spTree>
+      <p:nvGrpSpPr>
+        <p:cNvPr id="1" name=""/>
+        <p:cNvGrpSpPr/>
+        <p:nvPr/>
+      </p:nvGrpSpPr>
+      <p:grpSpPr>
+        <a:xfrm>
+          <a:off x="0" y="0"/>
+          <a:ext cx="0" cy="0"/>
+          <a:chOff x="0" y="0"/>
+          <a:chExt cx="0" cy="0"/>
+        </a:xfrm>
+      </p:grpSpPr>
+      <p:sp>
+        <p:nvSpPr>
+          <p:cNvPr id="2" name="1 Marcador de imagen de diapositiva"/>
+          <p:cNvSpPr>
+            <a:spLocks noGrp="1" noRot="1" noChangeAspect="1"/>
+          </p:cNvSpPr>
+          <p:nvPr>
+            <p:ph type="sldImg"/>
+          </p:nvPr>
+        </p:nvSpPr>
+        <p:spPr/>
+      </p:sp>
+      <p:sp>
+        <p:nvSpPr>
+          <p:cNvPr id="3" name="2 Marcador de notas"/>
+          <p:cNvSpPr>
+            <a:spLocks noGrp="1"/>
+          </p:cNvSpPr>
+          <p:nvPr>
+            <p:ph type="body" idx="1"/>
+          </p:nvPr>
+        </p:nvSpPr>
+        <p:spPr/>
+        <p:txBody>
+          <a:bodyPr>
+            <a:normAutofit/>
+          </a:bodyPr>
+          <a:lstStyle/>
+          <a:p>
+            <a:pPr marL="0" marR="0" indent="0" algn="l" defTabSz="914400" rtl="0" eaLnBrk="1" fontAlgn="auto" latinLnBrk="0" hangingPunct="1">
+              <a:lnSpc>
+                <a:spcPct val="100000"/>
+              </a:lnSpc>
+              <a:spcBef>
+                <a:spcPts val="0"/>
+              </a:spcBef>
+              <a:spcAft>
+                <a:spcPts val="0"/>
+              </a:spcAft>
+              <a:buClrTx/>
+              <a:buSzTx/>
+              <a:buFontTx/>
+              <a:buNone/>
+              <a:tabLst/>
+              <a:defRPr/>
+            </a:pPr>
+            <a:r>
+              <a:rPr lang="es-CO" sz="1200" b="0" i="0" kern="1200" dirty="0">
+                <a:solidFill>
+                  <a:schemeClr val="tx1"/>
+                </a:solidFill>
+                <a:latin typeface="+mn-lt"/>
+                <a:ea typeface="+mn-ea"/>
+                <a:cs typeface="+mn-cs"/>
+              </a:rPr>
+              <a:t>El </a:t>
+            </a:r>
+            <a:r>
+              <a:rPr lang="es-CO" sz="1200" b="0" i="1" kern="1200" dirty="0">
+                <a:solidFill>
+                  <a:schemeClr val="tx1"/>
+                </a:solidFill>
+                <a:latin typeface="+mn-lt"/>
+                <a:ea typeface="+mn-ea"/>
+                <a:cs typeface="+mn-cs"/>
+              </a:rPr>
+              <a:t>lenguaje máquina</a:t>
+            </a:r>
+            <a:r>
+              <a:rPr lang="es-CO" sz="1200" b="0" i="0" kern="1200" dirty="0">
+                <a:solidFill>
+                  <a:schemeClr val="tx1"/>
+                </a:solidFill>
+                <a:latin typeface="+mn-lt"/>
+                <a:ea typeface="+mn-ea"/>
+                <a:cs typeface="+mn-cs"/>
+              </a:rPr>
+              <a:t> de una </a:t>
+            </a:r>
+            <a:r>
+              <a:rPr lang="es-CO" sz="1200" b="0" i="0" u="none" strike="noStrike" kern="1200" dirty="0">
+                <a:solidFill>
+                  <a:schemeClr val="tx1"/>
+                </a:solidFill>
+                <a:latin typeface="+mn-lt"/>
+                <a:ea typeface="+mn-ea"/>
+                <a:cs typeface="+mn-cs"/>
+                <a:hlinkClick r:id="rId3"/>
+              </a:rPr>
+              <a:t>computadora</a:t>
+            </a:r>
+            <a:r>
+              <a:rPr lang="es-CO" sz="1200" b="0" i="0" kern="1200" dirty="0">
+                <a:solidFill>
+                  <a:schemeClr val="tx1"/>
+                </a:solidFill>
+                <a:latin typeface="+mn-lt"/>
+                <a:ea typeface="+mn-ea"/>
+                <a:cs typeface="+mn-cs"/>
+              </a:rPr>
+              <a:t> consta de cadenas de números binarios (ceros y unos) y es el único que "entienden" directamente los </a:t>
+            </a:r>
+            <a:r>
+              <a:rPr lang="es-CO" sz="1200" b="0" i="0" u="none" strike="noStrike" kern="1200" dirty="0">
+                <a:solidFill>
+                  <a:schemeClr val="tx1"/>
+                </a:solidFill>
+                <a:latin typeface="+mn-lt"/>
+                <a:ea typeface="+mn-ea"/>
+                <a:cs typeface="+mn-cs"/>
+                <a:hlinkClick r:id="rId4"/>
+              </a:rPr>
+              <a:t>procesadores</a:t>
+            </a:r>
+            <a:r>
+              <a:rPr lang="es-CO" sz="1200" b="0" i="0" kern="1200" dirty="0">
+                <a:solidFill>
+                  <a:schemeClr val="tx1"/>
+                </a:solidFill>
+                <a:latin typeface="+mn-lt"/>
+                <a:ea typeface="+mn-ea"/>
+                <a:cs typeface="+mn-cs"/>
+              </a:rPr>
+              <a:t>. </a:t>
+            </a:r>
+            <a:br>
+              <a:rPr lang="es-CO" sz="1200" b="0" i="0" kern="1200" dirty="0">
+                <a:solidFill>
+                  <a:schemeClr val="tx1"/>
+                </a:solidFill>
+                <a:latin typeface="+mn-lt"/>
+                <a:ea typeface="+mn-ea"/>
+                <a:cs typeface="+mn-cs"/>
+              </a:rPr>
+            </a:br>
+            <a:r>
+              <a:rPr lang="es-CO" dirty="0"/>
+              <a:t>Existen dos formas de obtener un código ejecutable a partir de un programa fuente: los intérpretes y los compiladores</a:t>
+            </a:r>
+          </a:p>
+          <a:p>
+            <a:endParaRPr lang="es-CO" dirty="0"/>
+          </a:p>
+        </p:txBody>
+      </p:sp>
+      <p:sp>
+        <p:nvSpPr>
+          <p:cNvPr id="4" name="3 Marcador de número de diapositiva"/>
+          <p:cNvSpPr>
+            <a:spLocks noGrp="1"/>
+          </p:cNvSpPr>
+          <p:nvPr>
+            <p:ph type="sldNum" sz="quarter" idx="10"/>
+          </p:nvPr>
+        </p:nvSpPr>
+        <p:spPr/>
+        <p:txBody>
+          <a:bodyPr/>
+          <a:lstStyle/>
+          <a:p>
+            <a:fld id="{E21E405C-8F13-4C14-8D34-C311A8C5D90E}" type="slidenum">
+              <a:rPr lang="es-CO" smtClean="0"/>
+              <a:pPr/>
               <a:t>36</a:t>
             </a:fld>
             <a:endParaRPr lang="es-CO"/>
@@ -26061,7 +25963,7 @@
     </p:spTree>
     <p:extLst>
       <p:ext uri="{BB962C8B-B14F-4D97-AF65-F5344CB8AC3E}">
-        <p14:creationId xmlns:p14="http://schemas.microsoft.com/office/powerpoint/2010/main" val="236557878"/>
+        <p14:creationId xmlns:p14="http://schemas.microsoft.com/office/powerpoint/2010/main" val="1384588865"/>
       </p:ext>
     </p:extLst>
   </p:cSld>
@@ -26518,7 +26420,7 @@
             <a:fld id="{DCEF22F2-EA04-4B03-8A20-CFDE6BC87E1C}" type="datetimeFigureOut">
               <a:rPr lang="es-CO" smtClean="0"/>
               <a:pPr/>
-              <a:t>1/02/2020</a:t>
+              <a:t>4/02/2020</a:t>
             </a:fld>
             <a:endParaRPr lang="es-CO"/>
           </a:p>
@@ -26703,7 +26605,7 @@
             <a:fld id="{DCEF22F2-EA04-4B03-8A20-CFDE6BC87E1C}" type="datetimeFigureOut">
               <a:rPr lang="es-CO" smtClean="0"/>
               <a:pPr/>
-              <a:t>1/02/2020</a:t>
+              <a:t>4/02/2020</a:t>
             </a:fld>
             <a:endParaRPr lang="es-CO"/>
           </a:p>
@@ -26914,7 +26816,7 @@
             <a:fld id="{DCEF22F2-EA04-4B03-8A20-CFDE6BC87E1C}" type="datetimeFigureOut">
               <a:rPr lang="es-CO" smtClean="0"/>
               <a:pPr/>
-              <a:t>1/02/2020</a:t>
+              <a:t>4/02/2020</a:t>
             </a:fld>
             <a:endParaRPr lang="es-CO"/>
           </a:p>
@@ -27272,7 +27174,7 @@
             <a:fld id="{DCEF22F2-EA04-4B03-8A20-CFDE6BC87E1C}" type="datetimeFigureOut">
               <a:rPr lang="es-CO" smtClean="0"/>
               <a:pPr/>
-              <a:t>1/02/2020</a:t>
+              <a:t>4/02/2020</a:t>
             </a:fld>
             <a:endParaRPr lang="es-CO"/>
           </a:p>
@@ -27565,7 +27467,7 @@
             <a:fld id="{DCEF22F2-EA04-4B03-8A20-CFDE6BC87E1C}" type="datetimeFigureOut">
               <a:rPr lang="es-CO" smtClean="0"/>
               <a:pPr/>
-              <a:t>1/02/2020</a:t>
+              <a:t>4/02/2020</a:t>
             </a:fld>
             <a:endParaRPr lang="es-CO"/>
           </a:p>
@@ -27992,7 +27894,7 @@
             <a:fld id="{DCEF22F2-EA04-4B03-8A20-CFDE6BC87E1C}" type="datetimeFigureOut">
               <a:rPr lang="es-CO" smtClean="0"/>
               <a:pPr/>
-              <a:t>1/02/2020</a:t>
+              <a:t>4/02/2020</a:t>
             </a:fld>
             <a:endParaRPr lang="es-CO"/>
           </a:p>
@@ -28115,7 +28017,7 @@
             <a:fld id="{DCEF22F2-EA04-4B03-8A20-CFDE6BC87E1C}" type="datetimeFigureOut">
               <a:rPr lang="es-CO" smtClean="0"/>
               <a:pPr/>
-              <a:t>1/02/2020</a:t>
+              <a:t>4/02/2020</a:t>
             </a:fld>
             <a:endParaRPr lang="es-CO"/>
           </a:p>
@@ -28215,7 +28117,7 @@
             <a:fld id="{DCEF22F2-EA04-4B03-8A20-CFDE6BC87E1C}" type="datetimeFigureOut">
               <a:rPr lang="es-CO" smtClean="0"/>
               <a:pPr/>
-              <a:t>1/02/2020</a:t>
+              <a:t>4/02/2020</a:t>
             </a:fld>
             <a:endParaRPr lang="es-CO"/>
           </a:p>
@@ -28497,7 +28399,7 @@
             <a:fld id="{DCEF22F2-EA04-4B03-8A20-CFDE6BC87E1C}" type="datetimeFigureOut">
               <a:rPr lang="es-CO" smtClean="0"/>
               <a:pPr/>
-              <a:t>1/02/2020</a:t>
+              <a:t>4/02/2020</a:t>
             </a:fld>
             <a:endParaRPr lang="es-CO"/>
           </a:p>
@@ -28759,7 +28661,7 @@
             <a:fld id="{DCEF22F2-EA04-4B03-8A20-CFDE6BC87E1C}" type="datetimeFigureOut">
               <a:rPr lang="es-CO" smtClean="0"/>
               <a:pPr/>
-              <a:t>1/02/2020</a:t>
+              <a:t>4/02/2020</a:t>
             </a:fld>
             <a:endParaRPr lang="es-CO"/>
           </a:p>
@@ -28977,7 +28879,7 @@
             <a:fld id="{DCEF22F2-EA04-4B03-8A20-CFDE6BC87E1C}" type="datetimeFigureOut">
               <a:rPr lang="es-CO" smtClean="0"/>
               <a:pPr/>
-              <a:t>1/02/2020</a:t>
+              <a:t>4/02/2020</a:t>
             </a:fld>
             <a:endParaRPr lang="es-CO"/>
           </a:p>
@@ -29490,159 +29392,6 @@
           <a:chExt cx="0" cy="0"/>
         </a:xfrm>
       </p:grpSpPr>
-      <p:sp>
-        <p:nvSpPr>
-          <p:cNvPr id="7" name="6 CuadroTexto"/>
-          <p:cNvSpPr txBox="1"/>
-          <p:nvPr/>
-        </p:nvSpPr>
-        <p:spPr>
-          <a:xfrm>
-            <a:off x="251520" y="0"/>
-            <a:ext cx="8640960" cy="707886"/>
-          </a:xfrm>
-          <a:prstGeom prst="rect">
-            <a:avLst/>
-          </a:prstGeom>
-          <a:noFill/>
-        </p:spPr>
-        <p:txBody>
-          <a:bodyPr wrap="square" rtlCol="0">
-            <a:spAutoFit/>
-          </a:bodyPr>
-          <a:lstStyle/>
-          <a:p>
-            <a:pPr algn="ctr"/>
-            <a:r>
-              <a:rPr lang="es-CO" sz="4000" b="1" dirty="0"/>
-              <a:t>¿Qué veremos durante el curso?</a:t>
-            </a:r>
-          </a:p>
-        </p:txBody>
-      </p:sp>
-      <p:pic>
-        <p:nvPicPr>
-          <p:cNvPr id="3074" name="Picture 2"/>
-          <p:cNvPicPr>
-            <a:picLocks noChangeAspect="1" noChangeArrowheads="1"/>
-          </p:cNvPicPr>
-          <p:nvPr/>
-        </p:nvPicPr>
-        <p:blipFill>
-          <a:blip r:embed="rId3" cstate="print">
-            <a:extLst>
-              <a:ext uri="{28A0092B-C50C-407E-A947-70E740481C1C}">
-                <a14:useLocalDpi xmlns:a14="http://schemas.microsoft.com/office/drawing/2010/main" val="0"/>
-              </a:ext>
-            </a:extLst>
-          </a:blip>
-          <a:srcRect/>
-          <a:stretch>
-            <a:fillRect/>
-          </a:stretch>
-        </p:blipFill>
-        <p:spPr bwMode="auto">
-          <a:xfrm>
-            <a:off x="485723" y="1083960"/>
-            <a:ext cx="8388813" cy="4392488"/>
-          </a:xfrm>
-          <a:prstGeom prst="rect">
-            <a:avLst/>
-          </a:prstGeom>
-          <a:noFill/>
-          <a:ln>
-            <a:noFill/>
-          </a:ln>
-          <a:extLst>
-            <a:ext uri="{909E8E84-426E-40DD-AFC4-6F175D3DCCD1}">
-              <a14:hiddenFill xmlns:a14="http://schemas.microsoft.com/office/drawing/2010/main">
-                <a:solidFill>
-                  <a:schemeClr val="accent1"/>
-                </a:solidFill>
-              </a14:hiddenFill>
-            </a:ext>
-            <a:ext uri="{91240B29-F687-4F45-9708-019B960494DF}">
-              <a14:hiddenLine xmlns:a14="http://schemas.microsoft.com/office/drawing/2010/main" w="9525">
-                <a:solidFill>
-                  <a:schemeClr val="tx1"/>
-                </a:solidFill>
-                <a:miter lim="800000"/>
-                <a:headEnd/>
-                <a:tailEnd/>
-              </a14:hiddenLine>
-            </a:ext>
-          </a:extLst>
-        </p:spPr>
-      </p:pic>
-      <p:sp>
-        <p:nvSpPr>
-          <p:cNvPr id="4" name="5 Marcador de número de diapositiva"/>
-          <p:cNvSpPr>
-            <a:spLocks noGrp="1"/>
-          </p:cNvSpPr>
-          <p:nvPr>
-            <p:ph type="sldNum" sz="quarter" idx="12"/>
-          </p:nvPr>
-        </p:nvSpPr>
-        <p:spPr>
-          <a:xfrm>
-            <a:off x="7020272" y="6520259"/>
-            <a:ext cx="2133600" cy="365125"/>
-          </a:xfrm>
-        </p:spPr>
-        <p:txBody>
-          <a:bodyPr/>
-          <a:lstStyle>
-            <a:lvl1pPr>
-              <a:defRPr sz="2000" b="1">
-                <a:solidFill>
-                  <a:schemeClr val="bg2">
-                    <a:lumMod val="25000"/>
-                  </a:schemeClr>
-                </a:solidFill>
-              </a:defRPr>
-            </a:lvl1pPr>
-          </a:lstStyle>
-          <a:p>
-            <a:fld id="{2235B30C-86F8-49BD-820E-4721741473E2}" type="slidenum">
-              <a:rPr lang="es-CO" smtClean="0"/>
-              <a:pPr/>
-              <a:t>11</a:t>
-            </a:fld>
-            <a:endParaRPr lang="es-CO" dirty="0"/>
-          </a:p>
-        </p:txBody>
-      </p:sp>
-    </p:spTree>
-    <p:extLst>
-      <p:ext uri="{BB962C8B-B14F-4D97-AF65-F5344CB8AC3E}">
-        <p14:creationId xmlns:p14="http://schemas.microsoft.com/office/powerpoint/2010/main" val="37180754"/>
-      </p:ext>
-    </p:extLst>
-  </p:cSld>
-  <p:clrMapOvr>
-    <a:masterClrMapping/>
-  </p:clrMapOvr>
-</p:sld>
-</file>
-
-<file path=ppt/slides/slide12.xml><?xml version="1.0" encoding="utf-8"?>
-<p:sld xmlns:a="http://schemas.openxmlformats.org/drawingml/2006/main" xmlns:r="http://schemas.openxmlformats.org/officeDocument/2006/relationships" xmlns:p="http://schemas.openxmlformats.org/presentationml/2006/main">
-  <p:cSld>
-    <p:spTree>
-      <p:nvGrpSpPr>
-        <p:cNvPr id="1" name=""/>
-        <p:cNvGrpSpPr/>
-        <p:nvPr/>
-      </p:nvGrpSpPr>
-      <p:grpSpPr>
-        <a:xfrm>
-          <a:off x="0" y="0"/>
-          <a:ext cx="0" cy="0"/>
-          <a:chOff x="0" y="0"/>
-          <a:chExt cx="0" cy="0"/>
-        </a:xfrm>
-      </p:grpSpPr>
       <p:graphicFrame>
         <p:nvGraphicFramePr>
           <p:cNvPr id="4" name="Marcador de contenido 3"/>
@@ -29718,7 +29467,7 @@
             <a:fld id="{2235B30C-86F8-49BD-820E-4721741473E2}" type="slidenum">
               <a:rPr lang="es-CO" smtClean="0"/>
               <a:pPr/>
-              <a:t>12</a:t>
+              <a:t>11</a:t>
             </a:fld>
             <a:endParaRPr lang="es-CO" dirty="0"/>
           </a:p>
@@ -29737,7 +29486,7 @@
 </p:sld>
 </file>
 
-<file path=ppt/slides/slide13.xml><?xml version="1.0" encoding="utf-8"?>
+<file path=ppt/slides/slide12.xml><?xml version="1.0" encoding="utf-8"?>
 <p:sld xmlns:a="http://schemas.openxmlformats.org/drawingml/2006/main" xmlns:r="http://schemas.openxmlformats.org/officeDocument/2006/relationships" xmlns:p="http://schemas.openxmlformats.org/presentationml/2006/main">
   <p:cSld>
     <p:spTree>
@@ -30079,7 +29828,7 @@
             <a:fld id="{2235B30C-86F8-49BD-820E-4721741473E2}" type="slidenum">
               <a:rPr lang="es-CO" smtClean="0"/>
               <a:pPr/>
-              <a:t>13</a:t>
+              <a:t>12</a:t>
             </a:fld>
             <a:endParaRPr lang="es-CO" dirty="0"/>
           </a:p>
@@ -30098,7 +29847,7 @@
 </p:sld>
 </file>
 
-<file path=ppt/slides/slide14.xml><?xml version="1.0" encoding="utf-8"?>
+<file path=ppt/slides/slide13.xml><?xml version="1.0" encoding="utf-8"?>
 <p:sld xmlns:a="http://schemas.openxmlformats.org/drawingml/2006/main" xmlns:r="http://schemas.openxmlformats.org/officeDocument/2006/relationships" xmlns:p="http://schemas.openxmlformats.org/presentationml/2006/main">
   <p:cSld>
     <p:spTree>
@@ -30189,7 +29938,7 @@
             <a:fld id="{2235B30C-86F8-49BD-820E-4721741473E2}" type="slidenum">
               <a:rPr lang="es-CO" smtClean="0"/>
               <a:pPr/>
-              <a:t>14</a:t>
+              <a:t>13</a:t>
             </a:fld>
             <a:endParaRPr lang="es-CO" dirty="0"/>
           </a:p>
@@ -30208,7 +29957,7 @@
 </p:sld>
 </file>
 
-<file path=ppt/slides/slide15.xml><?xml version="1.0" encoding="utf-8"?>
+<file path=ppt/slides/slide14.xml><?xml version="1.0" encoding="utf-8"?>
 <p:sld xmlns:a="http://schemas.openxmlformats.org/drawingml/2006/main" xmlns:r="http://schemas.openxmlformats.org/officeDocument/2006/relationships" xmlns:p="http://schemas.openxmlformats.org/presentationml/2006/main">
   <p:cSld>
     <p:spTree>
@@ -30418,7 +30167,7 @@
             <a:fld id="{2235B30C-86F8-49BD-820E-4721741473E2}" type="slidenum">
               <a:rPr lang="es-CO" smtClean="0"/>
               <a:pPr/>
-              <a:t>15</a:t>
+              <a:t>14</a:t>
             </a:fld>
             <a:endParaRPr lang="es-CO" dirty="0"/>
           </a:p>
@@ -30437,7 +30186,7 @@
 </p:sld>
 </file>
 
-<file path=ppt/slides/slide16.xml><?xml version="1.0" encoding="utf-8"?>
+<file path=ppt/slides/slide15.xml><?xml version="1.0" encoding="utf-8"?>
 <p:sld xmlns:a="http://schemas.openxmlformats.org/drawingml/2006/main" xmlns:r="http://schemas.openxmlformats.org/officeDocument/2006/relationships" xmlns:p="http://schemas.openxmlformats.org/presentationml/2006/main">
   <p:cSld>
     <p:spTree>
@@ -30643,7 +30392,7 @@
             <a:fld id="{2235B30C-86F8-49BD-820E-4721741473E2}" type="slidenum">
               <a:rPr lang="es-CO" smtClean="0"/>
               <a:pPr/>
-              <a:t>16</a:t>
+              <a:t>15</a:t>
             </a:fld>
             <a:endParaRPr lang="es-CO" dirty="0"/>
           </a:p>
@@ -30662,7 +30411,7 @@
 </p:sld>
 </file>
 
-<file path=ppt/slides/slide17.xml><?xml version="1.0" encoding="utf-8"?>
+<file path=ppt/slides/slide16.xml><?xml version="1.0" encoding="utf-8"?>
 <p:sld xmlns:a="http://schemas.openxmlformats.org/drawingml/2006/main" xmlns:r="http://schemas.openxmlformats.org/officeDocument/2006/relationships" xmlns:p="http://schemas.openxmlformats.org/presentationml/2006/main">
   <p:cSld>
     <p:spTree>
@@ -30810,7 +30559,7 @@
             <a:fld id="{2235B30C-86F8-49BD-820E-4721741473E2}" type="slidenum">
               <a:rPr lang="es-CO" smtClean="0"/>
               <a:pPr/>
-              <a:t>17</a:t>
+              <a:t>16</a:t>
             </a:fld>
             <a:endParaRPr lang="es-CO" dirty="0"/>
           </a:p>
@@ -30829,7 +30578,7 @@
 </p:sld>
 </file>
 
-<file path=ppt/slides/slide18.xml><?xml version="1.0" encoding="utf-8"?>
+<file path=ppt/slides/slide17.xml><?xml version="1.0" encoding="utf-8"?>
 <p:sld xmlns:a="http://schemas.openxmlformats.org/drawingml/2006/main" xmlns:r="http://schemas.openxmlformats.org/officeDocument/2006/relationships" xmlns:p="http://schemas.openxmlformats.org/presentationml/2006/main">
   <p:cSld>
     <p:spTree>
@@ -31016,7 +30765,7 @@
             <a:fld id="{2235B30C-86F8-49BD-820E-4721741473E2}" type="slidenum">
               <a:rPr lang="es-CO" smtClean="0"/>
               <a:pPr/>
-              <a:t>18</a:t>
+              <a:t>17</a:t>
             </a:fld>
             <a:endParaRPr lang="es-CO" dirty="0"/>
           </a:p>
@@ -31035,7 +30784,7 @@
 </p:sld>
 </file>
 
-<file path=ppt/slides/slide19.xml><?xml version="1.0" encoding="utf-8"?>
+<file path=ppt/slides/slide18.xml><?xml version="1.0" encoding="utf-8"?>
 <p:sld xmlns:a="http://schemas.openxmlformats.org/drawingml/2006/main" xmlns:r="http://schemas.openxmlformats.org/officeDocument/2006/relationships" xmlns:p="http://schemas.openxmlformats.org/presentationml/2006/main">
   <p:cSld>
     <p:spTree>
@@ -31232,7 +30981,7 @@
             <a:fld id="{2235B30C-86F8-49BD-820E-4721741473E2}" type="slidenum">
               <a:rPr lang="es-CO" smtClean="0"/>
               <a:pPr/>
-              <a:t>19</a:t>
+              <a:t>18</a:t>
             </a:fld>
             <a:endParaRPr lang="es-CO" dirty="0"/>
           </a:p>
@@ -31251,127 +31000,7 @@
 </p:sld>
 </file>
 
-<file path=ppt/slides/slide2.xml><?xml version="1.0" encoding="utf-8"?>
-<p:sld xmlns:a="http://schemas.openxmlformats.org/drawingml/2006/main" xmlns:r="http://schemas.openxmlformats.org/officeDocument/2006/relationships" xmlns:p="http://schemas.openxmlformats.org/presentationml/2006/main">
-  <p:cSld>
-    <p:spTree>
-      <p:nvGrpSpPr>
-        <p:cNvPr id="1" name=""/>
-        <p:cNvGrpSpPr/>
-        <p:nvPr/>
-      </p:nvGrpSpPr>
-      <p:grpSpPr>
-        <a:xfrm>
-          <a:off x="0" y="0"/>
-          <a:ext cx="0" cy="0"/>
-          <a:chOff x="0" y="0"/>
-          <a:chExt cx="0" cy="0"/>
-        </a:xfrm>
-      </p:grpSpPr>
-      <p:sp>
-        <p:nvSpPr>
-          <p:cNvPr id="4" name="3 Título"/>
-          <p:cNvSpPr>
-            <a:spLocks noGrp="1"/>
-          </p:cNvSpPr>
-          <p:nvPr>
-            <p:ph type="ctrTitle"/>
-          </p:nvPr>
-        </p:nvSpPr>
-        <p:spPr/>
-        <p:txBody>
-          <a:bodyPr>
-            <a:normAutofit fontScale="90000"/>
-          </a:bodyPr>
-          <a:lstStyle/>
-          <a:p>
-            <a:r>
-              <a:rPr lang="es-CO" b="1" dirty="0"/>
-              <a:t>Sesión 1. </a:t>
-            </a:r>
-            <a:br>
-              <a:rPr lang="es-CO" b="1" dirty="0"/>
-            </a:br>
-            <a:r>
-              <a:rPr lang="es-CO" b="1" dirty="0"/>
-              <a:t>Presentación del curso</a:t>
-            </a:r>
-            <a:br>
-              <a:rPr lang="es-CO" b="1" dirty="0"/>
-            </a:br>
-            <a:r>
-              <a:rPr lang="es-CO" b="1" dirty="0"/>
-              <a:t>Revisión conceptos - introducción</a:t>
-            </a:r>
-            <a:br>
-              <a:rPr lang="es-CO" b="1" dirty="0"/>
-            </a:br>
-            <a:endParaRPr lang="es-CO" b="1" dirty="0"/>
-          </a:p>
-        </p:txBody>
-      </p:sp>
-      <p:sp>
-        <p:nvSpPr>
-          <p:cNvPr id="5" name="4 Subtítulo"/>
-          <p:cNvSpPr>
-            <a:spLocks noGrp="1"/>
-          </p:cNvSpPr>
-          <p:nvPr>
-            <p:ph type="subTitle" idx="1"/>
-          </p:nvPr>
-        </p:nvSpPr>
-        <p:spPr/>
-        <p:txBody>
-          <a:bodyPr/>
-          <a:lstStyle/>
-          <a:p>
-            <a:endParaRPr lang="es-CO"/>
-          </a:p>
-        </p:txBody>
-      </p:sp>
-      <p:sp>
-        <p:nvSpPr>
-          <p:cNvPr id="6" name="4 Marcador de número de diapositiva"/>
-          <p:cNvSpPr>
-            <a:spLocks noGrp="1"/>
-          </p:cNvSpPr>
-          <p:nvPr>
-            <p:ph type="sldNum" sz="quarter" idx="12"/>
-          </p:nvPr>
-        </p:nvSpPr>
-        <p:spPr>
-          <a:xfrm>
-            <a:off x="7020272" y="6520259"/>
-            <a:ext cx="2133600" cy="365125"/>
-          </a:xfrm>
-        </p:spPr>
-        <p:txBody>
-          <a:bodyPr/>
-          <a:lstStyle/>
-          <a:p>
-            <a:fld id="{2235B30C-86F8-49BD-820E-4721741473E2}" type="slidenum">
-              <a:rPr lang="es-CO" smtClean="0"/>
-              <a:pPr/>
-              <a:t>2</a:t>
-            </a:fld>
-            <a:endParaRPr lang="es-CO"/>
-          </a:p>
-        </p:txBody>
-      </p:sp>
-    </p:spTree>
-    <p:extLst>
-      <p:ext uri="{BB962C8B-B14F-4D97-AF65-F5344CB8AC3E}">
-        <p14:creationId xmlns:p14="http://schemas.microsoft.com/office/powerpoint/2010/main" val="3587264318"/>
-      </p:ext>
-    </p:extLst>
-  </p:cSld>
-  <p:clrMapOvr>
-    <a:masterClrMapping/>
-  </p:clrMapOvr>
-</p:sld>
-</file>
-
-<file path=ppt/slides/slide20.xml><?xml version="1.0" encoding="utf-8"?>
+<file path=ppt/slides/slide19.xml><?xml version="1.0" encoding="utf-8"?>
 <p:sld xmlns:a="http://schemas.openxmlformats.org/drawingml/2006/main" xmlns:r="http://schemas.openxmlformats.org/officeDocument/2006/relationships" xmlns:p="http://schemas.openxmlformats.org/presentationml/2006/main">
   <p:cSld>
     <p:spTree>
@@ -31732,7 +31361,7 @@
             <a:fld id="{2235B30C-86F8-49BD-820E-4721741473E2}" type="slidenum">
               <a:rPr lang="es-CO" smtClean="0"/>
               <a:pPr/>
-              <a:t>20</a:t>
+              <a:t>19</a:t>
             </a:fld>
             <a:endParaRPr lang="es-CO" dirty="0"/>
           </a:p>
@@ -31883,7 +31512,127 @@
 </p:sld>
 </file>
 
-<file path=ppt/slides/slide21.xml><?xml version="1.0" encoding="utf-8"?>
+<file path=ppt/slides/slide2.xml><?xml version="1.0" encoding="utf-8"?>
+<p:sld xmlns:a="http://schemas.openxmlformats.org/drawingml/2006/main" xmlns:r="http://schemas.openxmlformats.org/officeDocument/2006/relationships" xmlns:p="http://schemas.openxmlformats.org/presentationml/2006/main">
+  <p:cSld>
+    <p:spTree>
+      <p:nvGrpSpPr>
+        <p:cNvPr id="1" name=""/>
+        <p:cNvGrpSpPr/>
+        <p:nvPr/>
+      </p:nvGrpSpPr>
+      <p:grpSpPr>
+        <a:xfrm>
+          <a:off x="0" y="0"/>
+          <a:ext cx="0" cy="0"/>
+          <a:chOff x="0" y="0"/>
+          <a:chExt cx="0" cy="0"/>
+        </a:xfrm>
+      </p:grpSpPr>
+      <p:sp>
+        <p:nvSpPr>
+          <p:cNvPr id="4" name="3 Título"/>
+          <p:cNvSpPr>
+            <a:spLocks noGrp="1"/>
+          </p:cNvSpPr>
+          <p:nvPr>
+            <p:ph type="ctrTitle"/>
+          </p:nvPr>
+        </p:nvSpPr>
+        <p:spPr/>
+        <p:txBody>
+          <a:bodyPr>
+            <a:normAutofit fontScale="90000"/>
+          </a:bodyPr>
+          <a:lstStyle/>
+          <a:p>
+            <a:r>
+              <a:rPr lang="es-CO" b="1" dirty="0"/>
+              <a:t>Sesión 1. </a:t>
+            </a:r>
+            <a:br>
+              <a:rPr lang="es-CO" b="1" dirty="0"/>
+            </a:br>
+            <a:r>
+              <a:rPr lang="es-CO" b="1" dirty="0"/>
+              <a:t>Presentación del curso</a:t>
+            </a:r>
+            <a:br>
+              <a:rPr lang="es-CO" b="1" dirty="0"/>
+            </a:br>
+            <a:r>
+              <a:rPr lang="es-CO" b="1" dirty="0"/>
+              <a:t>Revisión conceptos - introducción</a:t>
+            </a:r>
+            <a:br>
+              <a:rPr lang="es-CO" b="1" dirty="0"/>
+            </a:br>
+            <a:endParaRPr lang="es-CO" b="1" dirty="0"/>
+          </a:p>
+        </p:txBody>
+      </p:sp>
+      <p:sp>
+        <p:nvSpPr>
+          <p:cNvPr id="5" name="4 Subtítulo"/>
+          <p:cNvSpPr>
+            <a:spLocks noGrp="1"/>
+          </p:cNvSpPr>
+          <p:nvPr>
+            <p:ph type="subTitle" idx="1"/>
+          </p:nvPr>
+        </p:nvSpPr>
+        <p:spPr/>
+        <p:txBody>
+          <a:bodyPr/>
+          <a:lstStyle/>
+          <a:p>
+            <a:endParaRPr lang="es-CO"/>
+          </a:p>
+        </p:txBody>
+      </p:sp>
+      <p:sp>
+        <p:nvSpPr>
+          <p:cNvPr id="6" name="4 Marcador de número de diapositiva"/>
+          <p:cNvSpPr>
+            <a:spLocks noGrp="1"/>
+          </p:cNvSpPr>
+          <p:nvPr>
+            <p:ph type="sldNum" sz="quarter" idx="12"/>
+          </p:nvPr>
+        </p:nvSpPr>
+        <p:spPr>
+          <a:xfrm>
+            <a:off x="7020272" y="6520259"/>
+            <a:ext cx="2133600" cy="365125"/>
+          </a:xfrm>
+        </p:spPr>
+        <p:txBody>
+          <a:bodyPr/>
+          <a:lstStyle/>
+          <a:p>
+            <a:fld id="{2235B30C-86F8-49BD-820E-4721741473E2}" type="slidenum">
+              <a:rPr lang="es-CO" smtClean="0"/>
+              <a:pPr/>
+              <a:t>2</a:t>
+            </a:fld>
+            <a:endParaRPr lang="es-CO"/>
+          </a:p>
+        </p:txBody>
+      </p:sp>
+    </p:spTree>
+    <p:extLst>
+      <p:ext uri="{BB962C8B-B14F-4D97-AF65-F5344CB8AC3E}">
+        <p14:creationId xmlns:p14="http://schemas.microsoft.com/office/powerpoint/2010/main" val="3587264318"/>
+      </p:ext>
+    </p:extLst>
+  </p:cSld>
+  <p:clrMapOvr>
+    <a:masterClrMapping/>
+  </p:clrMapOvr>
+</p:sld>
+</file>
+
+<file path=ppt/slides/slide20.xml><?xml version="1.0" encoding="utf-8"?>
 <p:sld xmlns:a="http://schemas.openxmlformats.org/drawingml/2006/main" xmlns:r="http://schemas.openxmlformats.org/officeDocument/2006/relationships" xmlns:p="http://schemas.openxmlformats.org/presentationml/2006/main">
   <p:cSld>
     <p:spTree>
@@ -32375,7 +32124,7 @@
             <a:fld id="{2235B30C-86F8-49BD-820E-4721741473E2}" type="slidenum">
               <a:rPr lang="es-CO" smtClean="0"/>
               <a:pPr/>
-              <a:t>21</a:t>
+              <a:t>20</a:t>
             </a:fld>
             <a:endParaRPr lang="es-CO" dirty="0"/>
           </a:p>
@@ -32394,7 +32143,7 @@
 </p:sld>
 </file>
 
-<file path=ppt/slides/slide22.xml><?xml version="1.0" encoding="utf-8"?>
+<file path=ppt/slides/slide21.xml><?xml version="1.0" encoding="utf-8"?>
 <p:sld xmlns:a="http://schemas.openxmlformats.org/drawingml/2006/main" xmlns:r="http://schemas.openxmlformats.org/officeDocument/2006/relationships" xmlns:p="http://schemas.openxmlformats.org/presentationml/2006/main">
   <p:cSld>
     <p:spTree>
@@ -32636,7 +32385,7 @@
             <a:fld id="{2235B30C-86F8-49BD-820E-4721741473E2}" type="slidenum">
               <a:rPr lang="es-CO" smtClean="0"/>
               <a:pPr/>
-              <a:t>22</a:t>
+              <a:t>21</a:t>
             </a:fld>
             <a:endParaRPr lang="es-CO" dirty="0"/>
           </a:p>
@@ -32655,7 +32404,7 @@
 </p:sld>
 </file>
 
-<file path=ppt/slides/slide23.xml><?xml version="1.0" encoding="utf-8"?>
+<file path=ppt/slides/slide22.xml><?xml version="1.0" encoding="utf-8"?>
 <p:sld xmlns:a="http://schemas.openxmlformats.org/drawingml/2006/main" xmlns:r="http://schemas.openxmlformats.org/officeDocument/2006/relationships" xmlns:p="http://schemas.openxmlformats.org/presentationml/2006/main">
   <p:cSld>
     <p:spTree>
@@ -32871,7 +32620,7 @@
             <a:fld id="{2235B30C-86F8-49BD-820E-4721741473E2}" type="slidenum">
               <a:rPr lang="es-CO" smtClean="0"/>
               <a:pPr/>
-              <a:t>23</a:t>
+              <a:t>22</a:t>
             </a:fld>
             <a:endParaRPr lang="es-CO" dirty="0"/>
           </a:p>
@@ -32890,7 +32639,7 @@
 </p:sld>
 </file>
 
-<file path=ppt/slides/slide24.xml><?xml version="1.0" encoding="utf-8"?>
+<file path=ppt/slides/slide23.xml><?xml version="1.0" encoding="utf-8"?>
 <p:sld xmlns:a="http://schemas.openxmlformats.org/drawingml/2006/main" xmlns:r="http://schemas.openxmlformats.org/officeDocument/2006/relationships" xmlns:p="http://schemas.openxmlformats.org/presentationml/2006/main">
   <p:cSld>
     <p:spTree>
@@ -33103,7 +32852,7 @@
             <a:fld id="{2235B30C-86F8-49BD-820E-4721741473E2}" type="slidenum">
               <a:rPr lang="es-CO" smtClean="0"/>
               <a:pPr/>
-              <a:t>24</a:t>
+              <a:t>23</a:t>
             </a:fld>
             <a:endParaRPr lang="es-CO" dirty="0"/>
           </a:p>
@@ -33122,7 +32871,7 @@
 </p:sld>
 </file>
 
-<file path=ppt/slides/slide25.xml><?xml version="1.0" encoding="utf-8"?>
+<file path=ppt/slides/slide24.xml><?xml version="1.0" encoding="utf-8"?>
 <p:sld xmlns:a="http://schemas.openxmlformats.org/drawingml/2006/main" xmlns:r="http://schemas.openxmlformats.org/officeDocument/2006/relationships" xmlns:p="http://schemas.openxmlformats.org/presentationml/2006/main">
   <p:cSld>
     <p:spTree>
@@ -33382,7 +33131,7 @@
             <a:fld id="{2235B30C-86F8-49BD-820E-4721741473E2}" type="slidenum">
               <a:rPr lang="es-CO" smtClean="0"/>
               <a:pPr/>
-              <a:t>25</a:t>
+              <a:t>24</a:t>
             </a:fld>
             <a:endParaRPr lang="es-CO" dirty="0"/>
           </a:p>
@@ -33537,7 +33286,7 @@
 </p:sld>
 </file>
 
-<file path=ppt/slides/slide26.xml><?xml version="1.0" encoding="utf-8"?>
+<file path=ppt/slides/slide25.xml><?xml version="1.0" encoding="utf-8"?>
 <p:sld xmlns:a="http://schemas.openxmlformats.org/drawingml/2006/main" xmlns:r="http://schemas.openxmlformats.org/officeDocument/2006/relationships" xmlns:p="http://schemas.openxmlformats.org/presentationml/2006/main">
   <p:cSld>
     <p:spTree>
@@ -33608,7 +33357,7 @@
 </p:sld>
 </file>
 
-<file path=ppt/slides/slide27.xml><?xml version="1.0" encoding="utf-8"?>
+<file path=ppt/slides/slide26.xml><?xml version="1.0" encoding="utf-8"?>
 <p:sld xmlns:a="http://schemas.openxmlformats.org/drawingml/2006/main" xmlns:r="http://schemas.openxmlformats.org/officeDocument/2006/relationships" xmlns:p="http://schemas.openxmlformats.org/presentationml/2006/main">
   <p:cSld>
     <p:spTree>
@@ -33662,7 +33411,7 @@
             <a:fld id="{2235B30C-86F8-49BD-820E-4721741473E2}" type="slidenum">
               <a:rPr lang="es-CO" smtClean="0"/>
               <a:pPr/>
-              <a:t>27</a:t>
+              <a:t>26</a:t>
             </a:fld>
             <a:endParaRPr lang="es-CO"/>
           </a:p>
@@ -33796,7 +33545,7 @@
 </p:sld>
 </file>
 
-<file path=ppt/slides/slide28.xml><?xml version="1.0" encoding="utf-8"?>
+<file path=ppt/slides/slide27.xml><?xml version="1.0" encoding="utf-8"?>
 <p:sld xmlns:a="http://schemas.openxmlformats.org/drawingml/2006/main" xmlns:r="http://schemas.openxmlformats.org/officeDocument/2006/relationships" xmlns:p="http://schemas.openxmlformats.org/presentationml/2006/main">
   <p:cSld>
     <p:spTree>
@@ -33850,7 +33599,7 @@
             <a:fld id="{2235B30C-86F8-49BD-820E-4721741473E2}" type="slidenum">
               <a:rPr lang="es-CO" smtClean="0"/>
               <a:pPr/>
-              <a:t>28</a:t>
+              <a:t>27</a:t>
             </a:fld>
             <a:endParaRPr lang="es-CO"/>
           </a:p>
@@ -35197,7 +34946,7 @@
 </p:sld>
 </file>
 
-<file path=ppt/slides/slide29.xml><?xml version="1.0" encoding="utf-8"?>
+<file path=ppt/slides/slide28.xml><?xml version="1.0" encoding="utf-8"?>
 <p:sld xmlns:a="http://schemas.openxmlformats.org/drawingml/2006/main" xmlns:r="http://schemas.openxmlformats.org/officeDocument/2006/relationships" xmlns:p="http://schemas.openxmlformats.org/presentationml/2006/main">
   <p:cSld>
     <p:spTree>
@@ -35283,7 +35032,7 @@
             <a:fld id="{2235B30C-86F8-49BD-820E-4721741473E2}" type="slidenum">
               <a:rPr lang="es-CO" smtClean="0"/>
               <a:pPr/>
-              <a:t>29</a:t>
+              <a:t>28</a:t>
             </a:fld>
             <a:endParaRPr lang="es-CO"/>
           </a:p>
@@ -35715,118 +35464,7 @@
 </p:sld>
 </file>
 
-<file path=ppt/slides/slide3.xml><?xml version="1.0" encoding="utf-8"?>
-<p:sld xmlns:a="http://schemas.openxmlformats.org/drawingml/2006/main" xmlns:r="http://schemas.openxmlformats.org/officeDocument/2006/relationships" xmlns:p="http://schemas.openxmlformats.org/presentationml/2006/main">
-  <p:cSld>
-    <p:spTree>
-      <p:nvGrpSpPr>
-        <p:cNvPr id="1" name=""/>
-        <p:cNvGrpSpPr/>
-        <p:nvPr/>
-      </p:nvGrpSpPr>
-      <p:grpSpPr>
-        <a:xfrm>
-          <a:off x="0" y="0"/>
-          <a:ext cx="0" cy="0"/>
-          <a:chOff x="0" y="0"/>
-          <a:chExt cx="0" cy="0"/>
-        </a:xfrm>
-      </p:grpSpPr>
-      <p:graphicFrame>
-        <p:nvGraphicFramePr>
-          <p:cNvPr id="4" name="3 Marcador de contenido"/>
-          <p:cNvGraphicFramePr>
-            <a:graphicFrameLocks noGrp="1"/>
-          </p:cNvGraphicFramePr>
-          <p:nvPr>
-            <p:ph idx="1"/>
-          </p:nvPr>
-        </p:nvGraphicFramePr>
-        <p:xfrm>
-          <a:off x="0" y="785626"/>
-          <a:ext cx="8928992" cy="5361459"/>
-        </p:xfrm>
-        <a:graphic>
-          <a:graphicData uri="http://schemas.openxmlformats.org/drawingml/2006/diagram">
-            <dgm:relIds xmlns:dgm="http://schemas.openxmlformats.org/drawingml/2006/diagram" xmlns:r="http://schemas.openxmlformats.org/officeDocument/2006/relationships" r:dm="rId2" r:lo="rId3" r:qs="rId4" r:cs="rId5"/>
-          </a:graphicData>
-        </a:graphic>
-      </p:graphicFrame>
-      <p:sp>
-        <p:nvSpPr>
-          <p:cNvPr id="3" name="2 Título"/>
-          <p:cNvSpPr>
-            <a:spLocks noGrp="1"/>
-          </p:cNvSpPr>
-          <p:nvPr>
-            <p:ph type="title"/>
-          </p:nvPr>
-        </p:nvSpPr>
-        <p:spPr/>
-        <p:txBody>
-          <a:bodyPr/>
-          <a:lstStyle/>
-          <a:p>
-            <a:r>
-              <a:rPr lang="es-CO" dirty="0"/>
-              <a:t>¿Qué haremos hoy?</a:t>
-            </a:r>
-          </a:p>
-        </p:txBody>
-      </p:sp>
-      <p:sp>
-        <p:nvSpPr>
-          <p:cNvPr id="6" name="5 Marcador de número de diapositiva"/>
-          <p:cNvSpPr>
-            <a:spLocks noGrp="1"/>
-          </p:cNvSpPr>
-          <p:nvPr>
-            <p:ph type="sldNum" sz="quarter" idx="12"/>
-          </p:nvPr>
-        </p:nvSpPr>
-        <p:spPr>
-          <a:xfrm>
-            <a:off x="7020272" y="6520259"/>
-            <a:ext cx="2133600" cy="365125"/>
-          </a:xfrm>
-        </p:spPr>
-        <p:txBody>
-          <a:bodyPr/>
-          <a:lstStyle>
-            <a:lvl1pPr>
-              <a:defRPr sz="2000" b="1">
-                <a:solidFill>
-                  <a:schemeClr val="bg2">
-                    <a:lumMod val="25000"/>
-                  </a:schemeClr>
-                </a:solidFill>
-              </a:defRPr>
-            </a:lvl1pPr>
-          </a:lstStyle>
-          <a:p>
-            <a:fld id="{2235B30C-86F8-49BD-820E-4721741473E2}" type="slidenum">
-              <a:rPr lang="es-CO" smtClean="0"/>
-              <a:pPr/>
-              <a:t>3</a:t>
-            </a:fld>
-            <a:endParaRPr lang="es-CO" dirty="0"/>
-          </a:p>
-        </p:txBody>
-      </p:sp>
-    </p:spTree>
-    <p:extLst>
-      <p:ext uri="{BB962C8B-B14F-4D97-AF65-F5344CB8AC3E}">
-        <p14:creationId xmlns:p14="http://schemas.microsoft.com/office/powerpoint/2010/main" val="1802172790"/>
-      </p:ext>
-    </p:extLst>
-  </p:cSld>
-  <p:clrMapOvr>
-    <a:masterClrMapping/>
-  </p:clrMapOvr>
-</p:sld>
-</file>
-
-<file path=ppt/slides/slide30.xml><?xml version="1.0" encoding="utf-8"?>
+<file path=ppt/slides/slide29.xml><?xml version="1.0" encoding="utf-8"?>
 <p:sld xmlns:a="http://schemas.openxmlformats.org/drawingml/2006/main" xmlns:r="http://schemas.openxmlformats.org/officeDocument/2006/relationships" xmlns:p="http://schemas.openxmlformats.org/presentationml/2006/main">
   <p:cSld>
     <p:spTree>
@@ -35880,7 +35518,7 @@
             <a:fld id="{2235B30C-86F8-49BD-820E-4721741473E2}" type="slidenum">
               <a:rPr lang="es-CO" smtClean="0"/>
               <a:pPr/>
-              <a:t>30</a:t>
+              <a:t>29</a:t>
             </a:fld>
             <a:endParaRPr lang="es-CO"/>
           </a:p>
@@ -36251,7 +35889,118 @@
 </p:sld>
 </file>
 
-<file path=ppt/slides/slide31.xml><?xml version="1.0" encoding="utf-8"?>
+<file path=ppt/slides/slide3.xml><?xml version="1.0" encoding="utf-8"?>
+<p:sld xmlns:a="http://schemas.openxmlformats.org/drawingml/2006/main" xmlns:r="http://schemas.openxmlformats.org/officeDocument/2006/relationships" xmlns:p="http://schemas.openxmlformats.org/presentationml/2006/main">
+  <p:cSld>
+    <p:spTree>
+      <p:nvGrpSpPr>
+        <p:cNvPr id="1" name=""/>
+        <p:cNvGrpSpPr/>
+        <p:nvPr/>
+      </p:nvGrpSpPr>
+      <p:grpSpPr>
+        <a:xfrm>
+          <a:off x="0" y="0"/>
+          <a:ext cx="0" cy="0"/>
+          <a:chOff x="0" y="0"/>
+          <a:chExt cx="0" cy="0"/>
+        </a:xfrm>
+      </p:grpSpPr>
+      <p:graphicFrame>
+        <p:nvGraphicFramePr>
+          <p:cNvPr id="4" name="3 Marcador de contenido"/>
+          <p:cNvGraphicFramePr>
+            <a:graphicFrameLocks noGrp="1"/>
+          </p:cNvGraphicFramePr>
+          <p:nvPr>
+            <p:ph idx="1"/>
+          </p:nvPr>
+        </p:nvGraphicFramePr>
+        <p:xfrm>
+          <a:off x="0" y="785626"/>
+          <a:ext cx="8928992" cy="5361459"/>
+        </p:xfrm>
+        <a:graphic>
+          <a:graphicData uri="http://schemas.openxmlformats.org/drawingml/2006/diagram">
+            <dgm:relIds xmlns:dgm="http://schemas.openxmlformats.org/drawingml/2006/diagram" xmlns:r="http://schemas.openxmlformats.org/officeDocument/2006/relationships" r:dm="rId2" r:lo="rId3" r:qs="rId4" r:cs="rId5"/>
+          </a:graphicData>
+        </a:graphic>
+      </p:graphicFrame>
+      <p:sp>
+        <p:nvSpPr>
+          <p:cNvPr id="3" name="2 Título"/>
+          <p:cNvSpPr>
+            <a:spLocks noGrp="1"/>
+          </p:cNvSpPr>
+          <p:nvPr>
+            <p:ph type="title"/>
+          </p:nvPr>
+        </p:nvSpPr>
+        <p:spPr/>
+        <p:txBody>
+          <a:bodyPr/>
+          <a:lstStyle/>
+          <a:p>
+            <a:r>
+              <a:rPr lang="es-CO" dirty="0"/>
+              <a:t>¿Qué haremos hoy?</a:t>
+            </a:r>
+          </a:p>
+        </p:txBody>
+      </p:sp>
+      <p:sp>
+        <p:nvSpPr>
+          <p:cNvPr id="6" name="5 Marcador de número de diapositiva"/>
+          <p:cNvSpPr>
+            <a:spLocks noGrp="1"/>
+          </p:cNvSpPr>
+          <p:nvPr>
+            <p:ph type="sldNum" sz="quarter" idx="12"/>
+          </p:nvPr>
+        </p:nvSpPr>
+        <p:spPr>
+          <a:xfrm>
+            <a:off x="7020272" y="6520259"/>
+            <a:ext cx="2133600" cy="365125"/>
+          </a:xfrm>
+        </p:spPr>
+        <p:txBody>
+          <a:bodyPr/>
+          <a:lstStyle>
+            <a:lvl1pPr>
+              <a:defRPr sz="2000" b="1">
+                <a:solidFill>
+                  <a:schemeClr val="bg2">
+                    <a:lumMod val="25000"/>
+                  </a:schemeClr>
+                </a:solidFill>
+              </a:defRPr>
+            </a:lvl1pPr>
+          </a:lstStyle>
+          <a:p>
+            <a:fld id="{2235B30C-86F8-49BD-820E-4721741473E2}" type="slidenum">
+              <a:rPr lang="es-CO" smtClean="0"/>
+              <a:pPr/>
+              <a:t>3</a:t>
+            </a:fld>
+            <a:endParaRPr lang="es-CO" dirty="0"/>
+          </a:p>
+        </p:txBody>
+      </p:sp>
+    </p:spTree>
+    <p:extLst>
+      <p:ext uri="{BB962C8B-B14F-4D97-AF65-F5344CB8AC3E}">
+        <p14:creationId xmlns:p14="http://schemas.microsoft.com/office/powerpoint/2010/main" val="1802172790"/>
+      </p:ext>
+    </p:extLst>
+  </p:cSld>
+  <p:clrMapOvr>
+    <a:masterClrMapping/>
+  </p:clrMapOvr>
+</p:sld>
+</file>
+
+<file path=ppt/slides/slide30.xml><?xml version="1.0" encoding="utf-8"?>
 <p:sld xmlns:a="http://schemas.openxmlformats.org/drawingml/2006/main" xmlns:r="http://schemas.openxmlformats.org/officeDocument/2006/relationships" xmlns:p="http://schemas.openxmlformats.org/presentationml/2006/main">
   <p:cSld>
     <p:spTree>
@@ -36308,7 +36057,7 @@
             <a:fld id="{2235B30C-86F8-49BD-820E-4721741473E2}" type="slidenum">
               <a:rPr lang="es-CO" smtClean="0"/>
               <a:pPr/>
-              <a:t>31</a:t>
+              <a:t>30</a:t>
             </a:fld>
             <a:endParaRPr lang="es-CO"/>
           </a:p>
@@ -36432,7 +36181,7 @@
 </p:sld>
 </file>
 
-<file path=ppt/slides/slide32.xml><?xml version="1.0" encoding="utf-8"?>
+<file path=ppt/slides/slide31.xml><?xml version="1.0" encoding="utf-8"?>
 <p:sld xmlns:a="http://schemas.openxmlformats.org/drawingml/2006/main" xmlns:r="http://schemas.openxmlformats.org/officeDocument/2006/relationships" xmlns:p="http://schemas.openxmlformats.org/presentationml/2006/main">
   <p:cSld>
     <p:spTree>
@@ -36494,7 +36243,7 @@
             <a:fld id="{2235B30C-86F8-49BD-820E-4721741473E2}" type="slidenum">
               <a:rPr lang="es-CO" smtClean="0"/>
               <a:pPr/>
-              <a:t>32</a:t>
+              <a:t>31</a:t>
             </a:fld>
             <a:endParaRPr lang="es-CO"/>
           </a:p>
@@ -37044,7 +36793,7 @@
 </p:sld>
 </file>
 
-<file path=ppt/slides/slide33.xml><?xml version="1.0" encoding="utf-8"?>
+<file path=ppt/slides/slide32.xml><?xml version="1.0" encoding="utf-8"?>
 <p:sld xmlns:a="http://schemas.openxmlformats.org/drawingml/2006/main" xmlns:r="http://schemas.openxmlformats.org/officeDocument/2006/relationships" xmlns:p="http://schemas.openxmlformats.org/presentationml/2006/main">
   <p:cSld>
     <p:spTree>
@@ -38260,7 +38009,7 @@
             <a:fld id="{2235B30C-86F8-49BD-820E-4721741473E2}" type="slidenum">
               <a:rPr lang="es-CO" smtClean="0"/>
               <a:pPr/>
-              <a:t>33</a:t>
+              <a:t>32</a:t>
             </a:fld>
             <a:endParaRPr lang="es-CO"/>
           </a:p>
@@ -39087,7 +38836,7 @@
 </p:sld>
 </file>
 
-<file path=ppt/slides/slide34.xml><?xml version="1.0" encoding="utf-8"?>
+<file path=ppt/slides/slide33.xml><?xml version="1.0" encoding="utf-8"?>
 <p:sld xmlns:a="http://schemas.openxmlformats.org/drawingml/2006/main" xmlns:r="http://schemas.openxmlformats.org/officeDocument/2006/relationships" xmlns:p="http://schemas.openxmlformats.org/presentationml/2006/main">
   <p:cSld>
     <p:spTree>
@@ -39165,7 +38914,7 @@
             <a:fld id="{2235B30C-86F8-49BD-820E-4721741473E2}" type="slidenum">
               <a:rPr lang="es-CO" smtClean="0"/>
               <a:pPr/>
-              <a:t>34</a:t>
+              <a:t>33</a:t>
             </a:fld>
             <a:endParaRPr lang="es-CO"/>
           </a:p>
@@ -39184,7 +38933,7 @@
 </p:sld>
 </file>
 
-<file path=ppt/slides/slide35.xml><?xml version="1.0" encoding="utf-8"?>
+<file path=ppt/slides/slide34.xml><?xml version="1.0" encoding="utf-8"?>
 <p:sld xmlns:a="http://schemas.openxmlformats.org/drawingml/2006/main" xmlns:r="http://schemas.openxmlformats.org/officeDocument/2006/relationships" xmlns:p="http://schemas.openxmlformats.org/presentationml/2006/main">
   <p:cSld>
     <p:spTree>
@@ -39251,7 +39000,7 @@
             <a:fld id="{2235B30C-86F8-49BD-820E-4721741473E2}" type="slidenum">
               <a:rPr lang="es-CO" smtClean="0"/>
               <a:pPr/>
-              <a:t>35</a:t>
+              <a:t>34</a:t>
             </a:fld>
             <a:endParaRPr lang="es-CO"/>
           </a:p>
@@ -39323,7 +39072,7 @@
 </p:sld>
 </file>
 
-<file path=ppt/slides/slide36.xml><?xml version="1.0" encoding="utf-8"?>
+<file path=ppt/slides/slide35.xml><?xml version="1.0" encoding="utf-8"?>
 <p:sld xmlns:a="http://schemas.openxmlformats.org/drawingml/2006/main" xmlns:r="http://schemas.openxmlformats.org/officeDocument/2006/relationships" xmlns:p="http://schemas.openxmlformats.org/presentationml/2006/main">
   <p:cSld>
     <p:spTree>
@@ -39385,7 +39134,7 @@
             <a:fld id="{2235B30C-86F8-49BD-820E-4721741473E2}" type="slidenum">
               <a:rPr lang="es-CO" smtClean="0"/>
               <a:pPr/>
-              <a:t>36</a:t>
+              <a:t>35</a:t>
             </a:fld>
             <a:endParaRPr lang="es-CO"/>
           </a:p>
@@ -40556,7 +40305,7 @@
 </p:sld>
 </file>
 
-<file path=ppt/slides/slide37.xml><?xml version="1.0" encoding="utf-8"?>
+<file path=ppt/slides/slide36.xml><?xml version="1.0" encoding="utf-8"?>
 <p:sld xmlns:a="http://schemas.openxmlformats.org/drawingml/2006/main" xmlns:r="http://schemas.openxmlformats.org/officeDocument/2006/relationships" xmlns:p="http://schemas.openxmlformats.org/presentationml/2006/main">
   <p:cSld>
     <p:spTree>
@@ -41394,7 +41143,7 @@
             <a:fld id="{2235B30C-86F8-49BD-820E-4721741473E2}" type="slidenum">
               <a:rPr lang="es-CO" smtClean="0"/>
               <a:pPr/>
-              <a:t>37</a:t>
+              <a:t>36</a:t>
             </a:fld>
             <a:endParaRPr lang="es-CO"/>
           </a:p>
@@ -42111,7 +41860,7 @@
 </p:sld>
 </file>
 
-<file path=ppt/slides/slide38.xml><?xml version="1.0" encoding="utf-8"?>
+<file path=ppt/slides/slide37.xml><?xml version="1.0" encoding="utf-8"?>
 <p:sld xmlns:a="http://schemas.openxmlformats.org/drawingml/2006/main" xmlns:r="http://schemas.openxmlformats.org/officeDocument/2006/relationships" xmlns:p="http://schemas.openxmlformats.org/presentationml/2006/main">
   <p:cSld>
     <p:spTree>
@@ -42166,7 +41915,7 @@
             <a:fld id="{2235B30C-86F8-49BD-820E-4721741473E2}" type="slidenum">
               <a:rPr lang="es-CO" smtClean="0"/>
               <a:pPr/>
-              <a:t>38</a:t>
+              <a:t>37</a:t>
             </a:fld>
             <a:endParaRPr lang="es-CO"/>
           </a:p>
@@ -42207,7 +41956,7 @@
 </p:sld>
 </file>
 
-<file path=ppt/slides/slide39.xml><?xml version="1.0" encoding="utf-8"?>
+<file path=ppt/slides/slide38.xml><?xml version="1.0" encoding="utf-8"?>
 <p:sld xmlns:a="http://schemas.openxmlformats.org/drawingml/2006/main" xmlns:r="http://schemas.openxmlformats.org/officeDocument/2006/relationships" xmlns:p="http://schemas.openxmlformats.org/presentationml/2006/main">
   <p:cSld>
     <p:spTree>
@@ -42242,7 +41991,7 @@
             <a:fld id="{2235B30C-86F8-49BD-820E-4721741473E2}" type="slidenum">
               <a:rPr lang="es-CO" smtClean="0"/>
               <a:pPr/>
-              <a:t>39</a:t>
+              <a:t>38</a:t>
             </a:fld>
             <a:endParaRPr lang="es-CO"/>
           </a:p>
@@ -43269,6 +43018,132 @@
 </p:sld>
 </file>
 
+<file path=ppt/slides/slide39.xml><?xml version="1.0" encoding="utf-8"?>
+<p:sld xmlns:a="http://schemas.openxmlformats.org/drawingml/2006/main" xmlns:r="http://schemas.openxmlformats.org/officeDocument/2006/relationships" xmlns:p="http://schemas.openxmlformats.org/presentationml/2006/main">
+  <p:cSld>
+    <p:spTree>
+      <p:nvGrpSpPr>
+        <p:cNvPr id="1" name=""/>
+        <p:cNvGrpSpPr/>
+        <p:nvPr/>
+      </p:nvGrpSpPr>
+      <p:grpSpPr>
+        <a:xfrm>
+          <a:off x="0" y="0"/>
+          <a:ext cx="0" cy="0"/>
+          <a:chOff x="0" y="0"/>
+          <a:chExt cx="0" cy="0"/>
+        </a:xfrm>
+      </p:grpSpPr>
+      <p:graphicFrame>
+        <p:nvGraphicFramePr>
+          <p:cNvPr id="4" name="3 Marcador de contenido"/>
+          <p:cNvGraphicFramePr>
+            <a:graphicFrameLocks noGrp="1"/>
+          </p:cNvGraphicFramePr>
+          <p:nvPr>
+            <p:ph idx="1"/>
+          </p:nvPr>
+        </p:nvGraphicFramePr>
+        <p:xfrm>
+          <a:off x="457200" y="908051"/>
+          <a:ext cx="7787208" cy="3889102"/>
+        </p:xfrm>
+        <a:graphic>
+          <a:graphicData uri="http://schemas.openxmlformats.org/drawingml/2006/diagram">
+            <dgm:relIds xmlns:dgm="http://schemas.openxmlformats.org/drawingml/2006/diagram" xmlns:r="http://schemas.openxmlformats.org/officeDocument/2006/relationships" r:dm="rId3" r:lo="rId4" r:qs="rId5" r:cs="rId6"/>
+          </a:graphicData>
+        </a:graphic>
+      </p:graphicFrame>
+      <p:sp>
+        <p:nvSpPr>
+          <p:cNvPr id="7" name="6 Marcador de número de diapositiva"/>
+          <p:cNvSpPr>
+            <a:spLocks noGrp="1"/>
+          </p:cNvSpPr>
+          <p:nvPr>
+            <p:ph type="sldNum" sz="quarter" idx="12"/>
+          </p:nvPr>
+        </p:nvSpPr>
+        <p:spPr/>
+        <p:txBody>
+          <a:bodyPr/>
+          <a:lstStyle/>
+          <a:p>
+            <a:fld id="{2235B30C-86F8-49BD-820E-4721741473E2}" type="slidenum">
+              <a:rPr lang="es-CO" smtClean="0"/>
+              <a:pPr/>
+              <a:t>39</a:t>
+            </a:fld>
+            <a:endParaRPr lang="es-CO"/>
+          </a:p>
+        </p:txBody>
+      </p:sp>
+      <p:sp>
+        <p:nvSpPr>
+          <p:cNvPr id="2" name="1 Título"/>
+          <p:cNvSpPr>
+            <a:spLocks noGrp="1"/>
+          </p:cNvSpPr>
+          <p:nvPr>
+            <p:ph type="title"/>
+          </p:nvPr>
+        </p:nvSpPr>
+        <p:spPr/>
+        <p:txBody>
+          <a:bodyPr/>
+          <a:lstStyle/>
+          <a:p>
+            <a:r>
+              <a:rPr lang="es-CO" dirty="0"/>
+              <a:t>Lenguajes interpretados</a:t>
+            </a:r>
+          </a:p>
+        </p:txBody>
+      </p:sp>
+      <p:sp>
+        <p:nvSpPr>
+          <p:cNvPr id="5" name="4 CuadroTexto"/>
+          <p:cNvSpPr txBox="1"/>
+          <p:nvPr/>
+        </p:nvSpPr>
+        <p:spPr>
+          <a:xfrm>
+            <a:off x="431540" y="4794200"/>
+            <a:ext cx="8568952" cy="1384995"/>
+          </a:xfrm>
+          <a:prstGeom prst="rect">
+            <a:avLst/>
+          </a:prstGeom>
+          <a:noFill/>
+        </p:spPr>
+        <p:txBody>
+          <a:bodyPr wrap="square" rtlCol="0">
+            <a:spAutoFit/>
+          </a:bodyPr>
+          <a:lstStyle/>
+          <a:p>
+            <a:pPr algn="just"/>
+            <a:r>
+              <a:rPr lang="es-CO" sz="2800" dirty="0"/>
+              <a:t>No se guarda el programa interpretado. Siempre se requiere el intérprete para ejecutar el programa</a:t>
+            </a:r>
+          </a:p>
+        </p:txBody>
+      </p:sp>
+    </p:spTree>
+    <p:extLst>
+      <p:ext uri="{BB962C8B-B14F-4D97-AF65-F5344CB8AC3E}">
+        <p14:creationId xmlns:p14="http://schemas.microsoft.com/office/powerpoint/2010/main" val="4081256076"/>
+      </p:ext>
+    </p:extLst>
+  </p:cSld>
+  <p:clrMapOvr>
+    <a:masterClrMapping/>
+  </p:clrMapOvr>
+</p:sld>
+</file>
+
 <file path=ppt/slides/slide4.xml><?xml version="1.0" encoding="utf-8"?>
 <p:sld xmlns:a="http://schemas.openxmlformats.org/drawingml/2006/main" xmlns:r="http://schemas.openxmlformats.org/officeDocument/2006/relationships" xmlns:p="http://schemas.openxmlformats.org/presentationml/2006/main">
   <p:cSld>
@@ -43431,132 +43306,6 @@
           <a:chExt cx="0" cy="0"/>
         </a:xfrm>
       </p:grpSpPr>
-      <p:graphicFrame>
-        <p:nvGraphicFramePr>
-          <p:cNvPr id="4" name="3 Marcador de contenido"/>
-          <p:cNvGraphicFramePr>
-            <a:graphicFrameLocks noGrp="1"/>
-          </p:cNvGraphicFramePr>
-          <p:nvPr>
-            <p:ph idx="1"/>
-          </p:nvPr>
-        </p:nvGraphicFramePr>
-        <p:xfrm>
-          <a:off x="457200" y="908051"/>
-          <a:ext cx="7787208" cy="3889102"/>
-        </p:xfrm>
-        <a:graphic>
-          <a:graphicData uri="http://schemas.openxmlformats.org/drawingml/2006/diagram">
-            <dgm:relIds xmlns:dgm="http://schemas.openxmlformats.org/drawingml/2006/diagram" xmlns:r="http://schemas.openxmlformats.org/officeDocument/2006/relationships" r:dm="rId3" r:lo="rId4" r:qs="rId5" r:cs="rId6"/>
-          </a:graphicData>
-        </a:graphic>
-      </p:graphicFrame>
-      <p:sp>
-        <p:nvSpPr>
-          <p:cNvPr id="7" name="6 Marcador de número de diapositiva"/>
-          <p:cNvSpPr>
-            <a:spLocks noGrp="1"/>
-          </p:cNvSpPr>
-          <p:nvPr>
-            <p:ph type="sldNum" sz="quarter" idx="12"/>
-          </p:nvPr>
-        </p:nvSpPr>
-        <p:spPr/>
-        <p:txBody>
-          <a:bodyPr/>
-          <a:lstStyle/>
-          <a:p>
-            <a:fld id="{2235B30C-86F8-49BD-820E-4721741473E2}" type="slidenum">
-              <a:rPr lang="es-CO" smtClean="0"/>
-              <a:pPr/>
-              <a:t>40</a:t>
-            </a:fld>
-            <a:endParaRPr lang="es-CO"/>
-          </a:p>
-        </p:txBody>
-      </p:sp>
-      <p:sp>
-        <p:nvSpPr>
-          <p:cNvPr id="2" name="1 Título"/>
-          <p:cNvSpPr>
-            <a:spLocks noGrp="1"/>
-          </p:cNvSpPr>
-          <p:nvPr>
-            <p:ph type="title"/>
-          </p:nvPr>
-        </p:nvSpPr>
-        <p:spPr/>
-        <p:txBody>
-          <a:bodyPr/>
-          <a:lstStyle/>
-          <a:p>
-            <a:r>
-              <a:rPr lang="es-CO" dirty="0"/>
-              <a:t>Lenguajes interpretados</a:t>
-            </a:r>
-          </a:p>
-        </p:txBody>
-      </p:sp>
-      <p:sp>
-        <p:nvSpPr>
-          <p:cNvPr id="5" name="4 CuadroTexto"/>
-          <p:cNvSpPr txBox="1"/>
-          <p:nvPr/>
-        </p:nvSpPr>
-        <p:spPr>
-          <a:xfrm>
-            <a:off x="431540" y="4794200"/>
-            <a:ext cx="8568952" cy="1384995"/>
-          </a:xfrm>
-          <a:prstGeom prst="rect">
-            <a:avLst/>
-          </a:prstGeom>
-          <a:noFill/>
-        </p:spPr>
-        <p:txBody>
-          <a:bodyPr wrap="square" rtlCol="0">
-            <a:spAutoFit/>
-          </a:bodyPr>
-          <a:lstStyle/>
-          <a:p>
-            <a:pPr algn="just"/>
-            <a:r>
-              <a:rPr lang="es-CO" sz="2800" dirty="0"/>
-              <a:t>No se guarda el programa interpretado. Siempre se requiere el intérprete para ejecutar el programa</a:t>
-            </a:r>
-          </a:p>
-        </p:txBody>
-      </p:sp>
-    </p:spTree>
-    <p:extLst>
-      <p:ext uri="{BB962C8B-B14F-4D97-AF65-F5344CB8AC3E}">
-        <p14:creationId xmlns:p14="http://schemas.microsoft.com/office/powerpoint/2010/main" val="4081256076"/>
-      </p:ext>
-    </p:extLst>
-  </p:cSld>
-  <p:clrMapOvr>
-    <a:masterClrMapping/>
-  </p:clrMapOvr>
-</p:sld>
-</file>
-
-<file path=ppt/slides/slide41.xml><?xml version="1.0" encoding="utf-8"?>
-<p:sld xmlns:a="http://schemas.openxmlformats.org/drawingml/2006/main" xmlns:r="http://schemas.openxmlformats.org/officeDocument/2006/relationships" xmlns:p="http://schemas.openxmlformats.org/presentationml/2006/main">
-  <p:cSld>
-    <p:spTree>
-      <p:nvGrpSpPr>
-        <p:cNvPr id="1" name=""/>
-        <p:cNvGrpSpPr/>
-        <p:nvPr/>
-      </p:nvGrpSpPr>
-      <p:grpSpPr>
-        <a:xfrm>
-          <a:off x="0" y="0"/>
-          <a:ext cx="0" cy="0"/>
-          <a:chOff x="0" y="0"/>
-          <a:chExt cx="0" cy="0"/>
-        </a:xfrm>
-      </p:grpSpPr>
       <p:sp>
         <p:nvSpPr>
           <p:cNvPr id="3" name="2 Marcador de contenido"/>
@@ -43607,7 +43356,7 @@
             <a:fld id="{2235B30C-86F8-49BD-820E-4721741473E2}" type="slidenum">
               <a:rPr lang="es-CO" smtClean="0"/>
               <a:pPr/>
-              <a:t>41</a:t>
+              <a:t>40</a:t>
             </a:fld>
             <a:endParaRPr lang="es-CO"/>
           </a:p>
@@ -43812,7 +43561,7 @@
 </p:sld>
 </file>
 
-<file path=ppt/slides/slide42.xml><?xml version="1.0" encoding="utf-8"?>
+<file path=ppt/slides/slide41.xml><?xml version="1.0" encoding="utf-8"?>
 <p:sld xmlns:a="http://schemas.openxmlformats.org/drawingml/2006/main" xmlns:r="http://schemas.openxmlformats.org/officeDocument/2006/relationships" xmlns:p="http://schemas.openxmlformats.org/presentationml/2006/main">
   <p:cSld>
     <p:spTree>
@@ -43928,7 +43677,7 @@
             <a:fld id="{2235B30C-86F8-49BD-820E-4721741473E2}" type="slidenum">
               <a:rPr lang="es-CO" smtClean="0"/>
               <a:pPr/>
-              <a:t>42</a:t>
+              <a:t>41</a:t>
             </a:fld>
             <a:endParaRPr lang="es-CO"/>
           </a:p>
@@ -44012,7 +43761,7 @@
 </p:sld>
 </file>
 
-<file path=ppt/slides/slide43.xml><?xml version="1.0" encoding="utf-8"?>
+<file path=ppt/slides/slide42.xml><?xml version="1.0" encoding="utf-8"?>
 <p:sld xmlns:a="http://schemas.openxmlformats.org/drawingml/2006/main" xmlns:r="http://schemas.openxmlformats.org/officeDocument/2006/relationships" xmlns:p="http://schemas.openxmlformats.org/presentationml/2006/main">
   <p:cSld>
     <p:spTree>
@@ -44070,7 +43819,7 @@
             <a:fld id="{2235B30C-86F8-49BD-820E-4721741473E2}" type="slidenum">
               <a:rPr lang="es-CO" smtClean="0"/>
               <a:pPr/>
-              <a:t>43</a:t>
+              <a:t>42</a:t>
             </a:fld>
             <a:endParaRPr lang="es-CO"/>
           </a:p>
@@ -44944,7 +44693,7 @@
 </p:sld>
 </file>
 
-<file path=ppt/slides/slide44.xml><?xml version="1.0" encoding="utf-8"?>
+<file path=ppt/slides/slide43.xml><?xml version="1.0" encoding="utf-8"?>
 <p:sld xmlns:a="http://schemas.openxmlformats.org/drawingml/2006/main" xmlns:r="http://schemas.openxmlformats.org/officeDocument/2006/relationships" xmlns:p="http://schemas.openxmlformats.org/presentationml/2006/main">
   <p:cSld>
     <p:spTree>
@@ -45022,7 +44771,7 @@
             <a:fld id="{2235B30C-86F8-49BD-820E-4721741473E2}" type="slidenum">
               <a:rPr lang="es-CO" smtClean="0"/>
               <a:pPr/>
-              <a:t>44</a:t>
+              <a:t>43</a:t>
             </a:fld>
             <a:endParaRPr lang="es-CO"/>
           </a:p>
@@ -45063,7 +44812,7 @@
 </p:sld>
 </file>
 
-<file path=ppt/slides/slide45.xml><?xml version="1.0" encoding="utf-8"?>
+<file path=ppt/slides/slide44.xml><?xml version="1.0" encoding="utf-8"?>
 <p:sld xmlns:a="http://schemas.openxmlformats.org/drawingml/2006/main" xmlns:r="http://schemas.openxmlformats.org/officeDocument/2006/relationships" xmlns:p="http://schemas.openxmlformats.org/presentationml/2006/main">
   <p:cSld>
     <p:spTree>
@@ -45265,7 +45014,7 @@
             <a:fld id="{2235B30C-86F8-49BD-820E-4721741473E2}" type="slidenum">
               <a:rPr lang="es-CO" smtClean="0"/>
               <a:pPr/>
-              <a:t>45</a:t>
+              <a:t>44</a:t>
             </a:fld>
             <a:endParaRPr lang="es-CO"/>
           </a:p>
@@ -45284,7 +45033,7 @@
 </p:sld>
 </file>
 
-<file path=ppt/slides/slide46.xml><?xml version="1.0" encoding="utf-8"?>
+<file path=ppt/slides/slide45.xml><?xml version="1.0" encoding="utf-8"?>
 <p:sld xmlns:a="http://schemas.openxmlformats.org/drawingml/2006/main" xmlns:r="http://schemas.openxmlformats.org/officeDocument/2006/relationships" xmlns:p="http://schemas.openxmlformats.org/presentationml/2006/main">
   <p:cSld>
     <p:spTree>
@@ -45361,7 +45110,7 @@
             <a:fld id="{2235B30C-86F8-49BD-820E-4721741473E2}" type="slidenum">
               <a:rPr lang="es-CO" smtClean="0"/>
               <a:pPr/>
-              <a:t>46</a:t>
+              <a:t>45</a:t>
             </a:fld>
             <a:endParaRPr lang="es-CO"/>
           </a:p>
@@ -45801,7 +45550,7 @@
 </p:sld>
 </file>
 
-<file path=ppt/slides/slide47.xml><?xml version="1.0" encoding="utf-8"?>
+<file path=ppt/slides/slide46.xml><?xml version="1.0" encoding="utf-8"?>
 <p:sld xmlns:a="http://schemas.openxmlformats.org/drawingml/2006/main" xmlns:r="http://schemas.openxmlformats.org/officeDocument/2006/relationships" xmlns:p="http://schemas.openxmlformats.org/presentationml/2006/main">
   <p:cSld>
     <p:spTree>
@@ -45884,7 +45633,7 @@
             <a:fld id="{2235B30C-86F8-49BD-820E-4721741473E2}" type="slidenum">
               <a:rPr lang="es-CO" smtClean="0"/>
               <a:pPr/>
-              <a:t>47</a:t>
+              <a:t>46</a:t>
             </a:fld>
             <a:endParaRPr lang="es-CO"/>
           </a:p>
@@ -46475,7 +46224,7 @@
 </p:sld>
 </file>
 
-<file path=ppt/slides/slide48.xml><?xml version="1.0" encoding="utf-8"?>
+<file path=ppt/slides/slide47.xml><?xml version="1.0" encoding="utf-8"?>
 <p:sld xmlns:a="http://schemas.openxmlformats.org/drawingml/2006/main" xmlns:r="http://schemas.openxmlformats.org/officeDocument/2006/relationships" xmlns:p="http://schemas.openxmlformats.org/presentationml/2006/main">
   <p:cSld>
     <p:spTree>
@@ -46688,7 +46437,7 @@
             <a:fld id="{2235B30C-86F8-49BD-820E-4721741473E2}" type="slidenum">
               <a:rPr lang="es-CO" smtClean="0"/>
               <a:pPr/>
-              <a:t>48</a:t>
+              <a:t>47</a:t>
             </a:fld>
             <a:endParaRPr lang="es-CO"/>
           </a:p>
@@ -46793,7 +46542,7 @@
 </p:sld>
 </file>
 
-<file path=ppt/slides/slide49.xml><?xml version="1.0" encoding="utf-8"?>
+<file path=ppt/slides/slide48.xml><?xml version="1.0" encoding="utf-8"?>
 <p:sld xmlns:a="http://schemas.openxmlformats.org/drawingml/2006/main" xmlns:r="http://schemas.openxmlformats.org/officeDocument/2006/relationships" xmlns:p="http://schemas.openxmlformats.org/presentationml/2006/main">
   <p:cSld>
     <p:spTree>
@@ -46851,7 +46600,7 @@
             <a:fld id="{2235B30C-86F8-49BD-820E-4721741473E2}" type="slidenum">
               <a:rPr lang="es-CO" smtClean="0"/>
               <a:pPr/>
-              <a:t>49</a:t>
+              <a:t>48</a:t>
             </a:fld>
             <a:endParaRPr lang="es-CO"/>
           </a:p>
@@ -47065,6 +46814,82 @@
 </p:sld>
 </file>
 
+<file path=ppt/slides/slide49.xml><?xml version="1.0" encoding="utf-8"?>
+<p:sld xmlns:a="http://schemas.openxmlformats.org/drawingml/2006/main" xmlns:r="http://schemas.openxmlformats.org/officeDocument/2006/relationships" xmlns:p="http://schemas.openxmlformats.org/presentationml/2006/main">
+  <p:cSld>
+    <p:spTree>
+      <p:nvGrpSpPr>
+        <p:cNvPr id="1" name=""/>
+        <p:cNvGrpSpPr/>
+        <p:nvPr/>
+      </p:nvGrpSpPr>
+      <p:grpSpPr>
+        <a:xfrm>
+          <a:off x="0" y="0"/>
+          <a:ext cx="0" cy="0"/>
+          <a:chOff x="0" y="0"/>
+          <a:chExt cx="0" cy="0"/>
+        </a:xfrm>
+      </p:grpSpPr>
+      <p:sp>
+        <p:nvSpPr>
+          <p:cNvPr id="3" name="Título 2"/>
+          <p:cNvSpPr>
+            <a:spLocks noGrp="1"/>
+          </p:cNvSpPr>
+          <p:nvPr>
+            <p:ph type="title"/>
+          </p:nvPr>
+        </p:nvSpPr>
+        <p:spPr/>
+        <p:txBody>
+          <a:bodyPr/>
+          <a:lstStyle/>
+          <a:p>
+            <a:r>
+              <a:rPr lang="es-CO" dirty="0"/>
+              <a:t>Con el editor online</a:t>
+            </a:r>
+          </a:p>
+        </p:txBody>
+      </p:sp>
+      <p:pic>
+        <p:nvPicPr>
+          <p:cNvPr id="4" name="Imagen 3"/>
+          <p:cNvPicPr>
+            <a:picLocks noChangeAspect="1"/>
+          </p:cNvPicPr>
+          <p:nvPr/>
+        </p:nvPicPr>
+        <p:blipFill>
+          <a:blip r:embed="rId2"/>
+          <a:stretch>
+            <a:fillRect/>
+          </a:stretch>
+        </p:blipFill>
+        <p:spPr>
+          <a:xfrm>
+            <a:off x="675357" y="785626"/>
+            <a:ext cx="7781925" cy="5600700"/>
+          </a:xfrm>
+          <a:prstGeom prst="rect">
+            <a:avLst/>
+          </a:prstGeom>
+        </p:spPr>
+      </p:pic>
+    </p:spTree>
+    <p:extLst>
+      <p:ext uri="{BB962C8B-B14F-4D97-AF65-F5344CB8AC3E}">
+        <p14:creationId xmlns:p14="http://schemas.microsoft.com/office/powerpoint/2010/main" val="454964358"/>
+      </p:ext>
+    </p:extLst>
+  </p:cSld>
+  <p:clrMapOvr>
+    <a:masterClrMapping/>
+  </p:clrMapOvr>
+</p:sld>
+</file>
+
 <file path=ppt/slides/slide5.xml><?xml version="1.0" encoding="utf-8"?>
 <p:sld xmlns:a="http://schemas.openxmlformats.org/drawingml/2006/main" xmlns:r="http://schemas.openxmlformats.org/officeDocument/2006/relationships" xmlns:p="http://schemas.openxmlformats.org/presentationml/2006/main">
   <p:cSld>
@@ -47172,82 +46997,6 @@
 </file>
 
 <file path=ppt/slides/slide50.xml><?xml version="1.0" encoding="utf-8"?>
-<p:sld xmlns:a="http://schemas.openxmlformats.org/drawingml/2006/main" xmlns:r="http://schemas.openxmlformats.org/officeDocument/2006/relationships" xmlns:p="http://schemas.openxmlformats.org/presentationml/2006/main">
-  <p:cSld>
-    <p:spTree>
-      <p:nvGrpSpPr>
-        <p:cNvPr id="1" name=""/>
-        <p:cNvGrpSpPr/>
-        <p:nvPr/>
-      </p:nvGrpSpPr>
-      <p:grpSpPr>
-        <a:xfrm>
-          <a:off x="0" y="0"/>
-          <a:ext cx="0" cy="0"/>
-          <a:chOff x="0" y="0"/>
-          <a:chExt cx="0" cy="0"/>
-        </a:xfrm>
-      </p:grpSpPr>
-      <p:sp>
-        <p:nvSpPr>
-          <p:cNvPr id="3" name="Título 2"/>
-          <p:cNvSpPr>
-            <a:spLocks noGrp="1"/>
-          </p:cNvSpPr>
-          <p:nvPr>
-            <p:ph type="title"/>
-          </p:nvPr>
-        </p:nvSpPr>
-        <p:spPr/>
-        <p:txBody>
-          <a:bodyPr/>
-          <a:lstStyle/>
-          <a:p>
-            <a:r>
-              <a:rPr lang="es-CO" dirty="0"/>
-              <a:t>Con el editor online</a:t>
-            </a:r>
-          </a:p>
-        </p:txBody>
-      </p:sp>
-      <p:pic>
-        <p:nvPicPr>
-          <p:cNvPr id="4" name="Imagen 3"/>
-          <p:cNvPicPr>
-            <a:picLocks noChangeAspect="1"/>
-          </p:cNvPicPr>
-          <p:nvPr/>
-        </p:nvPicPr>
-        <p:blipFill>
-          <a:blip r:embed="rId2"/>
-          <a:stretch>
-            <a:fillRect/>
-          </a:stretch>
-        </p:blipFill>
-        <p:spPr>
-          <a:xfrm>
-            <a:off x="675357" y="785626"/>
-            <a:ext cx="7781925" cy="5600700"/>
-          </a:xfrm>
-          <a:prstGeom prst="rect">
-            <a:avLst/>
-          </a:prstGeom>
-        </p:spPr>
-      </p:pic>
-    </p:spTree>
-    <p:extLst>
-      <p:ext uri="{BB962C8B-B14F-4D97-AF65-F5344CB8AC3E}">
-        <p14:creationId xmlns:p14="http://schemas.microsoft.com/office/powerpoint/2010/main" val="454964358"/>
-      </p:ext>
-    </p:extLst>
-  </p:cSld>
-  <p:clrMapOvr>
-    <a:masterClrMapping/>
-  </p:clrMapOvr>
-</p:sld>
-</file>
-
-<file path=ppt/slides/slide51.xml><?xml version="1.0" encoding="utf-8"?>
 <p:sld xmlns:a="http://schemas.openxmlformats.org/drawingml/2006/main" xmlns:r="http://schemas.openxmlformats.org/officeDocument/2006/relationships" xmlns:p="http://schemas.openxmlformats.org/presentationml/2006/main">
   <p:cSld>
     <p:spTree>

</xml_diff>

<commit_message>
MOD: Se actualizan diapositivas técnicas de programacion y ejercicios de condicionales
</commit_message>
<xml_diff>
--- a/material/Tecnicas/ClasesTutoriales/1.Presentación-pseudocodigo-lenguajes compilados- c.pptx
+++ b/material/Tecnicas/ClasesTutoriales/1.Presentación-pseudocodigo-lenguajes compilados- c.pptx
@@ -5,7 +5,7 @@
     <p:sldMasterId id="2147483648" r:id="rId1"/>
   </p:sldMasterIdLst>
   <p:notesMasterIdLst>
-    <p:notesMasterId r:id="rId52"/>
+    <p:notesMasterId r:id="rId53"/>
   </p:notesMasterIdLst>
   <p:sldIdLst>
     <p:sldId id="365" r:id="rId2"/>
@@ -18,46 +18,47 @@
     <p:sldId id="375" r:id="rId9"/>
     <p:sldId id="376" r:id="rId10"/>
     <p:sldId id="381" r:id="rId11"/>
-    <p:sldId id="385" r:id="rId12"/>
-    <p:sldId id="386" r:id="rId13"/>
-    <p:sldId id="388" r:id="rId14"/>
-    <p:sldId id="389" r:id="rId15"/>
-    <p:sldId id="390" r:id="rId16"/>
-    <p:sldId id="391" r:id="rId17"/>
-    <p:sldId id="392" r:id="rId18"/>
-    <p:sldId id="393" r:id="rId19"/>
-    <p:sldId id="394" r:id="rId20"/>
-    <p:sldId id="395" r:id="rId21"/>
-    <p:sldId id="396" r:id="rId22"/>
-    <p:sldId id="397" r:id="rId23"/>
-    <p:sldId id="398" r:id="rId24"/>
-    <p:sldId id="399" r:id="rId25"/>
-    <p:sldId id="400" r:id="rId26"/>
-    <p:sldId id="401" r:id="rId27"/>
-    <p:sldId id="402" r:id="rId28"/>
-    <p:sldId id="403" r:id="rId29"/>
-    <p:sldId id="404" r:id="rId30"/>
-    <p:sldId id="405" r:id="rId31"/>
-    <p:sldId id="406" r:id="rId32"/>
-    <p:sldId id="407" r:id="rId33"/>
-    <p:sldId id="408" r:id="rId34"/>
-    <p:sldId id="409" r:id="rId35"/>
-    <p:sldId id="410" r:id="rId36"/>
-    <p:sldId id="411" r:id="rId37"/>
-    <p:sldId id="412" r:id="rId38"/>
-    <p:sldId id="413" r:id="rId39"/>
-    <p:sldId id="414" r:id="rId40"/>
-    <p:sldId id="415" r:id="rId41"/>
-    <p:sldId id="417" r:id="rId42"/>
-    <p:sldId id="418" r:id="rId43"/>
-    <p:sldId id="419" r:id="rId44"/>
-    <p:sldId id="420" r:id="rId45"/>
-    <p:sldId id="370" r:id="rId46"/>
-    <p:sldId id="421" r:id="rId47"/>
-    <p:sldId id="372" r:id="rId48"/>
-    <p:sldId id="422" r:id="rId49"/>
-    <p:sldId id="374" r:id="rId50"/>
-    <p:sldId id="416" r:id="rId51"/>
+    <p:sldId id="382" r:id="rId12"/>
+    <p:sldId id="385" r:id="rId13"/>
+    <p:sldId id="386" r:id="rId14"/>
+    <p:sldId id="388" r:id="rId15"/>
+    <p:sldId id="389" r:id="rId16"/>
+    <p:sldId id="390" r:id="rId17"/>
+    <p:sldId id="391" r:id="rId18"/>
+    <p:sldId id="392" r:id="rId19"/>
+    <p:sldId id="393" r:id="rId20"/>
+    <p:sldId id="394" r:id="rId21"/>
+    <p:sldId id="395" r:id="rId22"/>
+    <p:sldId id="396" r:id="rId23"/>
+    <p:sldId id="397" r:id="rId24"/>
+    <p:sldId id="398" r:id="rId25"/>
+    <p:sldId id="399" r:id="rId26"/>
+    <p:sldId id="400" r:id="rId27"/>
+    <p:sldId id="401" r:id="rId28"/>
+    <p:sldId id="402" r:id="rId29"/>
+    <p:sldId id="403" r:id="rId30"/>
+    <p:sldId id="404" r:id="rId31"/>
+    <p:sldId id="405" r:id="rId32"/>
+    <p:sldId id="406" r:id="rId33"/>
+    <p:sldId id="407" r:id="rId34"/>
+    <p:sldId id="408" r:id="rId35"/>
+    <p:sldId id="409" r:id="rId36"/>
+    <p:sldId id="410" r:id="rId37"/>
+    <p:sldId id="411" r:id="rId38"/>
+    <p:sldId id="412" r:id="rId39"/>
+    <p:sldId id="413" r:id="rId40"/>
+    <p:sldId id="414" r:id="rId41"/>
+    <p:sldId id="415" r:id="rId42"/>
+    <p:sldId id="417" r:id="rId43"/>
+    <p:sldId id="418" r:id="rId44"/>
+    <p:sldId id="419" r:id="rId45"/>
+    <p:sldId id="420" r:id="rId46"/>
+    <p:sldId id="370" r:id="rId47"/>
+    <p:sldId id="421" r:id="rId48"/>
+    <p:sldId id="372" r:id="rId49"/>
+    <p:sldId id="422" r:id="rId50"/>
+    <p:sldId id="374" r:id="rId51"/>
+    <p:sldId id="416" r:id="rId52"/>
   </p:sldIdLst>
   <p:sldSz cx="9144000" cy="6858000" type="screen4x3"/>
   <p:notesSz cx="6858000" cy="9144000"/>
@@ -23703,7 +23704,7 @@
             <a:fld id="{72F64849-FDB5-4298-A413-9D70FF7B4EB1}" type="datetimeFigureOut">
               <a:rPr lang="es-CO" smtClean="0"/>
               <a:pPr/>
-              <a:t>4/02/2020</a:t>
+              <a:t>1/02/2020</a:t>
             </a:fld>
             <a:endParaRPr lang="es-CO"/>
           </a:p>
@@ -24022,12 +24023,14 @@
           <a:p>
             <a:r>
               <a:rPr lang="es-CO" dirty="0"/>
-              <a:t>Constantes:</a:t>
+              <a:t>Poner tema po</a:t>
             </a:r>
             <a:r>
               <a:rPr lang="es-CO" baseline="0" dirty="0"/>
-              <a:t> no cambian en ningún momento</a:t>
+              <a:t>r objetivos, después de revisarlo con quien corresponda</a:t>
             </a:r>
+          </a:p>
+          <a:p>
             <a:endParaRPr lang="es-CO" dirty="0"/>
           </a:p>
         </p:txBody>
@@ -24050,7 +24053,7 @@
             <a:fld id="{E21E405C-8F13-4C14-8D34-C311A8C5D90E}" type="slidenum">
               <a:rPr lang="es-CO" smtClean="0"/>
               <a:pPr/>
-              <a:t>14</a:t>
+              <a:t>11</a:t>
             </a:fld>
             <a:endParaRPr lang="es-CO"/>
           </a:p>
@@ -24059,7 +24062,7 @@
     </p:spTree>
     <p:extLst>
       <p:ext uri="{BB962C8B-B14F-4D97-AF65-F5344CB8AC3E}">
-        <p14:creationId xmlns:p14="http://schemas.microsoft.com/office/powerpoint/2010/main" val="690171966"/>
+        <p14:creationId xmlns:p14="http://schemas.microsoft.com/office/powerpoint/2010/main" val="2938145305"/>
       </p:ext>
     </p:extLst>
   </p:cSld>
@@ -24070,6 +24073,205 @@
 </file>
 
 <file path=ppt/notesSlides/notesSlide10.xml><?xml version="1.0" encoding="utf-8"?>
+<p:notes xmlns:a="http://schemas.openxmlformats.org/drawingml/2006/main" xmlns:r="http://schemas.openxmlformats.org/officeDocument/2006/relationships" xmlns:p="http://schemas.openxmlformats.org/presentationml/2006/main">
+  <p:cSld>
+    <p:spTree>
+      <p:nvGrpSpPr>
+        <p:cNvPr id="1" name=""/>
+        <p:cNvGrpSpPr/>
+        <p:nvPr/>
+      </p:nvGrpSpPr>
+      <p:grpSpPr>
+        <a:xfrm>
+          <a:off x="0" y="0"/>
+          <a:ext cx="0" cy="0"/>
+          <a:chOff x="0" y="0"/>
+          <a:chExt cx="0" cy="0"/>
+        </a:xfrm>
+      </p:grpSpPr>
+      <p:sp>
+        <p:nvSpPr>
+          <p:cNvPr id="2" name="1 Marcador de imagen de diapositiva"/>
+          <p:cNvSpPr>
+            <a:spLocks noGrp="1" noRot="1" noChangeAspect="1"/>
+          </p:cNvSpPr>
+          <p:nvPr>
+            <p:ph type="sldImg"/>
+          </p:nvPr>
+        </p:nvSpPr>
+        <p:spPr/>
+      </p:sp>
+      <p:sp>
+        <p:nvSpPr>
+          <p:cNvPr id="3" name="2 Marcador de notas"/>
+          <p:cNvSpPr>
+            <a:spLocks noGrp="1"/>
+          </p:cNvSpPr>
+          <p:nvPr>
+            <p:ph type="body" idx="1"/>
+          </p:nvPr>
+        </p:nvSpPr>
+        <p:spPr/>
+        <p:txBody>
+          <a:bodyPr>
+            <a:normAutofit/>
+          </a:bodyPr>
+          <a:lstStyle/>
+          <a:p>
+            <a:pPr marL="0" marR="0" indent="0" algn="l" defTabSz="914400" rtl="0" eaLnBrk="1" fontAlgn="auto" latinLnBrk="0" hangingPunct="1">
+              <a:lnSpc>
+                <a:spcPct val="100000"/>
+              </a:lnSpc>
+              <a:spcBef>
+                <a:spcPts val="0"/>
+              </a:spcBef>
+              <a:spcAft>
+                <a:spcPts val="0"/>
+              </a:spcAft>
+              <a:buClrTx/>
+              <a:buSzTx/>
+              <a:buFontTx/>
+              <a:buNone/>
+              <a:tabLst/>
+              <a:defRPr/>
+            </a:pPr>
+            <a:r>
+              <a:rPr lang="es-CO" sz="1200" b="0" i="0" kern="1200" dirty="0">
+                <a:solidFill>
+                  <a:schemeClr val="tx1"/>
+                </a:solidFill>
+                <a:latin typeface="+mn-lt"/>
+                <a:ea typeface="+mn-ea"/>
+                <a:cs typeface="+mn-cs"/>
+              </a:rPr>
+              <a:t>El </a:t>
+            </a:r>
+            <a:r>
+              <a:rPr lang="es-CO" sz="1200" b="0" i="1" kern="1200" dirty="0">
+                <a:solidFill>
+                  <a:schemeClr val="tx1"/>
+                </a:solidFill>
+                <a:latin typeface="+mn-lt"/>
+                <a:ea typeface="+mn-ea"/>
+                <a:cs typeface="+mn-cs"/>
+              </a:rPr>
+              <a:t>lenguaje máquina</a:t>
+            </a:r>
+            <a:r>
+              <a:rPr lang="es-CO" sz="1200" b="0" i="0" kern="1200" dirty="0">
+                <a:solidFill>
+                  <a:schemeClr val="tx1"/>
+                </a:solidFill>
+                <a:latin typeface="+mn-lt"/>
+                <a:ea typeface="+mn-ea"/>
+                <a:cs typeface="+mn-cs"/>
+              </a:rPr>
+              <a:t> de una </a:t>
+            </a:r>
+            <a:r>
+              <a:rPr lang="es-CO" sz="1200" b="0" i="0" u="none" strike="noStrike" kern="1200" dirty="0">
+                <a:solidFill>
+                  <a:schemeClr val="tx1"/>
+                </a:solidFill>
+                <a:latin typeface="+mn-lt"/>
+                <a:ea typeface="+mn-ea"/>
+                <a:cs typeface="+mn-cs"/>
+                <a:hlinkClick r:id="rId3"/>
+              </a:rPr>
+              <a:t>computadora</a:t>
+            </a:r>
+            <a:r>
+              <a:rPr lang="es-CO" sz="1200" b="0" i="0" kern="1200" dirty="0">
+                <a:solidFill>
+                  <a:schemeClr val="tx1"/>
+                </a:solidFill>
+                <a:latin typeface="+mn-lt"/>
+                <a:ea typeface="+mn-ea"/>
+                <a:cs typeface="+mn-cs"/>
+              </a:rPr>
+              <a:t> consta de cadenas de números binarios (ceros y unos) y es el único que "entienden" directamente los </a:t>
+            </a:r>
+            <a:r>
+              <a:rPr lang="es-CO" sz="1200" b="0" i="0" u="none" strike="noStrike" kern="1200" dirty="0">
+                <a:solidFill>
+                  <a:schemeClr val="tx1"/>
+                </a:solidFill>
+                <a:latin typeface="+mn-lt"/>
+                <a:ea typeface="+mn-ea"/>
+                <a:cs typeface="+mn-cs"/>
+                <a:hlinkClick r:id="rId4"/>
+              </a:rPr>
+              <a:t>procesadores</a:t>
+            </a:r>
+            <a:r>
+              <a:rPr lang="es-CO" sz="1200" b="0" i="0" kern="1200" dirty="0">
+                <a:solidFill>
+                  <a:schemeClr val="tx1"/>
+                </a:solidFill>
+                <a:latin typeface="+mn-lt"/>
+                <a:ea typeface="+mn-ea"/>
+                <a:cs typeface="+mn-cs"/>
+              </a:rPr>
+              <a:t>. </a:t>
+            </a:r>
+            <a:br>
+              <a:rPr lang="es-CO" sz="1200" b="0" i="0" kern="1200" dirty="0">
+                <a:solidFill>
+                  <a:schemeClr val="tx1"/>
+                </a:solidFill>
+                <a:latin typeface="+mn-lt"/>
+                <a:ea typeface="+mn-ea"/>
+                <a:cs typeface="+mn-cs"/>
+              </a:rPr>
+            </a:br>
+            <a:r>
+              <a:rPr lang="es-CO" dirty="0"/>
+              <a:t>Existen dos formas de obtener un código ejecutable a partir de un programa fuente: los intérpretes y los compiladores</a:t>
+            </a:r>
+          </a:p>
+          <a:p>
+            <a:endParaRPr lang="es-CO" dirty="0"/>
+          </a:p>
+        </p:txBody>
+      </p:sp>
+      <p:sp>
+        <p:nvSpPr>
+          <p:cNvPr id="4" name="3 Marcador de número de diapositiva"/>
+          <p:cNvSpPr>
+            <a:spLocks noGrp="1"/>
+          </p:cNvSpPr>
+          <p:nvPr>
+            <p:ph type="sldNum" sz="quarter" idx="10"/>
+          </p:nvPr>
+        </p:nvSpPr>
+        <p:spPr/>
+        <p:txBody>
+          <a:bodyPr/>
+          <a:lstStyle/>
+          <a:p>
+            <a:fld id="{E21E405C-8F13-4C14-8D34-C311A8C5D90E}" type="slidenum">
+              <a:rPr lang="es-CO" smtClean="0"/>
+              <a:pPr/>
+              <a:t>37</a:t>
+            </a:fld>
+            <a:endParaRPr lang="es-CO"/>
+          </a:p>
+        </p:txBody>
+      </p:sp>
+    </p:spTree>
+    <p:extLst>
+      <p:ext uri="{BB962C8B-B14F-4D97-AF65-F5344CB8AC3E}">
+        <p14:creationId xmlns:p14="http://schemas.microsoft.com/office/powerpoint/2010/main" val="1384588865"/>
+      </p:ext>
+    </p:extLst>
+  </p:cSld>
+  <p:clrMapOvr>
+    <a:masterClrMapping/>
+  </p:clrMapOvr>
+</p:notes>
+</file>
+
+<file path=ppt/notesSlides/notesSlide11.xml><?xml version="1.0" encoding="utf-8"?>
 <p:notes xmlns:a="http://schemas.openxmlformats.org/drawingml/2006/main" xmlns:r="http://schemas.openxmlformats.org/officeDocument/2006/relationships" xmlns:p="http://schemas.openxmlformats.org/presentationml/2006/main">
   <p:cSld>
     <p:spTree>
@@ -24160,7 +24362,7 @@
             <a:fld id="{E21E405C-8F13-4C14-8D34-C311A8C5D90E}" type="slidenum">
               <a:rPr lang="es-CO" smtClean="0"/>
               <a:pPr/>
-              <a:t>39</a:t>
+              <a:t>40</a:t>
             </a:fld>
             <a:endParaRPr lang="es-CO"/>
           </a:p>
@@ -24179,7 +24381,7 @@
 </p:notes>
 </file>
 
-<file path=ppt/notesSlides/notesSlide11.xml><?xml version="1.0" encoding="utf-8"?>
+<file path=ppt/notesSlides/notesSlide12.xml><?xml version="1.0" encoding="utf-8"?>
 <p:notes xmlns:a="http://schemas.openxmlformats.org/drawingml/2006/main" xmlns:r="http://schemas.openxmlformats.org/officeDocument/2006/relationships" xmlns:p="http://schemas.openxmlformats.org/presentationml/2006/main">
   <p:cSld>
     <p:spTree>
@@ -24270,7 +24472,7 @@
             <a:fld id="{E21E405C-8F13-4C14-8D34-C311A8C5D90E}" type="slidenum">
               <a:rPr lang="es-CO" smtClean="0"/>
               <a:pPr/>
-              <a:t>41</a:t>
+              <a:t>42</a:t>
             </a:fld>
             <a:endParaRPr lang="es-CO"/>
           </a:p>
@@ -24289,7 +24491,7 @@
 </p:notes>
 </file>
 
-<file path=ppt/notesSlides/notesSlide12.xml><?xml version="1.0" encoding="utf-8"?>
+<file path=ppt/notesSlides/notesSlide13.xml><?xml version="1.0" encoding="utf-8"?>
 <p:notes xmlns:a="http://schemas.openxmlformats.org/drawingml/2006/main" xmlns:r="http://schemas.openxmlformats.org/officeDocument/2006/relationships" xmlns:p="http://schemas.openxmlformats.org/presentationml/2006/main">
   <p:cSld>
     <p:spTree>
@@ -24357,7 +24559,7 @@
             <a:fld id="{E21E405C-8F13-4C14-8D34-C311A8C5D90E}" type="slidenum">
               <a:rPr lang="es-CO" smtClean="0"/>
               <a:pPr/>
-              <a:t>46</a:t>
+              <a:t>47</a:t>
             </a:fld>
             <a:endParaRPr lang="es-CO"/>
           </a:p>
@@ -24377,6 +24579,101 @@
 </file>
 
 <file path=ppt/notesSlides/notesSlide2.xml><?xml version="1.0" encoding="utf-8"?>
+<p:notes xmlns:a="http://schemas.openxmlformats.org/drawingml/2006/main" xmlns:r="http://schemas.openxmlformats.org/officeDocument/2006/relationships" xmlns:p="http://schemas.openxmlformats.org/presentationml/2006/main">
+  <p:cSld>
+    <p:spTree>
+      <p:nvGrpSpPr>
+        <p:cNvPr id="1" name=""/>
+        <p:cNvGrpSpPr/>
+        <p:nvPr/>
+      </p:nvGrpSpPr>
+      <p:grpSpPr>
+        <a:xfrm>
+          <a:off x="0" y="0"/>
+          <a:ext cx="0" cy="0"/>
+          <a:chOff x="0" y="0"/>
+          <a:chExt cx="0" cy="0"/>
+        </a:xfrm>
+      </p:grpSpPr>
+      <p:sp>
+        <p:nvSpPr>
+          <p:cNvPr id="2" name="1 Marcador de imagen de diapositiva"/>
+          <p:cNvSpPr>
+            <a:spLocks noGrp="1" noRot="1" noChangeAspect="1"/>
+          </p:cNvSpPr>
+          <p:nvPr>
+            <p:ph type="sldImg"/>
+          </p:nvPr>
+        </p:nvSpPr>
+        <p:spPr/>
+      </p:sp>
+      <p:sp>
+        <p:nvSpPr>
+          <p:cNvPr id="3" name="2 Marcador de notas"/>
+          <p:cNvSpPr>
+            <a:spLocks noGrp="1"/>
+          </p:cNvSpPr>
+          <p:nvPr>
+            <p:ph type="body" idx="1"/>
+          </p:nvPr>
+        </p:nvSpPr>
+        <p:spPr/>
+        <p:txBody>
+          <a:bodyPr>
+            <a:normAutofit/>
+          </a:bodyPr>
+          <a:lstStyle/>
+          <a:p>
+            <a:r>
+              <a:rPr lang="es-CO" dirty="0"/>
+              <a:t>Constantes:</a:t>
+            </a:r>
+            <a:r>
+              <a:rPr lang="es-CO" baseline="0" dirty="0"/>
+              <a:t> no cambian en ningún momento</a:t>
+            </a:r>
+            <a:endParaRPr lang="es-CO" dirty="0"/>
+          </a:p>
+        </p:txBody>
+      </p:sp>
+      <p:sp>
+        <p:nvSpPr>
+          <p:cNvPr id="4" name="3 Marcador de número de diapositiva"/>
+          <p:cNvSpPr>
+            <a:spLocks noGrp="1"/>
+          </p:cNvSpPr>
+          <p:nvPr>
+            <p:ph type="sldNum" sz="quarter" idx="10"/>
+          </p:nvPr>
+        </p:nvSpPr>
+        <p:spPr/>
+        <p:txBody>
+          <a:bodyPr/>
+          <a:lstStyle/>
+          <a:p>
+            <a:fld id="{E21E405C-8F13-4C14-8D34-C311A8C5D90E}" type="slidenum">
+              <a:rPr lang="es-CO" smtClean="0"/>
+              <a:pPr/>
+              <a:t>15</a:t>
+            </a:fld>
+            <a:endParaRPr lang="es-CO"/>
+          </a:p>
+        </p:txBody>
+      </p:sp>
+    </p:spTree>
+    <p:extLst>
+      <p:ext uri="{BB962C8B-B14F-4D97-AF65-F5344CB8AC3E}">
+        <p14:creationId xmlns:p14="http://schemas.microsoft.com/office/powerpoint/2010/main" val="690171966"/>
+      </p:ext>
+    </p:extLst>
+  </p:cSld>
+  <p:clrMapOvr>
+    <a:masterClrMapping/>
+  </p:clrMapOvr>
+</p:notes>
+</file>
+
+<file path=ppt/notesSlides/notesSlide3.xml><?xml version="1.0" encoding="utf-8"?>
 <p:notes xmlns:a="http://schemas.openxmlformats.org/drawingml/2006/main" xmlns:r="http://schemas.openxmlformats.org/officeDocument/2006/relationships" xmlns:p="http://schemas.openxmlformats.org/presentationml/2006/main">
   <p:cSld>
     <p:spTree>
@@ -24452,7 +24749,7 @@
             <a:fld id="{E21E405C-8F13-4C14-8D34-C311A8C5D90E}" type="slidenum">
               <a:rPr lang="es-CO" smtClean="0"/>
               <a:pPr/>
-              <a:t>16</a:t>
+              <a:t>17</a:t>
             </a:fld>
             <a:endParaRPr lang="es-CO"/>
           </a:p>
@@ -24471,7 +24768,7 @@
 </p:notes>
 </file>
 
-<file path=ppt/notesSlides/notesSlide3.xml><?xml version="1.0" encoding="utf-8"?>
+<file path=ppt/notesSlides/notesSlide4.xml><?xml version="1.0" encoding="utf-8"?>
 <p:notes xmlns:a="http://schemas.openxmlformats.org/drawingml/2006/main" xmlns:r="http://schemas.openxmlformats.org/officeDocument/2006/relationships" xmlns:p="http://schemas.openxmlformats.org/presentationml/2006/main">
   <p:cSld>
     <p:spTree>
@@ -24571,7 +24868,7 @@
             <a:fld id="{E21E405C-8F13-4C14-8D34-C311A8C5D90E}" type="slidenum">
               <a:rPr lang="es-CO" smtClean="0"/>
               <a:pPr/>
-              <a:t>18</a:t>
+              <a:t>19</a:t>
             </a:fld>
             <a:endParaRPr lang="es-CO"/>
           </a:p>
@@ -24590,7 +24887,7 @@
 </p:notes>
 </file>
 
-<file path=ppt/notesSlides/notesSlide4.xml><?xml version="1.0" encoding="utf-8"?>
+<file path=ppt/notesSlides/notesSlide5.xml><?xml version="1.0" encoding="utf-8"?>
 <p:notes xmlns:a="http://schemas.openxmlformats.org/drawingml/2006/main" xmlns:r="http://schemas.openxmlformats.org/officeDocument/2006/relationships" xmlns:p="http://schemas.openxmlformats.org/presentationml/2006/main">
   <p:cSld>
     <p:spTree>
@@ -24672,7 +24969,7 @@
             <a:fld id="{E21E405C-8F13-4C14-8D34-C311A8C5D90E}" type="slidenum">
               <a:rPr lang="es-CO" smtClean="0"/>
               <a:pPr/>
-              <a:t>19</a:t>
+              <a:t>20</a:t>
             </a:fld>
             <a:endParaRPr lang="es-CO"/>
           </a:p>
@@ -24682,338 +24979,6 @@
     <p:extLst>
       <p:ext uri="{BB962C8B-B14F-4D97-AF65-F5344CB8AC3E}">
         <p14:creationId xmlns:p14="http://schemas.microsoft.com/office/powerpoint/2010/main" val="1544027208"/>
-      </p:ext>
-    </p:extLst>
-  </p:cSld>
-  <p:clrMapOvr>
-    <a:masterClrMapping/>
-  </p:clrMapOvr>
-</p:notes>
-</file>
-
-<file path=ppt/notesSlides/notesSlide5.xml><?xml version="1.0" encoding="utf-8"?>
-<p:notes xmlns:a="http://schemas.openxmlformats.org/drawingml/2006/main" xmlns:r="http://schemas.openxmlformats.org/officeDocument/2006/relationships" xmlns:p="http://schemas.openxmlformats.org/presentationml/2006/main">
-  <p:cSld>
-    <p:spTree>
-      <p:nvGrpSpPr>
-        <p:cNvPr id="1" name=""/>
-        <p:cNvGrpSpPr/>
-        <p:nvPr/>
-      </p:nvGrpSpPr>
-      <p:grpSpPr>
-        <a:xfrm>
-          <a:off x="0" y="0"/>
-          <a:ext cx="0" cy="0"/>
-          <a:chOff x="0" y="0"/>
-          <a:chExt cx="0" cy="0"/>
-        </a:xfrm>
-      </p:grpSpPr>
-      <p:sp>
-        <p:nvSpPr>
-          <p:cNvPr id="2" name="1 Marcador de imagen de diapositiva"/>
-          <p:cNvSpPr>
-            <a:spLocks noGrp="1" noRot="1" noChangeAspect="1"/>
-          </p:cNvSpPr>
-          <p:nvPr>
-            <p:ph type="sldImg"/>
-          </p:nvPr>
-        </p:nvSpPr>
-        <p:spPr/>
-      </p:sp>
-      <p:sp>
-        <p:nvSpPr>
-          <p:cNvPr id="3" name="2 Marcador de notas"/>
-          <p:cNvSpPr>
-            <a:spLocks noGrp="1"/>
-          </p:cNvSpPr>
-          <p:nvPr>
-            <p:ph type="body" idx="1"/>
-          </p:nvPr>
-        </p:nvSpPr>
-        <p:spPr/>
-        <p:txBody>
-          <a:bodyPr>
-            <a:normAutofit/>
-          </a:bodyPr>
-          <a:lstStyle/>
-          <a:p>
-            <a:r>
-              <a:rPr lang="es-CO" dirty="0"/>
-              <a:t>Es independiente</a:t>
-            </a:r>
-            <a:r>
-              <a:rPr lang="es-CO" baseline="0" dirty="0"/>
-              <a:t> de la sintaxis de los lenguajes de programación. Lo que busca es representar la idea independientemente de la notación. Se pueden usar las palabras que se deseen para representar un programa en pseudocódigo. La idea es que cualquiera que lea el algoritmo, entienda la lógica del programa aunque no domine el lenguaje de programación en el que esté escrito. </a:t>
-            </a:r>
-          </a:p>
-          <a:p>
-            <a:endParaRPr lang="es-CO" baseline="0" dirty="0"/>
-          </a:p>
-          <a:p>
-            <a:r>
-              <a:rPr lang="es-CO" sz="1200" dirty="0"/>
-              <a:t>Son proposiciones informales que permiten expresar  detalladamente las instrucciones que llevan desde un estado inicial (problema) hasta un resultados deseado (solución), pero que no requiere de una sintaxis particular</a:t>
-            </a:r>
-          </a:p>
-          <a:p>
-            <a:pPr marL="0" marR="0" indent="0" algn="l" defTabSz="914400" rtl="0" eaLnBrk="1" fontAlgn="auto" latinLnBrk="0" hangingPunct="1">
-              <a:lnSpc>
-                <a:spcPct val="100000"/>
-              </a:lnSpc>
-              <a:spcBef>
-                <a:spcPts val="0"/>
-              </a:spcBef>
-              <a:spcAft>
-                <a:spcPts val="0"/>
-              </a:spcAft>
-              <a:buClrTx/>
-              <a:buSzTx/>
-              <a:buFontTx/>
-              <a:buNone/>
-              <a:tabLst/>
-              <a:defRPr/>
-            </a:pPr>
-            <a:endParaRPr lang="es-CO" dirty="0"/>
-          </a:p>
-          <a:p>
-            <a:pPr marL="0" marR="0" indent="0" algn="l" defTabSz="914400" rtl="0" eaLnBrk="1" fontAlgn="auto" latinLnBrk="0" hangingPunct="1">
-              <a:lnSpc>
-                <a:spcPct val="100000"/>
-              </a:lnSpc>
-              <a:spcBef>
-                <a:spcPts val="0"/>
-              </a:spcBef>
-              <a:spcAft>
-                <a:spcPts val="0"/>
-              </a:spcAft>
-              <a:buClrTx/>
-              <a:buSzTx/>
-              <a:buFontTx/>
-              <a:buNone/>
-              <a:tabLst/>
-              <a:defRPr/>
-            </a:pPr>
-            <a:r>
-              <a:rPr lang="es-CO" dirty="0"/>
-              <a:t>Pseudocódigo viene de falso código</a:t>
-            </a:r>
-          </a:p>
-          <a:p>
-            <a:pPr marL="0" marR="0" indent="0" algn="l" defTabSz="914400" rtl="0" eaLnBrk="1" fontAlgn="auto" latinLnBrk="0" hangingPunct="1">
-              <a:lnSpc>
-                <a:spcPct val="100000"/>
-              </a:lnSpc>
-              <a:spcBef>
-                <a:spcPts val="0"/>
-              </a:spcBef>
-              <a:spcAft>
-                <a:spcPts val="0"/>
-              </a:spcAft>
-              <a:buClrTx/>
-              <a:buSzTx/>
-              <a:buFontTx/>
-              <a:buNone/>
-              <a:tabLst/>
-              <a:defRPr/>
-            </a:pPr>
-            <a:endParaRPr lang="es-CO" dirty="0"/>
-          </a:p>
-          <a:p>
-            <a:pPr marL="0" marR="0" indent="0" algn="l" defTabSz="914400" rtl="0" eaLnBrk="1" fontAlgn="auto" latinLnBrk="0" hangingPunct="1">
-              <a:lnSpc>
-                <a:spcPct val="100000"/>
-              </a:lnSpc>
-              <a:spcBef>
-                <a:spcPts val="0"/>
-              </a:spcBef>
-              <a:spcAft>
-                <a:spcPts val="0"/>
-              </a:spcAft>
-              <a:buClrTx/>
-              <a:buSzTx/>
-              <a:buFontTx/>
-              <a:buNone/>
-              <a:tabLst/>
-              <a:defRPr/>
-            </a:pPr>
-            <a:r>
-              <a:rPr lang="es-CO" sz="1200" b="0" i="0" kern="1200" dirty="0">
-                <a:solidFill>
-                  <a:schemeClr val="tx1"/>
-                </a:solidFill>
-                <a:latin typeface="+mn-lt"/>
-                <a:ea typeface="+mn-ea"/>
-                <a:cs typeface="+mn-cs"/>
-              </a:rPr>
-              <a:t>El estudio de un idioma de </a:t>
-            </a:r>
-            <a:r>
-              <a:rPr lang="es-CO" sz="1200" b="0" i="0" kern="1200" dirty="0" err="1">
-                <a:solidFill>
-                  <a:schemeClr val="tx1"/>
-                </a:solidFill>
-                <a:latin typeface="+mn-lt"/>
-                <a:ea typeface="+mn-ea"/>
-                <a:cs typeface="+mn-cs"/>
-              </a:rPr>
-              <a:t>programacion</a:t>
-            </a:r>
-            <a:r>
-              <a:rPr lang="es-CO" sz="1200" b="0" i="0" kern="1200" dirty="0">
-                <a:solidFill>
-                  <a:schemeClr val="tx1"/>
-                </a:solidFill>
-                <a:latin typeface="+mn-lt"/>
-                <a:ea typeface="+mn-ea"/>
-                <a:cs typeface="+mn-cs"/>
-              </a:rPr>
-              <a:t>, requiere </a:t>
-            </a:r>
-            <a:r>
-              <a:rPr lang="es-CO" sz="1200" b="0" i="0" kern="1200" dirty="0" err="1">
-                <a:solidFill>
-                  <a:schemeClr val="tx1"/>
-                </a:solidFill>
-                <a:latin typeface="+mn-lt"/>
-                <a:ea typeface="+mn-ea"/>
-                <a:cs typeface="+mn-cs"/>
-              </a:rPr>
-              <a:t>ademas</a:t>
-            </a:r>
-            <a:r>
-              <a:rPr lang="es-CO" sz="1200" b="0" i="0" kern="1200" dirty="0">
-                <a:solidFill>
-                  <a:schemeClr val="tx1"/>
-                </a:solidFill>
-                <a:latin typeface="+mn-lt"/>
-                <a:ea typeface="+mn-ea"/>
-                <a:cs typeface="+mn-cs"/>
-              </a:rPr>
-              <a:t> de conocer la </a:t>
-            </a:r>
-            <a:r>
-              <a:rPr lang="es-CO" sz="1200" b="0" i="0" kern="1200" dirty="0" err="1">
-                <a:solidFill>
-                  <a:schemeClr val="tx1"/>
-                </a:solidFill>
-                <a:latin typeface="+mn-lt"/>
-                <a:ea typeface="+mn-ea"/>
-                <a:cs typeface="+mn-cs"/>
-              </a:rPr>
-              <a:t>logica</a:t>
-            </a:r>
-            <a:r>
-              <a:rPr lang="es-CO" sz="1200" b="0" i="0" kern="1200" dirty="0">
-                <a:solidFill>
-                  <a:schemeClr val="tx1"/>
-                </a:solidFill>
-                <a:latin typeface="+mn-lt"/>
-                <a:ea typeface="+mn-ea"/>
-                <a:cs typeface="+mn-cs"/>
-              </a:rPr>
-              <a:t> con que se desarrolla un algoritmo (que seria el </a:t>
-            </a:r>
-            <a:r>
-              <a:rPr lang="es-CO" sz="1200" b="0" i="0" kern="1200" dirty="0" err="1">
-                <a:solidFill>
-                  <a:schemeClr val="tx1"/>
-                </a:solidFill>
-                <a:latin typeface="+mn-lt"/>
-                <a:ea typeface="+mn-ea"/>
-                <a:cs typeface="+mn-cs"/>
-              </a:rPr>
-              <a:t>pseudocodigo</a:t>
-            </a:r>
-            <a:r>
-              <a:rPr lang="es-CO" sz="1200" b="0" i="0" kern="1200" dirty="0">
-                <a:solidFill>
-                  <a:schemeClr val="tx1"/>
-                </a:solidFill>
-                <a:latin typeface="+mn-lt"/>
-                <a:ea typeface="+mn-ea"/>
-                <a:cs typeface="+mn-cs"/>
-              </a:rPr>
-              <a:t>) conocer las funciones disponibles su sintaxis y a que </a:t>
-            </a:r>
-            <a:r>
-              <a:rPr lang="es-CO" sz="1200" b="0" i="0" kern="1200" dirty="0" err="1">
-                <a:solidFill>
-                  <a:schemeClr val="tx1"/>
-                </a:solidFill>
-                <a:latin typeface="+mn-lt"/>
-                <a:ea typeface="+mn-ea"/>
-                <a:cs typeface="+mn-cs"/>
-              </a:rPr>
-              <a:t>complememnto</a:t>
-            </a:r>
-            <a:r>
-              <a:rPr lang="es-CO" sz="1200" b="0" i="0" kern="1200" dirty="0">
-                <a:solidFill>
-                  <a:schemeClr val="tx1"/>
-                </a:solidFill>
-                <a:latin typeface="+mn-lt"/>
-                <a:ea typeface="+mn-ea"/>
-                <a:cs typeface="+mn-cs"/>
-              </a:rPr>
-              <a:t> o </a:t>
-            </a:r>
-            <a:r>
-              <a:rPr lang="es-CO" sz="1200" b="0" i="0" kern="1200" dirty="0" err="1">
-                <a:solidFill>
-                  <a:schemeClr val="tx1"/>
-                </a:solidFill>
-                <a:latin typeface="+mn-lt"/>
-                <a:ea typeface="+mn-ea"/>
-                <a:cs typeface="+mn-cs"/>
-              </a:rPr>
-              <a:t>libreria</a:t>
-            </a:r>
-            <a:r>
-              <a:rPr lang="es-CO" sz="1200" b="0" i="0" kern="1200" dirty="0">
-                <a:solidFill>
-                  <a:schemeClr val="tx1"/>
-                </a:solidFill>
-                <a:latin typeface="+mn-lt"/>
-                <a:ea typeface="+mn-ea"/>
-                <a:cs typeface="+mn-cs"/>
-              </a:rPr>
-              <a:t> pertenecen, ya que esta debe ser incluida en el proyecto.</a:t>
-            </a:r>
-            <a:endParaRPr lang="es-CO" dirty="0"/>
-          </a:p>
-          <a:p>
-            <a:endParaRPr lang="es-CO" dirty="0"/>
-          </a:p>
-        </p:txBody>
-      </p:sp>
-      <p:sp>
-        <p:nvSpPr>
-          <p:cNvPr id="4" name="3 Marcador de número de diapositiva"/>
-          <p:cNvSpPr>
-            <a:spLocks noGrp="1"/>
-          </p:cNvSpPr>
-          <p:nvPr>
-            <p:ph type="sldNum" sz="quarter" idx="10"/>
-          </p:nvPr>
-        </p:nvSpPr>
-        <p:spPr/>
-        <p:txBody>
-          <a:bodyPr/>
-          <a:lstStyle/>
-          <a:p>
-            <a:fld id="{E21E405C-8F13-4C14-8D34-C311A8C5D90E}" type="slidenum">
-              <a:rPr lang="es-CO" smtClean="0"/>
-              <a:pPr/>
-              <a:t>26</a:t>
-            </a:fld>
-            <a:endParaRPr lang="es-CO"/>
-          </a:p>
-        </p:txBody>
-      </p:sp>
-    </p:spTree>
-    <p:extLst>
-      <p:ext uri="{BB962C8B-B14F-4D97-AF65-F5344CB8AC3E}">
-        <p14:creationId xmlns:p14="http://schemas.microsoft.com/office/powerpoint/2010/main" val="654691346"/>
       </p:ext>
     </p:extLst>
   </p:cSld>
@@ -25345,7 +25310,7 @@
     </p:spTree>
     <p:extLst>
       <p:ext uri="{BB962C8B-B14F-4D97-AF65-F5344CB8AC3E}">
-        <p14:creationId xmlns:p14="http://schemas.microsoft.com/office/powerpoint/2010/main" val="1969508784"/>
+        <p14:creationId xmlns:p14="http://schemas.microsoft.com/office/powerpoint/2010/main" val="654691346"/>
       </p:ext>
     </p:extLst>
   </p:cSld>
@@ -25668,7 +25633,339 @@
             <a:fld id="{E21E405C-8F13-4C14-8D34-C311A8C5D90E}" type="slidenum">
               <a:rPr lang="es-CO" smtClean="0"/>
               <a:pPr/>
-              <a:t>31</a:t>
+              <a:t>28</a:t>
+            </a:fld>
+            <a:endParaRPr lang="es-CO"/>
+          </a:p>
+        </p:txBody>
+      </p:sp>
+    </p:spTree>
+    <p:extLst>
+      <p:ext uri="{BB962C8B-B14F-4D97-AF65-F5344CB8AC3E}">
+        <p14:creationId xmlns:p14="http://schemas.microsoft.com/office/powerpoint/2010/main" val="1969508784"/>
+      </p:ext>
+    </p:extLst>
+  </p:cSld>
+  <p:clrMapOvr>
+    <a:masterClrMapping/>
+  </p:clrMapOvr>
+</p:notes>
+</file>
+
+<file path=ppt/notesSlides/notesSlide8.xml><?xml version="1.0" encoding="utf-8"?>
+<p:notes xmlns:a="http://schemas.openxmlformats.org/drawingml/2006/main" xmlns:r="http://schemas.openxmlformats.org/officeDocument/2006/relationships" xmlns:p="http://schemas.openxmlformats.org/presentationml/2006/main">
+  <p:cSld>
+    <p:spTree>
+      <p:nvGrpSpPr>
+        <p:cNvPr id="1" name=""/>
+        <p:cNvGrpSpPr/>
+        <p:nvPr/>
+      </p:nvGrpSpPr>
+      <p:grpSpPr>
+        <a:xfrm>
+          <a:off x="0" y="0"/>
+          <a:ext cx="0" cy="0"/>
+          <a:chOff x="0" y="0"/>
+          <a:chExt cx="0" cy="0"/>
+        </a:xfrm>
+      </p:grpSpPr>
+      <p:sp>
+        <p:nvSpPr>
+          <p:cNvPr id="2" name="1 Marcador de imagen de diapositiva"/>
+          <p:cNvSpPr>
+            <a:spLocks noGrp="1" noRot="1" noChangeAspect="1"/>
+          </p:cNvSpPr>
+          <p:nvPr>
+            <p:ph type="sldImg"/>
+          </p:nvPr>
+        </p:nvSpPr>
+        <p:spPr/>
+      </p:sp>
+      <p:sp>
+        <p:nvSpPr>
+          <p:cNvPr id="3" name="2 Marcador de notas"/>
+          <p:cNvSpPr>
+            <a:spLocks noGrp="1"/>
+          </p:cNvSpPr>
+          <p:nvPr>
+            <p:ph type="body" idx="1"/>
+          </p:nvPr>
+        </p:nvSpPr>
+        <p:spPr/>
+        <p:txBody>
+          <a:bodyPr>
+            <a:normAutofit/>
+          </a:bodyPr>
+          <a:lstStyle/>
+          <a:p>
+            <a:r>
+              <a:rPr lang="es-CO" dirty="0"/>
+              <a:t>Es independiente</a:t>
+            </a:r>
+            <a:r>
+              <a:rPr lang="es-CO" baseline="0" dirty="0"/>
+              <a:t> de la sintaxis de los lenguajes de programación. Lo que busca es representar la idea independientemente de la notación. Se pueden usar las palabras que se deseen para representar un programa en pseudocódigo. La idea es que cualquiera que lea el algoritmo, entienda la lógica del programa aunque no domine el lenguaje de programación en el que esté escrito. </a:t>
+            </a:r>
+          </a:p>
+          <a:p>
+            <a:endParaRPr lang="es-CO" baseline="0" dirty="0"/>
+          </a:p>
+          <a:p>
+            <a:r>
+              <a:rPr lang="es-CO" sz="1200" dirty="0"/>
+              <a:t>Son proposiciones informales que permiten expresar  detalladamente las instrucciones que llevan desde un estado inicial (problema) hasta un resultados deseado (solución), pero que no requiere de una sintaxis particular</a:t>
+            </a:r>
+          </a:p>
+          <a:p>
+            <a:pPr marL="0" marR="0" indent="0" algn="l" defTabSz="914400" rtl="0" eaLnBrk="1" fontAlgn="auto" latinLnBrk="0" hangingPunct="1">
+              <a:lnSpc>
+                <a:spcPct val="100000"/>
+              </a:lnSpc>
+              <a:spcBef>
+                <a:spcPts val="0"/>
+              </a:spcBef>
+              <a:spcAft>
+                <a:spcPts val="0"/>
+              </a:spcAft>
+              <a:buClrTx/>
+              <a:buSzTx/>
+              <a:buFontTx/>
+              <a:buNone/>
+              <a:tabLst/>
+              <a:defRPr/>
+            </a:pPr>
+            <a:endParaRPr lang="es-CO" dirty="0"/>
+          </a:p>
+          <a:p>
+            <a:pPr marL="0" marR="0" indent="0" algn="l" defTabSz="914400" rtl="0" eaLnBrk="1" fontAlgn="auto" latinLnBrk="0" hangingPunct="1">
+              <a:lnSpc>
+                <a:spcPct val="100000"/>
+              </a:lnSpc>
+              <a:spcBef>
+                <a:spcPts val="0"/>
+              </a:spcBef>
+              <a:spcAft>
+                <a:spcPts val="0"/>
+              </a:spcAft>
+              <a:buClrTx/>
+              <a:buSzTx/>
+              <a:buFontTx/>
+              <a:buNone/>
+              <a:tabLst/>
+              <a:defRPr/>
+            </a:pPr>
+            <a:r>
+              <a:rPr lang="es-CO" dirty="0"/>
+              <a:t>Pseudocódigo viene de falso código</a:t>
+            </a:r>
+          </a:p>
+          <a:p>
+            <a:pPr marL="0" marR="0" indent="0" algn="l" defTabSz="914400" rtl="0" eaLnBrk="1" fontAlgn="auto" latinLnBrk="0" hangingPunct="1">
+              <a:lnSpc>
+                <a:spcPct val="100000"/>
+              </a:lnSpc>
+              <a:spcBef>
+                <a:spcPts val="0"/>
+              </a:spcBef>
+              <a:spcAft>
+                <a:spcPts val="0"/>
+              </a:spcAft>
+              <a:buClrTx/>
+              <a:buSzTx/>
+              <a:buFontTx/>
+              <a:buNone/>
+              <a:tabLst/>
+              <a:defRPr/>
+            </a:pPr>
+            <a:endParaRPr lang="es-CO" dirty="0"/>
+          </a:p>
+          <a:p>
+            <a:pPr marL="0" marR="0" indent="0" algn="l" defTabSz="914400" rtl="0" eaLnBrk="1" fontAlgn="auto" latinLnBrk="0" hangingPunct="1">
+              <a:lnSpc>
+                <a:spcPct val="100000"/>
+              </a:lnSpc>
+              <a:spcBef>
+                <a:spcPts val="0"/>
+              </a:spcBef>
+              <a:spcAft>
+                <a:spcPts val="0"/>
+              </a:spcAft>
+              <a:buClrTx/>
+              <a:buSzTx/>
+              <a:buFontTx/>
+              <a:buNone/>
+              <a:tabLst/>
+              <a:defRPr/>
+            </a:pPr>
+            <a:r>
+              <a:rPr lang="es-CO" sz="1200" b="0" i="0" kern="1200" dirty="0">
+                <a:solidFill>
+                  <a:schemeClr val="tx1"/>
+                </a:solidFill>
+                <a:latin typeface="+mn-lt"/>
+                <a:ea typeface="+mn-ea"/>
+                <a:cs typeface="+mn-cs"/>
+              </a:rPr>
+              <a:t>El estudio de un idioma de </a:t>
+            </a:r>
+            <a:r>
+              <a:rPr lang="es-CO" sz="1200" b="0" i="0" kern="1200" dirty="0" err="1">
+                <a:solidFill>
+                  <a:schemeClr val="tx1"/>
+                </a:solidFill>
+                <a:latin typeface="+mn-lt"/>
+                <a:ea typeface="+mn-ea"/>
+                <a:cs typeface="+mn-cs"/>
+              </a:rPr>
+              <a:t>programacion</a:t>
+            </a:r>
+            <a:r>
+              <a:rPr lang="es-CO" sz="1200" b="0" i="0" kern="1200" dirty="0">
+                <a:solidFill>
+                  <a:schemeClr val="tx1"/>
+                </a:solidFill>
+                <a:latin typeface="+mn-lt"/>
+                <a:ea typeface="+mn-ea"/>
+                <a:cs typeface="+mn-cs"/>
+              </a:rPr>
+              <a:t>, requiere </a:t>
+            </a:r>
+            <a:r>
+              <a:rPr lang="es-CO" sz="1200" b="0" i="0" kern="1200" dirty="0" err="1">
+                <a:solidFill>
+                  <a:schemeClr val="tx1"/>
+                </a:solidFill>
+                <a:latin typeface="+mn-lt"/>
+                <a:ea typeface="+mn-ea"/>
+                <a:cs typeface="+mn-cs"/>
+              </a:rPr>
+              <a:t>ademas</a:t>
+            </a:r>
+            <a:r>
+              <a:rPr lang="es-CO" sz="1200" b="0" i="0" kern="1200" dirty="0">
+                <a:solidFill>
+                  <a:schemeClr val="tx1"/>
+                </a:solidFill>
+                <a:latin typeface="+mn-lt"/>
+                <a:ea typeface="+mn-ea"/>
+                <a:cs typeface="+mn-cs"/>
+              </a:rPr>
+              <a:t> de conocer la </a:t>
+            </a:r>
+            <a:r>
+              <a:rPr lang="es-CO" sz="1200" b="0" i="0" kern="1200" dirty="0" err="1">
+                <a:solidFill>
+                  <a:schemeClr val="tx1"/>
+                </a:solidFill>
+                <a:latin typeface="+mn-lt"/>
+                <a:ea typeface="+mn-ea"/>
+                <a:cs typeface="+mn-cs"/>
+              </a:rPr>
+              <a:t>logica</a:t>
+            </a:r>
+            <a:r>
+              <a:rPr lang="es-CO" sz="1200" b="0" i="0" kern="1200" dirty="0">
+                <a:solidFill>
+                  <a:schemeClr val="tx1"/>
+                </a:solidFill>
+                <a:latin typeface="+mn-lt"/>
+                <a:ea typeface="+mn-ea"/>
+                <a:cs typeface="+mn-cs"/>
+              </a:rPr>
+              <a:t> con que se desarrolla un algoritmo (que seria el </a:t>
+            </a:r>
+            <a:r>
+              <a:rPr lang="es-CO" sz="1200" b="0" i="0" kern="1200" dirty="0" err="1">
+                <a:solidFill>
+                  <a:schemeClr val="tx1"/>
+                </a:solidFill>
+                <a:latin typeface="+mn-lt"/>
+                <a:ea typeface="+mn-ea"/>
+                <a:cs typeface="+mn-cs"/>
+              </a:rPr>
+              <a:t>pseudocodigo</a:t>
+            </a:r>
+            <a:r>
+              <a:rPr lang="es-CO" sz="1200" b="0" i="0" kern="1200" dirty="0">
+                <a:solidFill>
+                  <a:schemeClr val="tx1"/>
+                </a:solidFill>
+                <a:latin typeface="+mn-lt"/>
+                <a:ea typeface="+mn-ea"/>
+                <a:cs typeface="+mn-cs"/>
+              </a:rPr>
+              <a:t>) conocer las funciones disponibles su sintaxis y a que </a:t>
+            </a:r>
+            <a:r>
+              <a:rPr lang="es-CO" sz="1200" b="0" i="0" kern="1200" dirty="0" err="1">
+                <a:solidFill>
+                  <a:schemeClr val="tx1"/>
+                </a:solidFill>
+                <a:latin typeface="+mn-lt"/>
+                <a:ea typeface="+mn-ea"/>
+                <a:cs typeface="+mn-cs"/>
+              </a:rPr>
+              <a:t>complememnto</a:t>
+            </a:r>
+            <a:r>
+              <a:rPr lang="es-CO" sz="1200" b="0" i="0" kern="1200" dirty="0">
+                <a:solidFill>
+                  <a:schemeClr val="tx1"/>
+                </a:solidFill>
+                <a:latin typeface="+mn-lt"/>
+                <a:ea typeface="+mn-ea"/>
+                <a:cs typeface="+mn-cs"/>
+              </a:rPr>
+              <a:t> o </a:t>
+            </a:r>
+            <a:r>
+              <a:rPr lang="es-CO" sz="1200" b="0" i="0" kern="1200" dirty="0" err="1">
+                <a:solidFill>
+                  <a:schemeClr val="tx1"/>
+                </a:solidFill>
+                <a:latin typeface="+mn-lt"/>
+                <a:ea typeface="+mn-ea"/>
+                <a:cs typeface="+mn-cs"/>
+              </a:rPr>
+              <a:t>libreria</a:t>
+            </a:r>
+            <a:r>
+              <a:rPr lang="es-CO" sz="1200" b="0" i="0" kern="1200" dirty="0">
+                <a:solidFill>
+                  <a:schemeClr val="tx1"/>
+                </a:solidFill>
+                <a:latin typeface="+mn-lt"/>
+                <a:ea typeface="+mn-ea"/>
+                <a:cs typeface="+mn-cs"/>
+              </a:rPr>
+              <a:t> pertenecen, ya que esta debe ser incluida en el proyecto.</a:t>
+            </a:r>
+            <a:endParaRPr lang="es-CO" dirty="0"/>
+          </a:p>
+          <a:p>
+            <a:endParaRPr lang="es-CO" dirty="0"/>
+          </a:p>
+        </p:txBody>
+      </p:sp>
+      <p:sp>
+        <p:nvSpPr>
+          <p:cNvPr id="4" name="3 Marcador de número de diapositiva"/>
+          <p:cNvSpPr>
+            <a:spLocks noGrp="1"/>
+          </p:cNvSpPr>
+          <p:nvPr>
+            <p:ph type="sldNum" sz="quarter" idx="10"/>
+          </p:nvPr>
+        </p:nvSpPr>
+        <p:spPr/>
+        <p:txBody>
+          <a:bodyPr/>
+          <a:lstStyle/>
+          <a:p>
+            <a:fld id="{E21E405C-8F13-4C14-8D34-C311A8C5D90E}" type="slidenum">
+              <a:rPr lang="es-CO" smtClean="0"/>
+              <a:pPr/>
+              <a:t>32</a:t>
             </a:fld>
             <a:endParaRPr lang="es-CO"/>
           </a:p>
@@ -25687,7 +25984,7 @@
 </p:notes>
 </file>
 
-<file path=ppt/notesSlides/notesSlide8.xml><?xml version="1.0" encoding="utf-8"?>
+<file path=ppt/notesSlides/notesSlide9.xml><?xml version="1.0" encoding="utf-8"?>
 <p:notes xmlns:a="http://schemas.openxmlformats.org/drawingml/2006/main" xmlns:r="http://schemas.openxmlformats.org/officeDocument/2006/relationships" xmlns:p="http://schemas.openxmlformats.org/presentationml/2006/main">
   <p:cSld>
     <p:spTree>
@@ -25755,7 +26052,7 @@
             <a:fld id="{E21E405C-8F13-4C14-8D34-C311A8C5D90E}" type="slidenum">
               <a:rPr lang="es-CO" smtClean="0"/>
               <a:pPr/>
-              <a:t>35</a:t>
+              <a:t>36</a:t>
             </a:fld>
             <a:endParaRPr lang="es-CO"/>
           </a:p>
@@ -25765,205 +26062,6 @@
     <p:extLst>
       <p:ext uri="{BB962C8B-B14F-4D97-AF65-F5344CB8AC3E}">
         <p14:creationId xmlns:p14="http://schemas.microsoft.com/office/powerpoint/2010/main" val="236557878"/>
-      </p:ext>
-    </p:extLst>
-  </p:cSld>
-  <p:clrMapOvr>
-    <a:masterClrMapping/>
-  </p:clrMapOvr>
-</p:notes>
-</file>
-
-<file path=ppt/notesSlides/notesSlide9.xml><?xml version="1.0" encoding="utf-8"?>
-<p:notes xmlns:a="http://schemas.openxmlformats.org/drawingml/2006/main" xmlns:r="http://schemas.openxmlformats.org/officeDocument/2006/relationships" xmlns:p="http://schemas.openxmlformats.org/presentationml/2006/main">
-  <p:cSld>
-    <p:spTree>
-      <p:nvGrpSpPr>
-        <p:cNvPr id="1" name=""/>
-        <p:cNvGrpSpPr/>
-        <p:nvPr/>
-      </p:nvGrpSpPr>
-      <p:grpSpPr>
-        <a:xfrm>
-          <a:off x="0" y="0"/>
-          <a:ext cx="0" cy="0"/>
-          <a:chOff x="0" y="0"/>
-          <a:chExt cx="0" cy="0"/>
-        </a:xfrm>
-      </p:grpSpPr>
-      <p:sp>
-        <p:nvSpPr>
-          <p:cNvPr id="2" name="1 Marcador de imagen de diapositiva"/>
-          <p:cNvSpPr>
-            <a:spLocks noGrp="1" noRot="1" noChangeAspect="1"/>
-          </p:cNvSpPr>
-          <p:nvPr>
-            <p:ph type="sldImg"/>
-          </p:nvPr>
-        </p:nvSpPr>
-        <p:spPr/>
-      </p:sp>
-      <p:sp>
-        <p:nvSpPr>
-          <p:cNvPr id="3" name="2 Marcador de notas"/>
-          <p:cNvSpPr>
-            <a:spLocks noGrp="1"/>
-          </p:cNvSpPr>
-          <p:nvPr>
-            <p:ph type="body" idx="1"/>
-          </p:nvPr>
-        </p:nvSpPr>
-        <p:spPr/>
-        <p:txBody>
-          <a:bodyPr>
-            <a:normAutofit/>
-          </a:bodyPr>
-          <a:lstStyle/>
-          <a:p>
-            <a:pPr marL="0" marR="0" indent="0" algn="l" defTabSz="914400" rtl="0" eaLnBrk="1" fontAlgn="auto" latinLnBrk="0" hangingPunct="1">
-              <a:lnSpc>
-                <a:spcPct val="100000"/>
-              </a:lnSpc>
-              <a:spcBef>
-                <a:spcPts val="0"/>
-              </a:spcBef>
-              <a:spcAft>
-                <a:spcPts val="0"/>
-              </a:spcAft>
-              <a:buClrTx/>
-              <a:buSzTx/>
-              <a:buFontTx/>
-              <a:buNone/>
-              <a:tabLst/>
-              <a:defRPr/>
-            </a:pPr>
-            <a:r>
-              <a:rPr lang="es-CO" sz="1200" b="0" i="0" kern="1200" dirty="0">
-                <a:solidFill>
-                  <a:schemeClr val="tx1"/>
-                </a:solidFill>
-                <a:latin typeface="+mn-lt"/>
-                <a:ea typeface="+mn-ea"/>
-                <a:cs typeface="+mn-cs"/>
-              </a:rPr>
-              <a:t>El </a:t>
-            </a:r>
-            <a:r>
-              <a:rPr lang="es-CO" sz="1200" b="0" i="1" kern="1200" dirty="0">
-                <a:solidFill>
-                  <a:schemeClr val="tx1"/>
-                </a:solidFill>
-                <a:latin typeface="+mn-lt"/>
-                <a:ea typeface="+mn-ea"/>
-                <a:cs typeface="+mn-cs"/>
-              </a:rPr>
-              <a:t>lenguaje máquina</a:t>
-            </a:r>
-            <a:r>
-              <a:rPr lang="es-CO" sz="1200" b="0" i="0" kern="1200" dirty="0">
-                <a:solidFill>
-                  <a:schemeClr val="tx1"/>
-                </a:solidFill>
-                <a:latin typeface="+mn-lt"/>
-                <a:ea typeface="+mn-ea"/>
-                <a:cs typeface="+mn-cs"/>
-              </a:rPr>
-              <a:t> de una </a:t>
-            </a:r>
-            <a:r>
-              <a:rPr lang="es-CO" sz="1200" b="0" i="0" u="none" strike="noStrike" kern="1200" dirty="0">
-                <a:solidFill>
-                  <a:schemeClr val="tx1"/>
-                </a:solidFill>
-                <a:latin typeface="+mn-lt"/>
-                <a:ea typeface="+mn-ea"/>
-                <a:cs typeface="+mn-cs"/>
-                <a:hlinkClick r:id="rId3"/>
-              </a:rPr>
-              <a:t>computadora</a:t>
-            </a:r>
-            <a:r>
-              <a:rPr lang="es-CO" sz="1200" b="0" i="0" kern="1200" dirty="0">
-                <a:solidFill>
-                  <a:schemeClr val="tx1"/>
-                </a:solidFill>
-                <a:latin typeface="+mn-lt"/>
-                <a:ea typeface="+mn-ea"/>
-                <a:cs typeface="+mn-cs"/>
-              </a:rPr>
-              <a:t> consta de cadenas de números binarios (ceros y unos) y es el único que "entienden" directamente los </a:t>
-            </a:r>
-            <a:r>
-              <a:rPr lang="es-CO" sz="1200" b="0" i="0" u="none" strike="noStrike" kern="1200" dirty="0">
-                <a:solidFill>
-                  <a:schemeClr val="tx1"/>
-                </a:solidFill>
-                <a:latin typeface="+mn-lt"/>
-                <a:ea typeface="+mn-ea"/>
-                <a:cs typeface="+mn-cs"/>
-                <a:hlinkClick r:id="rId4"/>
-              </a:rPr>
-              <a:t>procesadores</a:t>
-            </a:r>
-            <a:r>
-              <a:rPr lang="es-CO" sz="1200" b="0" i="0" kern="1200" dirty="0">
-                <a:solidFill>
-                  <a:schemeClr val="tx1"/>
-                </a:solidFill>
-                <a:latin typeface="+mn-lt"/>
-                <a:ea typeface="+mn-ea"/>
-                <a:cs typeface="+mn-cs"/>
-              </a:rPr>
-              <a:t>. </a:t>
-            </a:r>
-            <a:br>
-              <a:rPr lang="es-CO" sz="1200" b="0" i="0" kern="1200" dirty="0">
-                <a:solidFill>
-                  <a:schemeClr val="tx1"/>
-                </a:solidFill>
-                <a:latin typeface="+mn-lt"/>
-                <a:ea typeface="+mn-ea"/>
-                <a:cs typeface="+mn-cs"/>
-              </a:rPr>
-            </a:br>
-            <a:r>
-              <a:rPr lang="es-CO" dirty="0"/>
-              <a:t>Existen dos formas de obtener un código ejecutable a partir de un programa fuente: los intérpretes y los compiladores</a:t>
-            </a:r>
-          </a:p>
-          <a:p>
-            <a:endParaRPr lang="es-CO" dirty="0"/>
-          </a:p>
-        </p:txBody>
-      </p:sp>
-      <p:sp>
-        <p:nvSpPr>
-          <p:cNvPr id="4" name="3 Marcador de número de diapositiva"/>
-          <p:cNvSpPr>
-            <a:spLocks noGrp="1"/>
-          </p:cNvSpPr>
-          <p:nvPr>
-            <p:ph type="sldNum" sz="quarter" idx="10"/>
-          </p:nvPr>
-        </p:nvSpPr>
-        <p:spPr/>
-        <p:txBody>
-          <a:bodyPr/>
-          <a:lstStyle/>
-          <a:p>
-            <a:fld id="{E21E405C-8F13-4C14-8D34-C311A8C5D90E}" type="slidenum">
-              <a:rPr lang="es-CO" smtClean="0"/>
-              <a:pPr/>
-              <a:t>36</a:t>
-            </a:fld>
-            <a:endParaRPr lang="es-CO"/>
-          </a:p>
-        </p:txBody>
-      </p:sp>
-    </p:spTree>
-    <p:extLst>
-      <p:ext uri="{BB962C8B-B14F-4D97-AF65-F5344CB8AC3E}">
-        <p14:creationId xmlns:p14="http://schemas.microsoft.com/office/powerpoint/2010/main" val="1384588865"/>
       </p:ext>
     </p:extLst>
   </p:cSld>
@@ -26420,7 +26518,7 @@
             <a:fld id="{DCEF22F2-EA04-4B03-8A20-CFDE6BC87E1C}" type="datetimeFigureOut">
               <a:rPr lang="es-CO" smtClean="0"/>
               <a:pPr/>
-              <a:t>4/02/2020</a:t>
+              <a:t>1/02/2020</a:t>
             </a:fld>
             <a:endParaRPr lang="es-CO"/>
           </a:p>
@@ -26605,7 +26703,7 @@
             <a:fld id="{DCEF22F2-EA04-4B03-8A20-CFDE6BC87E1C}" type="datetimeFigureOut">
               <a:rPr lang="es-CO" smtClean="0"/>
               <a:pPr/>
-              <a:t>4/02/2020</a:t>
+              <a:t>1/02/2020</a:t>
             </a:fld>
             <a:endParaRPr lang="es-CO"/>
           </a:p>
@@ -26816,7 +26914,7 @@
             <a:fld id="{DCEF22F2-EA04-4B03-8A20-CFDE6BC87E1C}" type="datetimeFigureOut">
               <a:rPr lang="es-CO" smtClean="0"/>
               <a:pPr/>
-              <a:t>4/02/2020</a:t>
+              <a:t>1/02/2020</a:t>
             </a:fld>
             <a:endParaRPr lang="es-CO"/>
           </a:p>
@@ -27174,7 +27272,7 @@
             <a:fld id="{DCEF22F2-EA04-4B03-8A20-CFDE6BC87E1C}" type="datetimeFigureOut">
               <a:rPr lang="es-CO" smtClean="0"/>
               <a:pPr/>
-              <a:t>4/02/2020</a:t>
+              <a:t>1/02/2020</a:t>
             </a:fld>
             <a:endParaRPr lang="es-CO"/>
           </a:p>
@@ -27467,7 +27565,7 @@
             <a:fld id="{DCEF22F2-EA04-4B03-8A20-CFDE6BC87E1C}" type="datetimeFigureOut">
               <a:rPr lang="es-CO" smtClean="0"/>
               <a:pPr/>
-              <a:t>4/02/2020</a:t>
+              <a:t>1/02/2020</a:t>
             </a:fld>
             <a:endParaRPr lang="es-CO"/>
           </a:p>
@@ -27894,7 +27992,7 @@
             <a:fld id="{DCEF22F2-EA04-4B03-8A20-CFDE6BC87E1C}" type="datetimeFigureOut">
               <a:rPr lang="es-CO" smtClean="0"/>
               <a:pPr/>
-              <a:t>4/02/2020</a:t>
+              <a:t>1/02/2020</a:t>
             </a:fld>
             <a:endParaRPr lang="es-CO"/>
           </a:p>
@@ -28017,7 +28115,7 @@
             <a:fld id="{DCEF22F2-EA04-4B03-8A20-CFDE6BC87E1C}" type="datetimeFigureOut">
               <a:rPr lang="es-CO" smtClean="0"/>
               <a:pPr/>
-              <a:t>4/02/2020</a:t>
+              <a:t>1/02/2020</a:t>
             </a:fld>
             <a:endParaRPr lang="es-CO"/>
           </a:p>
@@ -28117,7 +28215,7 @@
             <a:fld id="{DCEF22F2-EA04-4B03-8A20-CFDE6BC87E1C}" type="datetimeFigureOut">
               <a:rPr lang="es-CO" smtClean="0"/>
               <a:pPr/>
-              <a:t>4/02/2020</a:t>
+              <a:t>1/02/2020</a:t>
             </a:fld>
             <a:endParaRPr lang="es-CO"/>
           </a:p>
@@ -28399,7 +28497,7 @@
             <a:fld id="{DCEF22F2-EA04-4B03-8A20-CFDE6BC87E1C}" type="datetimeFigureOut">
               <a:rPr lang="es-CO" smtClean="0"/>
               <a:pPr/>
-              <a:t>4/02/2020</a:t>
+              <a:t>1/02/2020</a:t>
             </a:fld>
             <a:endParaRPr lang="es-CO"/>
           </a:p>
@@ -28661,7 +28759,7 @@
             <a:fld id="{DCEF22F2-EA04-4B03-8A20-CFDE6BC87E1C}" type="datetimeFigureOut">
               <a:rPr lang="es-CO" smtClean="0"/>
               <a:pPr/>
-              <a:t>4/02/2020</a:t>
+              <a:t>1/02/2020</a:t>
             </a:fld>
             <a:endParaRPr lang="es-CO"/>
           </a:p>
@@ -28879,7 +28977,7 @@
             <a:fld id="{DCEF22F2-EA04-4B03-8A20-CFDE6BC87E1C}" type="datetimeFigureOut">
               <a:rPr lang="es-CO" smtClean="0"/>
               <a:pPr/>
-              <a:t>4/02/2020</a:t>
+              <a:t>1/02/2020</a:t>
             </a:fld>
             <a:endParaRPr lang="es-CO"/>
           </a:p>
@@ -29392,6 +29490,159 @@
           <a:chExt cx="0" cy="0"/>
         </a:xfrm>
       </p:grpSpPr>
+      <p:sp>
+        <p:nvSpPr>
+          <p:cNvPr id="7" name="6 CuadroTexto"/>
+          <p:cNvSpPr txBox="1"/>
+          <p:nvPr/>
+        </p:nvSpPr>
+        <p:spPr>
+          <a:xfrm>
+            <a:off x="251520" y="0"/>
+            <a:ext cx="8640960" cy="707886"/>
+          </a:xfrm>
+          <a:prstGeom prst="rect">
+            <a:avLst/>
+          </a:prstGeom>
+          <a:noFill/>
+        </p:spPr>
+        <p:txBody>
+          <a:bodyPr wrap="square" rtlCol="0">
+            <a:spAutoFit/>
+          </a:bodyPr>
+          <a:lstStyle/>
+          <a:p>
+            <a:pPr algn="ctr"/>
+            <a:r>
+              <a:rPr lang="es-CO" sz="4000" b="1" dirty="0"/>
+              <a:t>¿Qué veremos durante el curso?</a:t>
+            </a:r>
+          </a:p>
+        </p:txBody>
+      </p:sp>
+      <p:pic>
+        <p:nvPicPr>
+          <p:cNvPr id="3074" name="Picture 2"/>
+          <p:cNvPicPr>
+            <a:picLocks noChangeAspect="1" noChangeArrowheads="1"/>
+          </p:cNvPicPr>
+          <p:nvPr/>
+        </p:nvPicPr>
+        <p:blipFill>
+          <a:blip r:embed="rId3" cstate="print">
+            <a:extLst>
+              <a:ext uri="{28A0092B-C50C-407E-A947-70E740481C1C}">
+                <a14:useLocalDpi xmlns:a14="http://schemas.microsoft.com/office/drawing/2010/main" val="0"/>
+              </a:ext>
+            </a:extLst>
+          </a:blip>
+          <a:srcRect/>
+          <a:stretch>
+            <a:fillRect/>
+          </a:stretch>
+        </p:blipFill>
+        <p:spPr bwMode="auto">
+          <a:xfrm>
+            <a:off x="485723" y="1083960"/>
+            <a:ext cx="8388813" cy="4392488"/>
+          </a:xfrm>
+          <a:prstGeom prst="rect">
+            <a:avLst/>
+          </a:prstGeom>
+          <a:noFill/>
+          <a:ln>
+            <a:noFill/>
+          </a:ln>
+          <a:extLst>
+            <a:ext uri="{909E8E84-426E-40DD-AFC4-6F175D3DCCD1}">
+              <a14:hiddenFill xmlns:a14="http://schemas.microsoft.com/office/drawing/2010/main">
+                <a:solidFill>
+                  <a:schemeClr val="accent1"/>
+                </a:solidFill>
+              </a14:hiddenFill>
+            </a:ext>
+            <a:ext uri="{91240B29-F687-4F45-9708-019B960494DF}">
+              <a14:hiddenLine xmlns:a14="http://schemas.microsoft.com/office/drawing/2010/main" w="9525">
+                <a:solidFill>
+                  <a:schemeClr val="tx1"/>
+                </a:solidFill>
+                <a:miter lim="800000"/>
+                <a:headEnd/>
+                <a:tailEnd/>
+              </a14:hiddenLine>
+            </a:ext>
+          </a:extLst>
+        </p:spPr>
+      </p:pic>
+      <p:sp>
+        <p:nvSpPr>
+          <p:cNvPr id="4" name="5 Marcador de número de diapositiva"/>
+          <p:cNvSpPr>
+            <a:spLocks noGrp="1"/>
+          </p:cNvSpPr>
+          <p:nvPr>
+            <p:ph type="sldNum" sz="quarter" idx="12"/>
+          </p:nvPr>
+        </p:nvSpPr>
+        <p:spPr>
+          <a:xfrm>
+            <a:off x="7020272" y="6520259"/>
+            <a:ext cx="2133600" cy="365125"/>
+          </a:xfrm>
+        </p:spPr>
+        <p:txBody>
+          <a:bodyPr/>
+          <a:lstStyle>
+            <a:lvl1pPr>
+              <a:defRPr sz="2000" b="1">
+                <a:solidFill>
+                  <a:schemeClr val="bg2">
+                    <a:lumMod val="25000"/>
+                  </a:schemeClr>
+                </a:solidFill>
+              </a:defRPr>
+            </a:lvl1pPr>
+          </a:lstStyle>
+          <a:p>
+            <a:fld id="{2235B30C-86F8-49BD-820E-4721741473E2}" type="slidenum">
+              <a:rPr lang="es-CO" smtClean="0"/>
+              <a:pPr/>
+              <a:t>11</a:t>
+            </a:fld>
+            <a:endParaRPr lang="es-CO" dirty="0"/>
+          </a:p>
+        </p:txBody>
+      </p:sp>
+    </p:spTree>
+    <p:extLst>
+      <p:ext uri="{BB962C8B-B14F-4D97-AF65-F5344CB8AC3E}">
+        <p14:creationId xmlns:p14="http://schemas.microsoft.com/office/powerpoint/2010/main" val="37180754"/>
+      </p:ext>
+    </p:extLst>
+  </p:cSld>
+  <p:clrMapOvr>
+    <a:masterClrMapping/>
+  </p:clrMapOvr>
+</p:sld>
+</file>
+
+<file path=ppt/slides/slide12.xml><?xml version="1.0" encoding="utf-8"?>
+<p:sld xmlns:a="http://schemas.openxmlformats.org/drawingml/2006/main" xmlns:r="http://schemas.openxmlformats.org/officeDocument/2006/relationships" xmlns:p="http://schemas.openxmlformats.org/presentationml/2006/main">
+  <p:cSld>
+    <p:spTree>
+      <p:nvGrpSpPr>
+        <p:cNvPr id="1" name=""/>
+        <p:cNvGrpSpPr/>
+        <p:nvPr/>
+      </p:nvGrpSpPr>
+      <p:grpSpPr>
+        <a:xfrm>
+          <a:off x="0" y="0"/>
+          <a:ext cx="0" cy="0"/>
+          <a:chOff x="0" y="0"/>
+          <a:chExt cx="0" cy="0"/>
+        </a:xfrm>
+      </p:grpSpPr>
       <p:graphicFrame>
         <p:nvGraphicFramePr>
           <p:cNvPr id="4" name="Marcador de contenido 3"/>
@@ -29467,7 +29718,7 @@
             <a:fld id="{2235B30C-86F8-49BD-820E-4721741473E2}" type="slidenum">
               <a:rPr lang="es-CO" smtClean="0"/>
               <a:pPr/>
-              <a:t>11</a:t>
+              <a:t>12</a:t>
             </a:fld>
             <a:endParaRPr lang="es-CO" dirty="0"/>
           </a:p>
@@ -29486,7 +29737,7 @@
 </p:sld>
 </file>
 
-<file path=ppt/slides/slide12.xml><?xml version="1.0" encoding="utf-8"?>
+<file path=ppt/slides/slide13.xml><?xml version="1.0" encoding="utf-8"?>
 <p:sld xmlns:a="http://schemas.openxmlformats.org/drawingml/2006/main" xmlns:r="http://schemas.openxmlformats.org/officeDocument/2006/relationships" xmlns:p="http://schemas.openxmlformats.org/presentationml/2006/main">
   <p:cSld>
     <p:spTree>
@@ -29828,7 +30079,7 @@
             <a:fld id="{2235B30C-86F8-49BD-820E-4721741473E2}" type="slidenum">
               <a:rPr lang="es-CO" smtClean="0"/>
               <a:pPr/>
-              <a:t>12</a:t>
+              <a:t>13</a:t>
             </a:fld>
             <a:endParaRPr lang="es-CO" dirty="0"/>
           </a:p>
@@ -29847,7 +30098,7 @@
 </p:sld>
 </file>
 
-<file path=ppt/slides/slide13.xml><?xml version="1.0" encoding="utf-8"?>
+<file path=ppt/slides/slide14.xml><?xml version="1.0" encoding="utf-8"?>
 <p:sld xmlns:a="http://schemas.openxmlformats.org/drawingml/2006/main" xmlns:r="http://schemas.openxmlformats.org/officeDocument/2006/relationships" xmlns:p="http://schemas.openxmlformats.org/presentationml/2006/main">
   <p:cSld>
     <p:spTree>
@@ -29938,7 +30189,7 @@
             <a:fld id="{2235B30C-86F8-49BD-820E-4721741473E2}" type="slidenum">
               <a:rPr lang="es-CO" smtClean="0"/>
               <a:pPr/>
-              <a:t>13</a:t>
+              <a:t>14</a:t>
             </a:fld>
             <a:endParaRPr lang="es-CO" dirty="0"/>
           </a:p>
@@ -29957,7 +30208,7 @@
 </p:sld>
 </file>
 
-<file path=ppt/slides/slide14.xml><?xml version="1.0" encoding="utf-8"?>
+<file path=ppt/slides/slide15.xml><?xml version="1.0" encoding="utf-8"?>
 <p:sld xmlns:a="http://schemas.openxmlformats.org/drawingml/2006/main" xmlns:r="http://schemas.openxmlformats.org/officeDocument/2006/relationships" xmlns:p="http://schemas.openxmlformats.org/presentationml/2006/main">
   <p:cSld>
     <p:spTree>
@@ -30167,7 +30418,7 @@
             <a:fld id="{2235B30C-86F8-49BD-820E-4721741473E2}" type="slidenum">
               <a:rPr lang="es-CO" smtClean="0"/>
               <a:pPr/>
-              <a:t>14</a:t>
+              <a:t>15</a:t>
             </a:fld>
             <a:endParaRPr lang="es-CO" dirty="0"/>
           </a:p>
@@ -30186,7 +30437,7 @@
 </p:sld>
 </file>
 
-<file path=ppt/slides/slide15.xml><?xml version="1.0" encoding="utf-8"?>
+<file path=ppt/slides/slide16.xml><?xml version="1.0" encoding="utf-8"?>
 <p:sld xmlns:a="http://schemas.openxmlformats.org/drawingml/2006/main" xmlns:r="http://schemas.openxmlformats.org/officeDocument/2006/relationships" xmlns:p="http://schemas.openxmlformats.org/presentationml/2006/main">
   <p:cSld>
     <p:spTree>
@@ -30392,7 +30643,7 @@
             <a:fld id="{2235B30C-86F8-49BD-820E-4721741473E2}" type="slidenum">
               <a:rPr lang="es-CO" smtClean="0"/>
               <a:pPr/>
-              <a:t>15</a:t>
+              <a:t>16</a:t>
             </a:fld>
             <a:endParaRPr lang="es-CO" dirty="0"/>
           </a:p>
@@ -30411,7 +30662,7 @@
 </p:sld>
 </file>
 
-<file path=ppt/slides/slide16.xml><?xml version="1.0" encoding="utf-8"?>
+<file path=ppt/slides/slide17.xml><?xml version="1.0" encoding="utf-8"?>
 <p:sld xmlns:a="http://schemas.openxmlformats.org/drawingml/2006/main" xmlns:r="http://schemas.openxmlformats.org/officeDocument/2006/relationships" xmlns:p="http://schemas.openxmlformats.org/presentationml/2006/main">
   <p:cSld>
     <p:spTree>
@@ -30559,7 +30810,7 @@
             <a:fld id="{2235B30C-86F8-49BD-820E-4721741473E2}" type="slidenum">
               <a:rPr lang="es-CO" smtClean="0"/>
               <a:pPr/>
-              <a:t>16</a:t>
+              <a:t>17</a:t>
             </a:fld>
             <a:endParaRPr lang="es-CO" dirty="0"/>
           </a:p>
@@ -30578,7 +30829,7 @@
 </p:sld>
 </file>
 
-<file path=ppt/slides/slide17.xml><?xml version="1.0" encoding="utf-8"?>
+<file path=ppt/slides/slide18.xml><?xml version="1.0" encoding="utf-8"?>
 <p:sld xmlns:a="http://schemas.openxmlformats.org/drawingml/2006/main" xmlns:r="http://schemas.openxmlformats.org/officeDocument/2006/relationships" xmlns:p="http://schemas.openxmlformats.org/presentationml/2006/main">
   <p:cSld>
     <p:spTree>
@@ -30765,7 +31016,7 @@
             <a:fld id="{2235B30C-86F8-49BD-820E-4721741473E2}" type="slidenum">
               <a:rPr lang="es-CO" smtClean="0"/>
               <a:pPr/>
-              <a:t>17</a:t>
+              <a:t>18</a:t>
             </a:fld>
             <a:endParaRPr lang="es-CO" dirty="0"/>
           </a:p>
@@ -30784,7 +31035,7 @@
 </p:sld>
 </file>
 
-<file path=ppt/slides/slide18.xml><?xml version="1.0" encoding="utf-8"?>
+<file path=ppt/slides/slide19.xml><?xml version="1.0" encoding="utf-8"?>
 <p:sld xmlns:a="http://schemas.openxmlformats.org/drawingml/2006/main" xmlns:r="http://schemas.openxmlformats.org/officeDocument/2006/relationships" xmlns:p="http://schemas.openxmlformats.org/presentationml/2006/main">
   <p:cSld>
     <p:spTree>
@@ -30981,7 +31232,7 @@
             <a:fld id="{2235B30C-86F8-49BD-820E-4721741473E2}" type="slidenum">
               <a:rPr lang="es-CO" smtClean="0"/>
               <a:pPr/>
-              <a:t>18</a:t>
+              <a:t>19</a:t>
             </a:fld>
             <a:endParaRPr lang="es-CO" dirty="0"/>
           </a:p>
@@ -31000,7 +31251,127 @@
 </p:sld>
 </file>
 
-<file path=ppt/slides/slide19.xml><?xml version="1.0" encoding="utf-8"?>
+<file path=ppt/slides/slide2.xml><?xml version="1.0" encoding="utf-8"?>
+<p:sld xmlns:a="http://schemas.openxmlformats.org/drawingml/2006/main" xmlns:r="http://schemas.openxmlformats.org/officeDocument/2006/relationships" xmlns:p="http://schemas.openxmlformats.org/presentationml/2006/main">
+  <p:cSld>
+    <p:spTree>
+      <p:nvGrpSpPr>
+        <p:cNvPr id="1" name=""/>
+        <p:cNvGrpSpPr/>
+        <p:nvPr/>
+      </p:nvGrpSpPr>
+      <p:grpSpPr>
+        <a:xfrm>
+          <a:off x="0" y="0"/>
+          <a:ext cx="0" cy="0"/>
+          <a:chOff x="0" y="0"/>
+          <a:chExt cx="0" cy="0"/>
+        </a:xfrm>
+      </p:grpSpPr>
+      <p:sp>
+        <p:nvSpPr>
+          <p:cNvPr id="4" name="3 Título"/>
+          <p:cNvSpPr>
+            <a:spLocks noGrp="1"/>
+          </p:cNvSpPr>
+          <p:nvPr>
+            <p:ph type="ctrTitle"/>
+          </p:nvPr>
+        </p:nvSpPr>
+        <p:spPr/>
+        <p:txBody>
+          <a:bodyPr>
+            <a:normAutofit fontScale="90000"/>
+          </a:bodyPr>
+          <a:lstStyle/>
+          <a:p>
+            <a:r>
+              <a:rPr lang="es-CO" b="1" dirty="0"/>
+              <a:t>Sesión 1. </a:t>
+            </a:r>
+            <a:br>
+              <a:rPr lang="es-CO" b="1" dirty="0"/>
+            </a:br>
+            <a:r>
+              <a:rPr lang="es-CO" b="1" dirty="0"/>
+              <a:t>Presentación del curso</a:t>
+            </a:r>
+            <a:br>
+              <a:rPr lang="es-CO" b="1" dirty="0"/>
+            </a:br>
+            <a:r>
+              <a:rPr lang="es-CO" b="1" dirty="0"/>
+              <a:t>Revisión conceptos - introducción</a:t>
+            </a:r>
+            <a:br>
+              <a:rPr lang="es-CO" b="1" dirty="0"/>
+            </a:br>
+            <a:endParaRPr lang="es-CO" b="1" dirty="0"/>
+          </a:p>
+        </p:txBody>
+      </p:sp>
+      <p:sp>
+        <p:nvSpPr>
+          <p:cNvPr id="5" name="4 Subtítulo"/>
+          <p:cNvSpPr>
+            <a:spLocks noGrp="1"/>
+          </p:cNvSpPr>
+          <p:nvPr>
+            <p:ph type="subTitle" idx="1"/>
+          </p:nvPr>
+        </p:nvSpPr>
+        <p:spPr/>
+        <p:txBody>
+          <a:bodyPr/>
+          <a:lstStyle/>
+          <a:p>
+            <a:endParaRPr lang="es-CO"/>
+          </a:p>
+        </p:txBody>
+      </p:sp>
+      <p:sp>
+        <p:nvSpPr>
+          <p:cNvPr id="6" name="4 Marcador de número de diapositiva"/>
+          <p:cNvSpPr>
+            <a:spLocks noGrp="1"/>
+          </p:cNvSpPr>
+          <p:nvPr>
+            <p:ph type="sldNum" sz="quarter" idx="12"/>
+          </p:nvPr>
+        </p:nvSpPr>
+        <p:spPr>
+          <a:xfrm>
+            <a:off x="7020272" y="6520259"/>
+            <a:ext cx="2133600" cy="365125"/>
+          </a:xfrm>
+        </p:spPr>
+        <p:txBody>
+          <a:bodyPr/>
+          <a:lstStyle/>
+          <a:p>
+            <a:fld id="{2235B30C-86F8-49BD-820E-4721741473E2}" type="slidenum">
+              <a:rPr lang="es-CO" smtClean="0"/>
+              <a:pPr/>
+              <a:t>2</a:t>
+            </a:fld>
+            <a:endParaRPr lang="es-CO"/>
+          </a:p>
+        </p:txBody>
+      </p:sp>
+    </p:spTree>
+    <p:extLst>
+      <p:ext uri="{BB962C8B-B14F-4D97-AF65-F5344CB8AC3E}">
+        <p14:creationId xmlns:p14="http://schemas.microsoft.com/office/powerpoint/2010/main" val="3587264318"/>
+      </p:ext>
+    </p:extLst>
+  </p:cSld>
+  <p:clrMapOvr>
+    <a:masterClrMapping/>
+  </p:clrMapOvr>
+</p:sld>
+</file>
+
+<file path=ppt/slides/slide20.xml><?xml version="1.0" encoding="utf-8"?>
 <p:sld xmlns:a="http://schemas.openxmlformats.org/drawingml/2006/main" xmlns:r="http://schemas.openxmlformats.org/officeDocument/2006/relationships" xmlns:p="http://schemas.openxmlformats.org/presentationml/2006/main">
   <p:cSld>
     <p:spTree>
@@ -31361,7 +31732,7 @@
             <a:fld id="{2235B30C-86F8-49BD-820E-4721741473E2}" type="slidenum">
               <a:rPr lang="es-CO" smtClean="0"/>
               <a:pPr/>
-              <a:t>19</a:t>
+              <a:t>20</a:t>
             </a:fld>
             <a:endParaRPr lang="es-CO" dirty="0"/>
           </a:p>
@@ -31512,127 +31883,7 @@
 </p:sld>
 </file>
 
-<file path=ppt/slides/slide2.xml><?xml version="1.0" encoding="utf-8"?>
-<p:sld xmlns:a="http://schemas.openxmlformats.org/drawingml/2006/main" xmlns:r="http://schemas.openxmlformats.org/officeDocument/2006/relationships" xmlns:p="http://schemas.openxmlformats.org/presentationml/2006/main">
-  <p:cSld>
-    <p:spTree>
-      <p:nvGrpSpPr>
-        <p:cNvPr id="1" name=""/>
-        <p:cNvGrpSpPr/>
-        <p:nvPr/>
-      </p:nvGrpSpPr>
-      <p:grpSpPr>
-        <a:xfrm>
-          <a:off x="0" y="0"/>
-          <a:ext cx="0" cy="0"/>
-          <a:chOff x="0" y="0"/>
-          <a:chExt cx="0" cy="0"/>
-        </a:xfrm>
-      </p:grpSpPr>
-      <p:sp>
-        <p:nvSpPr>
-          <p:cNvPr id="4" name="3 Título"/>
-          <p:cNvSpPr>
-            <a:spLocks noGrp="1"/>
-          </p:cNvSpPr>
-          <p:nvPr>
-            <p:ph type="ctrTitle"/>
-          </p:nvPr>
-        </p:nvSpPr>
-        <p:spPr/>
-        <p:txBody>
-          <a:bodyPr>
-            <a:normAutofit fontScale="90000"/>
-          </a:bodyPr>
-          <a:lstStyle/>
-          <a:p>
-            <a:r>
-              <a:rPr lang="es-CO" b="1" dirty="0"/>
-              <a:t>Sesión 1. </a:t>
-            </a:r>
-            <a:br>
-              <a:rPr lang="es-CO" b="1" dirty="0"/>
-            </a:br>
-            <a:r>
-              <a:rPr lang="es-CO" b="1" dirty="0"/>
-              <a:t>Presentación del curso</a:t>
-            </a:r>
-            <a:br>
-              <a:rPr lang="es-CO" b="1" dirty="0"/>
-            </a:br>
-            <a:r>
-              <a:rPr lang="es-CO" b="1" dirty="0"/>
-              <a:t>Revisión conceptos - introducción</a:t>
-            </a:r>
-            <a:br>
-              <a:rPr lang="es-CO" b="1" dirty="0"/>
-            </a:br>
-            <a:endParaRPr lang="es-CO" b="1" dirty="0"/>
-          </a:p>
-        </p:txBody>
-      </p:sp>
-      <p:sp>
-        <p:nvSpPr>
-          <p:cNvPr id="5" name="4 Subtítulo"/>
-          <p:cNvSpPr>
-            <a:spLocks noGrp="1"/>
-          </p:cNvSpPr>
-          <p:nvPr>
-            <p:ph type="subTitle" idx="1"/>
-          </p:nvPr>
-        </p:nvSpPr>
-        <p:spPr/>
-        <p:txBody>
-          <a:bodyPr/>
-          <a:lstStyle/>
-          <a:p>
-            <a:endParaRPr lang="es-CO"/>
-          </a:p>
-        </p:txBody>
-      </p:sp>
-      <p:sp>
-        <p:nvSpPr>
-          <p:cNvPr id="6" name="4 Marcador de número de diapositiva"/>
-          <p:cNvSpPr>
-            <a:spLocks noGrp="1"/>
-          </p:cNvSpPr>
-          <p:nvPr>
-            <p:ph type="sldNum" sz="quarter" idx="12"/>
-          </p:nvPr>
-        </p:nvSpPr>
-        <p:spPr>
-          <a:xfrm>
-            <a:off x="7020272" y="6520259"/>
-            <a:ext cx="2133600" cy="365125"/>
-          </a:xfrm>
-        </p:spPr>
-        <p:txBody>
-          <a:bodyPr/>
-          <a:lstStyle/>
-          <a:p>
-            <a:fld id="{2235B30C-86F8-49BD-820E-4721741473E2}" type="slidenum">
-              <a:rPr lang="es-CO" smtClean="0"/>
-              <a:pPr/>
-              <a:t>2</a:t>
-            </a:fld>
-            <a:endParaRPr lang="es-CO"/>
-          </a:p>
-        </p:txBody>
-      </p:sp>
-    </p:spTree>
-    <p:extLst>
-      <p:ext uri="{BB962C8B-B14F-4D97-AF65-F5344CB8AC3E}">
-        <p14:creationId xmlns:p14="http://schemas.microsoft.com/office/powerpoint/2010/main" val="3587264318"/>
-      </p:ext>
-    </p:extLst>
-  </p:cSld>
-  <p:clrMapOvr>
-    <a:masterClrMapping/>
-  </p:clrMapOvr>
-</p:sld>
-</file>
-
-<file path=ppt/slides/slide20.xml><?xml version="1.0" encoding="utf-8"?>
+<file path=ppt/slides/slide21.xml><?xml version="1.0" encoding="utf-8"?>
 <p:sld xmlns:a="http://schemas.openxmlformats.org/drawingml/2006/main" xmlns:r="http://schemas.openxmlformats.org/officeDocument/2006/relationships" xmlns:p="http://schemas.openxmlformats.org/presentationml/2006/main">
   <p:cSld>
     <p:spTree>
@@ -32124,7 +32375,7 @@
             <a:fld id="{2235B30C-86F8-49BD-820E-4721741473E2}" type="slidenum">
               <a:rPr lang="es-CO" smtClean="0"/>
               <a:pPr/>
-              <a:t>20</a:t>
+              <a:t>21</a:t>
             </a:fld>
             <a:endParaRPr lang="es-CO" dirty="0"/>
           </a:p>
@@ -32143,7 +32394,7 @@
 </p:sld>
 </file>
 
-<file path=ppt/slides/slide21.xml><?xml version="1.0" encoding="utf-8"?>
+<file path=ppt/slides/slide22.xml><?xml version="1.0" encoding="utf-8"?>
 <p:sld xmlns:a="http://schemas.openxmlformats.org/drawingml/2006/main" xmlns:r="http://schemas.openxmlformats.org/officeDocument/2006/relationships" xmlns:p="http://schemas.openxmlformats.org/presentationml/2006/main">
   <p:cSld>
     <p:spTree>
@@ -32385,7 +32636,7 @@
             <a:fld id="{2235B30C-86F8-49BD-820E-4721741473E2}" type="slidenum">
               <a:rPr lang="es-CO" smtClean="0"/>
               <a:pPr/>
-              <a:t>21</a:t>
+              <a:t>22</a:t>
             </a:fld>
             <a:endParaRPr lang="es-CO" dirty="0"/>
           </a:p>
@@ -32404,7 +32655,7 @@
 </p:sld>
 </file>
 
-<file path=ppt/slides/slide22.xml><?xml version="1.0" encoding="utf-8"?>
+<file path=ppt/slides/slide23.xml><?xml version="1.0" encoding="utf-8"?>
 <p:sld xmlns:a="http://schemas.openxmlformats.org/drawingml/2006/main" xmlns:r="http://schemas.openxmlformats.org/officeDocument/2006/relationships" xmlns:p="http://schemas.openxmlformats.org/presentationml/2006/main">
   <p:cSld>
     <p:spTree>
@@ -32620,7 +32871,7 @@
             <a:fld id="{2235B30C-86F8-49BD-820E-4721741473E2}" type="slidenum">
               <a:rPr lang="es-CO" smtClean="0"/>
               <a:pPr/>
-              <a:t>22</a:t>
+              <a:t>23</a:t>
             </a:fld>
             <a:endParaRPr lang="es-CO" dirty="0"/>
           </a:p>
@@ -32639,7 +32890,7 @@
 </p:sld>
 </file>
 
-<file path=ppt/slides/slide23.xml><?xml version="1.0" encoding="utf-8"?>
+<file path=ppt/slides/slide24.xml><?xml version="1.0" encoding="utf-8"?>
 <p:sld xmlns:a="http://schemas.openxmlformats.org/drawingml/2006/main" xmlns:r="http://schemas.openxmlformats.org/officeDocument/2006/relationships" xmlns:p="http://schemas.openxmlformats.org/presentationml/2006/main">
   <p:cSld>
     <p:spTree>
@@ -32852,7 +33103,7 @@
             <a:fld id="{2235B30C-86F8-49BD-820E-4721741473E2}" type="slidenum">
               <a:rPr lang="es-CO" smtClean="0"/>
               <a:pPr/>
-              <a:t>23</a:t>
+              <a:t>24</a:t>
             </a:fld>
             <a:endParaRPr lang="es-CO" dirty="0"/>
           </a:p>
@@ -32871,7 +33122,7 @@
 </p:sld>
 </file>
 
-<file path=ppt/slides/slide24.xml><?xml version="1.0" encoding="utf-8"?>
+<file path=ppt/slides/slide25.xml><?xml version="1.0" encoding="utf-8"?>
 <p:sld xmlns:a="http://schemas.openxmlformats.org/drawingml/2006/main" xmlns:r="http://schemas.openxmlformats.org/officeDocument/2006/relationships" xmlns:p="http://schemas.openxmlformats.org/presentationml/2006/main">
   <p:cSld>
     <p:spTree>
@@ -33131,7 +33382,7 @@
             <a:fld id="{2235B30C-86F8-49BD-820E-4721741473E2}" type="slidenum">
               <a:rPr lang="es-CO" smtClean="0"/>
               <a:pPr/>
-              <a:t>24</a:t>
+              <a:t>25</a:t>
             </a:fld>
             <a:endParaRPr lang="es-CO" dirty="0"/>
           </a:p>
@@ -33286,7 +33537,7 @@
 </p:sld>
 </file>
 
-<file path=ppt/slides/slide25.xml><?xml version="1.0" encoding="utf-8"?>
+<file path=ppt/slides/slide26.xml><?xml version="1.0" encoding="utf-8"?>
 <p:sld xmlns:a="http://schemas.openxmlformats.org/drawingml/2006/main" xmlns:r="http://schemas.openxmlformats.org/officeDocument/2006/relationships" xmlns:p="http://schemas.openxmlformats.org/presentationml/2006/main">
   <p:cSld>
     <p:spTree>
@@ -33357,7 +33608,7 @@
 </p:sld>
 </file>
 
-<file path=ppt/slides/slide26.xml><?xml version="1.0" encoding="utf-8"?>
+<file path=ppt/slides/slide27.xml><?xml version="1.0" encoding="utf-8"?>
 <p:sld xmlns:a="http://schemas.openxmlformats.org/drawingml/2006/main" xmlns:r="http://schemas.openxmlformats.org/officeDocument/2006/relationships" xmlns:p="http://schemas.openxmlformats.org/presentationml/2006/main">
   <p:cSld>
     <p:spTree>
@@ -33411,7 +33662,7 @@
             <a:fld id="{2235B30C-86F8-49BD-820E-4721741473E2}" type="slidenum">
               <a:rPr lang="es-CO" smtClean="0"/>
               <a:pPr/>
-              <a:t>26</a:t>
+              <a:t>27</a:t>
             </a:fld>
             <a:endParaRPr lang="es-CO"/>
           </a:p>
@@ -33545,7 +33796,7 @@
 </p:sld>
 </file>
 
-<file path=ppt/slides/slide27.xml><?xml version="1.0" encoding="utf-8"?>
+<file path=ppt/slides/slide28.xml><?xml version="1.0" encoding="utf-8"?>
 <p:sld xmlns:a="http://schemas.openxmlformats.org/drawingml/2006/main" xmlns:r="http://schemas.openxmlformats.org/officeDocument/2006/relationships" xmlns:p="http://schemas.openxmlformats.org/presentationml/2006/main">
   <p:cSld>
     <p:spTree>
@@ -33599,7 +33850,7 @@
             <a:fld id="{2235B30C-86F8-49BD-820E-4721741473E2}" type="slidenum">
               <a:rPr lang="es-CO" smtClean="0"/>
               <a:pPr/>
-              <a:t>27</a:t>
+              <a:t>28</a:t>
             </a:fld>
             <a:endParaRPr lang="es-CO"/>
           </a:p>
@@ -34946,7 +35197,7 @@
 </p:sld>
 </file>
 
-<file path=ppt/slides/slide28.xml><?xml version="1.0" encoding="utf-8"?>
+<file path=ppt/slides/slide29.xml><?xml version="1.0" encoding="utf-8"?>
 <p:sld xmlns:a="http://schemas.openxmlformats.org/drawingml/2006/main" xmlns:r="http://schemas.openxmlformats.org/officeDocument/2006/relationships" xmlns:p="http://schemas.openxmlformats.org/presentationml/2006/main">
   <p:cSld>
     <p:spTree>
@@ -35032,7 +35283,7 @@
             <a:fld id="{2235B30C-86F8-49BD-820E-4721741473E2}" type="slidenum">
               <a:rPr lang="es-CO" smtClean="0"/>
               <a:pPr/>
-              <a:t>28</a:t>
+              <a:t>29</a:t>
             </a:fld>
             <a:endParaRPr lang="es-CO"/>
           </a:p>
@@ -35464,7 +35715,118 @@
 </p:sld>
 </file>
 
-<file path=ppt/slides/slide29.xml><?xml version="1.0" encoding="utf-8"?>
+<file path=ppt/slides/slide3.xml><?xml version="1.0" encoding="utf-8"?>
+<p:sld xmlns:a="http://schemas.openxmlformats.org/drawingml/2006/main" xmlns:r="http://schemas.openxmlformats.org/officeDocument/2006/relationships" xmlns:p="http://schemas.openxmlformats.org/presentationml/2006/main">
+  <p:cSld>
+    <p:spTree>
+      <p:nvGrpSpPr>
+        <p:cNvPr id="1" name=""/>
+        <p:cNvGrpSpPr/>
+        <p:nvPr/>
+      </p:nvGrpSpPr>
+      <p:grpSpPr>
+        <a:xfrm>
+          <a:off x="0" y="0"/>
+          <a:ext cx="0" cy="0"/>
+          <a:chOff x="0" y="0"/>
+          <a:chExt cx="0" cy="0"/>
+        </a:xfrm>
+      </p:grpSpPr>
+      <p:graphicFrame>
+        <p:nvGraphicFramePr>
+          <p:cNvPr id="4" name="3 Marcador de contenido"/>
+          <p:cNvGraphicFramePr>
+            <a:graphicFrameLocks noGrp="1"/>
+          </p:cNvGraphicFramePr>
+          <p:nvPr>
+            <p:ph idx="1"/>
+          </p:nvPr>
+        </p:nvGraphicFramePr>
+        <p:xfrm>
+          <a:off x="0" y="785626"/>
+          <a:ext cx="8928992" cy="5361459"/>
+        </p:xfrm>
+        <a:graphic>
+          <a:graphicData uri="http://schemas.openxmlformats.org/drawingml/2006/diagram">
+            <dgm:relIds xmlns:dgm="http://schemas.openxmlformats.org/drawingml/2006/diagram" xmlns:r="http://schemas.openxmlformats.org/officeDocument/2006/relationships" r:dm="rId2" r:lo="rId3" r:qs="rId4" r:cs="rId5"/>
+          </a:graphicData>
+        </a:graphic>
+      </p:graphicFrame>
+      <p:sp>
+        <p:nvSpPr>
+          <p:cNvPr id="3" name="2 Título"/>
+          <p:cNvSpPr>
+            <a:spLocks noGrp="1"/>
+          </p:cNvSpPr>
+          <p:nvPr>
+            <p:ph type="title"/>
+          </p:nvPr>
+        </p:nvSpPr>
+        <p:spPr/>
+        <p:txBody>
+          <a:bodyPr/>
+          <a:lstStyle/>
+          <a:p>
+            <a:r>
+              <a:rPr lang="es-CO" dirty="0"/>
+              <a:t>¿Qué haremos hoy?</a:t>
+            </a:r>
+          </a:p>
+        </p:txBody>
+      </p:sp>
+      <p:sp>
+        <p:nvSpPr>
+          <p:cNvPr id="6" name="5 Marcador de número de diapositiva"/>
+          <p:cNvSpPr>
+            <a:spLocks noGrp="1"/>
+          </p:cNvSpPr>
+          <p:nvPr>
+            <p:ph type="sldNum" sz="quarter" idx="12"/>
+          </p:nvPr>
+        </p:nvSpPr>
+        <p:spPr>
+          <a:xfrm>
+            <a:off x="7020272" y="6520259"/>
+            <a:ext cx="2133600" cy="365125"/>
+          </a:xfrm>
+        </p:spPr>
+        <p:txBody>
+          <a:bodyPr/>
+          <a:lstStyle>
+            <a:lvl1pPr>
+              <a:defRPr sz="2000" b="1">
+                <a:solidFill>
+                  <a:schemeClr val="bg2">
+                    <a:lumMod val="25000"/>
+                  </a:schemeClr>
+                </a:solidFill>
+              </a:defRPr>
+            </a:lvl1pPr>
+          </a:lstStyle>
+          <a:p>
+            <a:fld id="{2235B30C-86F8-49BD-820E-4721741473E2}" type="slidenum">
+              <a:rPr lang="es-CO" smtClean="0"/>
+              <a:pPr/>
+              <a:t>3</a:t>
+            </a:fld>
+            <a:endParaRPr lang="es-CO" dirty="0"/>
+          </a:p>
+        </p:txBody>
+      </p:sp>
+    </p:spTree>
+    <p:extLst>
+      <p:ext uri="{BB962C8B-B14F-4D97-AF65-F5344CB8AC3E}">
+        <p14:creationId xmlns:p14="http://schemas.microsoft.com/office/powerpoint/2010/main" val="1802172790"/>
+      </p:ext>
+    </p:extLst>
+  </p:cSld>
+  <p:clrMapOvr>
+    <a:masterClrMapping/>
+  </p:clrMapOvr>
+</p:sld>
+</file>
+
+<file path=ppt/slides/slide30.xml><?xml version="1.0" encoding="utf-8"?>
 <p:sld xmlns:a="http://schemas.openxmlformats.org/drawingml/2006/main" xmlns:r="http://schemas.openxmlformats.org/officeDocument/2006/relationships" xmlns:p="http://schemas.openxmlformats.org/presentationml/2006/main">
   <p:cSld>
     <p:spTree>
@@ -35518,7 +35880,7 @@
             <a:fld id="{2235B30C-86F8-49BD-820E-4721741473E2}" type="slidenum">
               <a:rPr lang="es-CO" smtClean="0"/>
               <a:pPr/>
-              <a:t>29</a:t>
+              <a:t>30</a:t>
             </a:fld>
             <a:endParaRPr lang="es-CO"/>
           </a:p>
@@ -35889,118 +36251,7 @@
 </p:sld>
 </file>
 
-<file path=ppt/slides/slide3.xml><?xml version="1.0" encoding="utf-8"?>
-<p:sld xmlns:a="http://schemas.openxmlformats.org/drawingml/2006/main" xmlns:r="http://schemas.openxmlformats.org/officeDocument/2006/relationships" xmlns:p="http://schemas.openxmlformats.org/presentationml/2006/main">
-  <p:cSld>
-    <p:spTree>
-      <p:nvGrpSpPr>
-        <p:cNvPr id="1" name=""/>
-        <p:cNvGrpSpPr/>
-        <p:nvPr/>
-      </p:nvGrpSpPr>
-      <p:grpSpPr>
-        <a:xfrm>
-          <a:off x="0" y="0"/>
-          <a:ext cx="0" cy="0"/>
-          <a:chOff x="0" y="0"/>
-          <a:chExt cx="0" cy="0"/>
-        </a:xfrm>
-      </p:grpSpPr>
-      <p:graphicFrame>
-        <p:nvGraphicFramePr>
-          <p:cNvPr id="4" name="3 Marcador de contenido"/>
-          <p:cNvGraphicFramePr>
-            <a:graphicFrameLocks noGrp="1"/>
-          </p:cNvGraphicFramePr>
-          <p:nvPr>
-            <p:ph idx="1"/>
-          </p:nvPr>
-        </p:nvGraphicFramePr>
-        <p:xfrm>
-          <a:off x="0" y="785626"/>
-          <a:ext cx="8928992" cy="5361459"/>
-        </p:xfrm>
-        <a:graphic>
-          <a:graphicData uri="http://schemas.openxmlformats.org/drawingml/2006/diagram">
-            <dgm:relIds xmlns:dgm="http://schemas.openxmlformats.org/drawingml/2006/diagram" xmlns:r="http://schemas.openxmlformats.org/officeDocument/2006/relationships" r:dm="rId2" r:lo="rId3" r:qs="rId4" r:cs="rId5"/>
-          </a:graphicData>
-        </a:graphic>
-      </p:graphicFrame>
-      <p:sp>
-        <p:nvSpPr>
-          <p:cNvPr id="3" name="2 Título"/>
-          <p:cNvSpPr>
-            <a:spLocks noGrp="1"/>
-          </p:cNvSpPr>
-          <p:nvPr>
-            <p:ph type="title"/>
-          </p:nvPr>
-        </p:nvSpPr>
-        <p:spPr/>
-        <p:txBody>
-          <a:bodyPr/>
-          <a:lstStyle/>
-          <a:p>
-            <a:r>
-              <a:rPr lang="es-CO" dirty="0"/>
-              <a:t>¿Qué haremos hoy?</a:t>
-            </a:r>
-          </a:p>
-        </p:txBody>
-      </p:sp>
-      <p:sp>
-        <p:nvSpPr>
-          <p:cNvPr id="6" name="5 Marcador de número de diapositiva"/>
-          <p:cNvSpPr>
-            <a:spLocks noGrp="1"/>
-          </p:cNvSpPr>
-          <p:nvPr>
-            <p:ph type="sldNum" sz="quarter" idx="12"/>
-          </p:nvPr>
-        </p:nvSpPr>
-        <p:spPr>
-          <a:xfrm>
-            <a:off x="7020272" y="6520259"/>
-            <a:ext cx="2133600" cy="365125"/>
-          </a:xfrm>
-        </p:spPr>
-        <p:txBody>
-          <a:bodyPr/>
-          <a:lstStyle>
-            <a:lvl1pPr>
-              <a:defRPr sz="2000" b="1">
-                <a:solidFill>
-                  <a:schemeClr val="bg2">
-                    <a:lumMod val="25000"/>
-                  </a:schemeClr>
-                </a:solidFill>
-              </a:defRPr>
-            </a:lvl1pPr>
-          </a:lstStyle>
-          <a:p>
-            <a:fld id="{2235B30C-86F8-49BD-820E-4721741473E2}" type="slidenum">
-              <a:rPr lang="es-CO" smtClean="0"/>
-              <a:pPr/>
-              <a:t>3</a:t>
-            </a:fld>
-            <a:endParaRPr lang="es-CO" dirty="0"/>
-          </a:p>
-        </p:txBody>
-      </p:sp>
-    </p:spTree>
-    <p:extLst>
-      <p:ext uri="{BB962C8B-B14F-4D97-AF65-F5344CB8AC3E}">
-        <p14:creationId xmlns:p14="http://schemas.microsoft.com/office/powerpoint/2010/main" val="1802172790"/>
-      </p:ext>
-    </p:extLst>
-  </p:cSld>
-  <p:clrMapOvr>
-    <a:masterClrMapping/>
-  </p:clrMapOvr>
-</p:sld>
-</file>
-
-<file path=ppt/slides/slide30.xml><?xml version="1.0" encoding="utf-8"?>
+<file path=ppt/slides/slide31.xml><?xml version="1.0" encoding="utf-8"?>
 <p:sld xmlns:a="http://schemas.openxmlformats.org/drawingml/2006/main" xmlns:r="http://schemas.openxmlformats.org/officeDocument/2006/relationships" xmlns:p="http://schemas.openxmlformats.org/presentationml/2006/main">
   <p:cSld>
     <p:spTree>
@@ -36057,7 +36308,7 @@
             <a:fld id="{2235B30C-86F8-49BD-820E-4721741473E2}" type="slidenum">
               <a:rPr lang="es-CO" smtClean="0"/>
               <a:pPr/>
-              <a:t>30</a:t>
+              <a:t>31</a:t>
             </a:fld>
             <a:endParaRPr lang="es-CO"/>
           </a:p>
@@ -36181,7 +36432,7 @@
 </p:sld>
 </file>
 
-<file path=ppt/slides/slide31.xml><?xml version="1.0" encoding="utf-8"?>
+<file path=ppt/slides/slide32.xml><?xml version="1.0" encoding="utf-8"?>
 <p:sld xmlns:a="http://schemas.openxmlformats.org/drawingml/2006/main" xmlns:r="http://schemas.openxmlformats.org/officeDocument/2006/relationships" xmlns:p="http://schemas.openxmlformats.org/presentationml/2006/main">
   <p:cSld>
     <p:spTree>
@@ -36243,7 +36494,7 @@
             <a:fld id="{2235B30C-86F8-49BD-820E-4721741473E2}" type="slidenum">
               <a:rPr lang="es-CO" smtClean="0"/>
               <a:pPr/>
-              <a:t>31</a:t>
+              <a:t>32</a:t>
             </a:fld>
             <a:endParaRPr lang="es-CO"/>
           </a:p>
@@ -36793,7 +37044,7 @@
 </p:sld>
 </file>
 
-<file path=ppt/slides/slide32.xml><?xml version="1.0" encoding="utf-8"?>
+<file path=ppt/slides/slide33.xml><?xml version="1.0" encoding="utf-8"?>
 <p:sld xmlns:a="http://schemas.openxmlformats.org/drawingml/2006/main" xmlns:r="http://schemas.openxmlformats.org/officeDocument/2006/relationships" xmlns:p="http://schemas.openxmlformats.org/presentationml/2006/main">
   <p:cSld>
     <p:spTree>
@@ -38009,7 +38260,7 @@
             <a:fld id="{2235B30C-86F8-49BD-820E-4721741473E2}" type="slidenum">
               <a:rPr lang="es-CO" smtClean="0"/>
               <a:pPr/>
-              <a:t>32</a:t>
+              <a:t>33</a:t>
             </a:fld>
             <a:endParaRPr lang="es-CO"/>
           </a:p>
@@ -38836,7 +39087,7 @@
 </p:sld>
 </file>
 
-<file path=ppt/slides/slide33.xml><?xml version="1.0" encoding="utf-8"?>
+<file path=ppt/slides/slide34.xml><?xml version="1.0" encoding="utf-8"?>
 <p:sld xmlns:a="http://schemas.openxmlformats.org/drawingml/2006/main" xmlns:r="http://schemas.openxmlformats.org/officeDocument/2006/relationships" xmlns:p="http://schemas.openxmlformats.org/presentationml/2006/main">
   <p:cSld>
     <p:spTree>
@@ -38914,7 +39165,7 @@
             <a:fld id="{2235B30C-86F8-49BD-820E-4721741473E2}" type="slidenum">
               <a:rPr lang="es-CO" smtClean="0"/>
               <a:pPr/>
-              <a:t>33</a:t>
+              <a:t>34</a:t>
             </a:fld>
             <a:endParaRPr lang="es-CO"/>
           </a:p>
@@ -38933,7 +39184,7 @@
 </p:sld>
 </file>
 
-<file path=ppt/slides/slide34.xml><?xml version="1.0" encoding="utf-8"?>
+<file path=ppt/slides/slide35.xml><?xml version="1.0" encoding="utf-8"?>
 <p:sld xmlns:a="http://schemas.openxmlformats.org/drawingml/2006/main" xmlns:r="http://schemas.openxmlformats.org/officeDocument/2006/relationships" xmlns:p="http://schemas.openxmlformats.org/presentationml/2006/main">
   <p:cSld>
     <p:spTree>
@@ -39000,7 +39251,7 @@
             <a:fld id="{2235B30C-86F8-49BD-820E-4721741473E2}" type="slidenum">
               <a:rPr lang="es-CO" smtClean="0"/>
               <a:pPr/>
-              <a:t>34</a:t>
+              <a:t>35</a:t>
             </a:fld>
             <a:endParaRPr lang="es-CO"/>
           </a:p>
@@ -39072,7 +39323,7 @@
 </p:sld>
 </file>
 
-<file path=ppt/slides/slide35.xml><?xml version="1.0" encoding="utf-8"?>
+<file path=ppt/slides/slide36.xml><?xml version="1.0" encoding="utf-8"?>
 <p:sld xmlns:a="http://schemas.openxmlformats.org/drawingml/2006/main" xmlns:r="http://schemas.openxmlformats.org/officeDocument/2006/relationships" xmlns:p="http://schemas.openxmlformats.org/presentationml/2006/main">
   <p:cSld>
     <p:spTree>
@@ -39134,7 +39385,7 @@
             <a:fld id="{2235B30C-86F8-49BD-820E-4721741473E2}" type="slidenum">
               <a:rPr lang="es-CO" smtClean="0"/>
               <a:pPr/>
-              <a:t>35</a:t>
+              <a:t>36</a:t>
             </a:fld>
             <a:endParaRPr lang="es-CO"/>
           </a:p>
@@ -40305,7 +40556,7 @@
 </p:sld>
 </file>
 
-<file path=ppt/slides/slide36.xml><?xml version="1.0" encoding="utf-8"?>
+<file path=ppt/slides/slide37.xml><?xml version="1.0" encoding="utf-8"?>
 <p:sld xmlns:a="http://schemas.openxmlformats.org/drawingml/2006/main" xmlns:r="http://schemas.openxmlformats.org/officeDocument/2006/relationships" xmlns:p="http://schemas.openxmlformats.org/presentationml/2006/main">
   <p:cSld>
     <p:spTree>
@@ -41143,7 +41394,7 @@
             <a:fld id="{2235B30C-86F8-49BD-820E-4721741473E2}" type="slidenum">
               <a:rPr lang="es-CO" smtClean="0"/>
               <a:pPr/>
-              <a:t>36</a:t>
+              <a:t>37</a:t>
             </a:fld>
             <a:endParaRPr lang="es-CO"/>
           </a:p>
@@ -41860,7 +42111,7 @@
 </p:sld>
 </file>
 
-<file path=ppt/slides/slide37.xml><?xml version="1.0" encoding="utf-8"?>
+<file path=ppt/slides/slide38.xml><?xml version="1.0" encoding="utf-8"?>
 <p:sld xmlns:a="http://schemas.openxmlformats.org/drawingml/2006/main" xmlns:r="http://schemas.openxmlformats.org/officeDocument/2006/relationships" xmlns:p="http://schemas.openxmlformats.org/presentationml/2006/main">
   <p:cSld>
     <p:spTree>
@@ -41915,7 +42166,7 @@
             <a:fld id="{2235B30C-86F8-49BD-820E-4721741473E2}" type="slidenum">
               <a:rPr lang="es-CO" smtClean="0"/>
               <a:pPr/>
-              <a:t>37</a:t>
+              <a:t>38</a:t>
             </a:fld>
             <a:endParaRPr lang="es-CO"/>
           </a:p>
@@ -41956,7 +42207,7 @@
 </p:sld>
 </file>
 
-<file path=ppt/slides/slide38.xml><?xml version="1.0" encoding="utf-8"?>
+<file path=ppt/slides/slide39.xml><?xml version="1.0" encoding="utf-8"?>
 <p:sld xmlns:a="http://schemas.openxmlformats.org/drawingml/2006/main" xmlns:r="http://schemas.openxmlformats.org/officeDocument/2006/relationships" xmlns:p="http://schemas.openxmlformats.org/presentationml/2006/main">
   <p:cSld>
     <p:spTree>
@@ -41991,7 +42242,7 @@
             <a:fld id="{2235B30C-86F8-49BD-820E-4721741473E2}" type="slidenum">
               <a:rPr lang="es-CO" smtClean="0"/>
               <a:pPr/>
-              <a:t>38</a:t>
+              <a:t>39</a:t>
             </a:fld>
             <a:endParaRPr lang="es-CO"/>
           </a:p>
@@ -43018,132 +43269,6 @@
 </p:sld>
 </file>
 
-<file path=ppt/slides/slide39.xml><?xml version="1.0" encoding="utf-8"?>
-<p:sld xmlns:a="http://schemas.openxmlformats.org/drawingml/2006/main" xmlns:r="http://schemas.openxmlformats.org/officeDocument/2006/relationships" xmlns:p="http://schemas.openxmlformats.org/presentationml/2006/main">
-  <p:cSld>
-    <p:spTree>
-      <p:nvGrpSpPr>
-        <p:cNvPr id="1" name=""/>
-        <p:cNvGrpSpPr/>
-        <p:nvPr/>
-      </p:nvGrpSpPr>
-      <p:grpSpPr>
-        <a:xfrm>
-          <a:off x="0" y="0"/>
-          <a:ext cx="0" cy="0"/>
-          <a:chOff x="0" y="0"/>
-          <a:chExt cx="0" cy="0"/>
-        </a:xfrm>
-      </p:grpSpPr>
-      <p:graphicFrame>
-        <p:nvGraphicFramePr>
-          <p:cNvPr id="4" name="3 Marcador de contenido"/>
-          <p:cNvGraphicFramePr>
-            <a:graphicFrameLocks noGrp="1"/>
-          </p:cNvGraphicFramePr>
-          <p:nvPr>
-            <p:ph idx="1"/>
-          </p:nvPr>
-        </p:nvGraphicFramePr>
-        <p:xfrm>
-          <a:off x="457200" y="908051"/>
-          <a:ext cx="7787208" cy="3889102"/>
-        </p:xfrm>
-        <a:graphic>
-          <a:graphicData uri="http://schemas.openxmlformats.org/drawingml/2006/diagram">
-            <dgm:relIds xmlns:dgm="http://schemas.openxmlformats.org/drawingml/2006/diagram" xmlns:r="http://schemas.openxmlformats.org/officeDocument/2006/relationships" r:dm="rId3" r:lo="rId4" r:qs="rId5" r:cs="rId6"/>
-          </a:graphicData>
-        </a:graphic>
-      </p:graphicFrame>
-      <p:sp>
-        <p:nvSpPr>
-          <p:cNvPr id="7" name="6 Marcador de número de diapositiva"/>
-          <p:cNvSpPr>
-            <a:spLocks noGrp="1"/>
-          </p:cNvSpPr>
-          <p:nvPr>
-            <p:ph type="sldNum" sz="quarter" idx="12"/>
-          </p:nvPr>
-        </p:nvSpPr>
-        <p:spPr/>
-        <p:txBody>
-          <a:bodyPr/>
-          <a:lstStyle/>
-          <a:p>
-            <a:fld id="{2235B30C-86F8-49BD-820E-4721741473E2}" type="slidenum">
-              <a:rPr lang="es-CO" smtClean="0"/>
-              <a:pPr/>
-              <a:t>39</a:t>
-            </a:fld>
-            <a:endParaRPr lang="es-CO"/>
-          </a:p>
-        </p:txBody>
-      </p:sp>
-      <p:sp>
-        <p:nvSpPr>
-          <p:cNvPr id="2" name="1 Título"/>
-          <p:cNvSpPr>
-            <a:spLocks noGrp="1"/>
-          </p:cNvSpPr>
-          <p:nvPr>
-            <p:ph type="title"/>
-          </p:nvPr>
-        </p:nvSpPr>
-        <p:spPr/>
-        <p:txBody>
-          <a:bodyPr/>
-          <a:lstStyle/>
-          <a:p>
-            <a:r>
-              <a:rPr lang="es-CO" dirty="0"/>
-              <a:t>Lenguajes interpretados</a:t>
-            </a:r>
-          </a:p>
-        </p:txBody>
-      </p:sp>
-      <p:sp>
-        <p:nvSpPr>
-          <p:cNvPr id="5" name="4 CuadroTexto"/>
-          <p:cNvSpPr txBox="1"/>
-          <p:nvPr/>
-        </p:nvSpPr>
-        <p:spPr>
-          <a:xfrm>
-            <a:off x="431540" y="4794200"/>
-            <a:ext cx="8568952" cy="1384995"/>
-          </a:xfrm>
-          <a:prstGeom prst="rect">
-            <a:avLst/>
-          </a:prstGeom>
-          <a:noFill/>
-        </p:spPr>
-        <p:txBody>
-          <a:bodyPr wrap="square" rtlCol="0">
-            <a:spAutoFit/>
-          </a:bodyPr>
-          <a:lstStyle/>
-          <a:p>
-            <a:pPr algn="just"/>
-            <a:r>
-              <a:rPr lang="es-CO" sz="2800" dirty="0"/>
-              <a:t>No se guarda el programa interpretado. Siempre se requiere el intérprete para ejecutar el programa</a:t>
-            </a:r>
-          </a:p>
-        </p:txBody>
-      </p:sp>
-    </p:spTree>
-    <p:extLst>
-      <p:ext uri="{BB962C8B-B14F-4D97-AF65-F5344CB8AC3E}">
-        <p14:creationId xmlns:p14="http://schemas.microsoft.com/office/powerpoint/2010/main" val="4081256076"/>
-      </p:ext>
-    </p:extLst>
-  </p:cSld>
-  <p:clrMapOvr>
-    <a:masterClrMapping/>
-  </p:clrMapOvr>
-</p:sld>
-</file>
-
 <file path=ppt/slides/slide4.xml><?xml version="1.0" encoding="utf-8"?>
 <p:sld xmlns:a="http://schemas.openxmlformats.org/drawingml/2006/main" xmlns:r="http://schemas.openxmlformats.org/officeDocument/2006/relationships" xmlns:p="http://schemas.openxmlformats.org/presentationml/2006/main">
   <p:cSld>
@@ -43306,6 +43431,132 @@
           <a:chExt cx="0" cy="0"/>
         </a:xfrm>
       </p:grpSpPr>
+      <p:graphicFrame>
+        <p:nvGraphicFramePr>
+          <p:cNvPr id="4" name="3 Marcador de contenido"/>
+          <p:cNvGraphicFramePr>
+            <a:graphicFrameLocks noGrp="1"/>
+          </p:cNvGraphicFramePr>
+          <p:nvPr>
+            <p:ph idx="1"/>
+          </p:nvPr>
+        </p:nvGraphicFramePr>
+        <p:xfrm>
+          <a:off x="457200" y="908051"/>
+          <a:ext cx="7787208" cy="3889102"/>
+        </p:xfrm>
+        <a:graphic>
+          <a:graphicData uri="http://schemas.openxmlformats.org/drawingml/2006/diagram">
+            <dgm:relIds xmlns:dgm="http://schemas.openxmlformats.org/drawingml/2006/diagram" xmlns:r="http://schemas.openxmlformats.org/officeDocument/2006/relationships" r:dm="rId3" r:lo="rId4" r:qs="rId5" r:cs="rId6"/>
+          </a:graphicData>
+        </a:graphic>
+      </p:graphicFrame>
+      <p:sp>
+        <p:nvSpPr>
+          <p:cNvPr id="7" name="6 Marcador de número de diapositiva"/>
+          <p:cNvSpPr>
+            <a:spLocks noGrp="1"/>
+          </p:cNvSpPr>
+          <p:nvPr>
+            <p:ph type="sldNum" sz="quarter" idx="12"/>
+          </p:nvPr>
+        </p:nvSpPr>
+        <p:spPr/>
+        <p:txBody>
+          <a:bodyPr/>
+          <a:lstStyle/>
+          <a:p>
+            <a:fld id="{2235B30C-86F8-49BD-820E-4721741473E2}" type="slidenum">
+              <a:rPr lang="es-CO" smtClean="0"/>
+              <a:pPr/>
+              <a:t>40</a:t>
+            </a:fld>
+            <a:endParaRPr lang="es-CO"/>
+          </a:p>
+        </p:txBody>
+      </p:sp>
+      <p:sp>
+        <p:nvSpPr>
+          <p:cNvPr id="2" name="1 Título"/>
+          <p:cNvSpPr>
+            <a:spLocks noGrp="1"/>
+          </p:cNvSpPr>
+          <p:nvPr>
+            <p:ph type="title"/>
+          </p:nvPr>
+        </p:nvSpPr>
+        <p:spPr/>
+        <p:txBody>
+          <a:bodyPr/>
+          <a:lstStyle/>
+          <a:p>
+            <a:r>
+              <a:rPr lang="es-CO" dirty="0"/>
+              <a:t>Lenguajes interpretados</a:t>
+            </a:r>
+          </a:p>
+        </p:txBody>
+      </p:sp>
+      <p:sp>
+        <p:nvSpPr>
+          <p:cNvPr id="5" name="4 CuadroTexto"/>
+          <p:cNvSpPr txBox="1"/>
+          <p:nvPr/>
+        </p:nvSpPr>
+        <p:spPr>
+          <a:xfrm>
+            <a:off x="431540" y="4794200"/>
+            <a:ext cx="8568952" cy="1384995"/>
+          </a:xfrm>
+          <a:prstGeom prst="rect">
+            <a:avLst/>
+          </a:prstGeom>
+          <a:noFill/>
+        </p:spPr>
+        <p:txBody>
+          <a:bodyPr wrap="square" rtlCol="0">
+            <a:spAutoFit/>
+          </a:bodyPr>
+          <a:lstStyle/>
+          <a:p>
+            <a:pPr algn="just"/>
+            <a:r>
+              <a:rPr lang="es-CO" sz="2800" dirty="0"/>
+              <a:t>No se guarda el programa interpretado. Siempre se requiere el intérprete para ejecutar el programa</a:t>
+            </a:r>
+          </a:p>
+        </p:txBody>
+      </p:sp>
+    </p:spTree>
+    <p:extLst>
+      <p:ext uri="{BB962C8B-B14F-4D97-AF65-F5344CB8AC3E}">
+        <p14:creationId xmlns:p14="http://schemas.microsoft.com/office/powerpoint/2010/main" val="4081256076"/>
+      </p:ext>
+    </p:extLst>
+  </p:cSld>
+  <p:clrMapOvr>
+    <a:masterClrMapping/>
+  </p:clrMapOvr>
+</p:sld>
+</file>
+
+<file path=ppt/slides/slide41.xml><?xml version="1.0" encoding="utf-8"?>
+<p:sld xmlns:a="http://schemas.openxmlformats.org/drawingml/2006/main" xmlns:r="http://schemas.openxmlformats.org/officeDocument/2006/relationships" xmlns:p="http://schemas.openxmlformats.org/presentationml/2006/main">
+  <p:cSld>
+    <p:spTree>
+      <p:nvGrpSpPr>
+        <p:cNvPr id="1" name=""/>
+        <p:cNvGrpSpPr/>
+        <p:nvPr/>
+      </p:nvGrpSpPr>
+      <p:grpSpPr>
+        <a:xfrm>
+          <a:off x="0" y="0"/>
+          <a:ext cx="0" cy="0"/>
+          <a:chOff x="0" y="0"/>
+          <a:chExt cx="0" cy="0"/>
+        </a:xfrm>
+      </p:grpSpPr>
       <p:sp>
         <p:nvSpPr>
           <p:cNvPr id="3" name="2 Marcador de contenido"/>
@@ -43356,7 +43607,7 @@
             <a:fld id="{2235B30C-86F8-49BD-820E-4721741473E2}" type="slidenum">
               <a:rPr lang="es-CO" smtClean="0"/>
               <a:pPr/>
-              <a:t>40</a:t>
+              <a:t>41</a:t>
             </a:fld>
             <a:endParaRPr lang="es-CO"/>
           </a:p>
@@ -43561,7 +43812,7 @@
 </p:sld>
 </file>
 
-<file path=ppt/slides/slide41.xml><?xml version="1.0" encoding="utf-8"?>
+<file path=ppt/slides/slide42.xml><?xml version="1.0" encoding="utf-8"?>
 <p:sld xmlns:a="http://schemas.openxmlformats.org/drawingml/2006/main" xmlns:r="http://schemas.openxmlformats.org/officeDocument/2006/relationships" xmlns:p="http://schemas.openxmlformats.org/presentationml/2006/main">
   <p:cSld>
     <p:spTree>
@@ -43677,7 +43928,7 @@
             <a:fld id="{2235B30C-86F8-49BD-820E-4721741473E2}" type="slidenum">
               <a:rPr lang="es-CO" smtClean="0"/>
               <a:pPr/>
-              <a:t>41</a:t>
+              <a:t>42</a:t>
             </a:fld>
             <a:endParaRPr lang="es-CO"/>
           </a:p>
@@ -43761,7 +44012,7 @@
 </p:sld>
 </file>
 
-<file path=ppt/slides/slide42.xml><?xml version="1.0" encoding="utf-8"?>
+<file path=ppt/slides/slide43.xml><?xml version="1.0" encoding="utf-8"?>
 <p:sld xmlns:a="http://schemas.openxmlformats.org/drawingml/2006/main" xmlns:r="http://schemas.openxmlformats.org/officeDocument/2006/relationships" xmlns:p="http://schemas.openxmlformats.org/presentationml/2006/main">
   <p:cSld>
     <p:spTree>
@@ -43819,7 +44070,7 @@
             <a:fld id="{2235B30C-86F8-49BD-820E-4721741473E2}" type="slidenum">
               <a:rPr lang="es-CO" smtClean="0"/>
               <a:pPr/>
-              <a:t>42</a:t>
+              <a:t>43</a:t>
             </a:fld>
             <a:endParaRPr lang="es-CO"/>
           </a:p>
@@ -44693,7 +44944,7 @@
 </p:sld>
 </file>
 
-<file path=ppt/slides/slide43.xml><?xml version="1.0" encoding="utf-8"?>
+<file path=ppt/slides/slide44.xml><?xml version="1.0" encoding="utf-8"?>
 <p:sld xmlns:a="http://schemas.openxmlformats.org/drawingml/2006/main" xmlns:r="http://schemas.openxmlformats.org/officeDocument/2006/relationships" xmlns:p="http://schemas.openxmlformats.org/presentationml/2006/main">
   <p:cSld>
     <p:spTree>
@@ -44771,7 +45022,7 @@
             <a:fld id="{2235B30C-86F8-49BD-820E-4721741473E2}" type="slidenum">
               <a:rPr lang="es-CO" smtClean="0"/>
               <a:pPr/>
-              <a:t>43</a:t>
+              <a:t>44</a:t>
             </a:fld>
             <a:endParaRPr lang="es-CO"/>
           </a:p>
@@ -44812,7 +45063,7 @@
 </p:sld>
 </file>
 
-<file path=ppt/slides/slide44.xml><?xml version="1.0" encoding="utf-8"?>
+<file path=ppt/slides/slide45.xml><?xml version="1.0" encoding="utf-8"?>
 <p:sld xmlns:a="http://schemas.openxmlformats.org/drawingml/2006/main" xmlns:r="http://schemas.openxmlformats.org/officeDocument/2006/relationships" xmlns:p="http://schemas.openxmlformats.org/presentationml/2006/main">
   <p:cSld>
     <p:spTree>
@@ -45014,7 +45265,7 @@
             <a:fld id="{2235B30C-86F8-49BD-820E-4721741473E2}" type="slidenum">
               <a:rPr lang="es-CO" smtClean="0"/>
               <a:pPr/>
-              <a:t>44</a:t>
+              <a:t>45</a:t>
             </a:fld>
             <a:endParaRPr lang="es-CO"/>
           </a:p>
@@ -45033,7 +45284,7 @@
 </p:sld>
 </file>
 
-<file path=ppt/slides/slide45.xml><?xml version="1.0" encoding="utf-8"?>
+<file path=ppt/slides/slide46.xml><?xml version="1.0" encoding="utf-8"?>
 <p:sld xmlns:a="http://schemas.openxmlformats.org/drawingml/2006/main" xmlns:r="http://schemas.openxmlformats.org/officeDocument/2006/relationships" xmlns:p="http://schemas.openxmlformats.org/presentationml/2006/main">
   <p:cSld>
     <p:spTree>
@@ -45110,7 +45361,7 @@
             <a:fld id="{2235B30C-86F8-49BD-820E-4721741473E2}" type="slidenum">
               <a:rPr lang="es-CO" smtClean="0"/>
               <a:pPr/>
-              <a:t>45</a:t>
+              <a:t>46</a:t>
             </a:fld>
             <a:endParaRPr lang="es-CO"/>
           </a:p>
@@ -45550,7 +45801,7 @@
 </p:sld>
 </file>
 
-<file path=ppt/slides/slide46.xml><?xml version="1.0" encoding="utf-8"?>
+<file path=ppt/slides/slide47.xml><?xml version="1.0" encoding="utf-8"?>
 <p:sld xmlns:a="http://schemas.openxmlformats.org/drawingml/2006/main" xmlns:r="http://schemas.openxmlformats.org/officeDocument/2006/relationships" xmlns:p="http://schemas.openxmlformats.org/presentationml/2006/main">
   <p:cSld>
     <p:spTree>
@@ -45633,7 +45884,7 @@
             <a:fld id="{2235B30C-86F8-49BD-820E-4721741473E2}" type="slidenum">
               <a:rPr lang="es-CO" smtClean="0"/>
               <a:pPr/>
-              <a:t>46</a:t>
+              <a:t>47</a:t>
             </a:fld>
             <a:endParaRPr lang="es-CO"/>
           </a:p>
@@ -46224,7 +46475,7 @@
 </p:sld>
 </file>
 
-<file path=ppt/slides/slide47.xml><?xml version="1.0" encoding="utf-8"?>
+<file path=ppt/slides/slide48.xml><?xml version="1.0" encoding="utf-8"?>
 <p:sld xmlns:a="http://schemas.openxmlformats.org/drawingml/2006/main" xmlns:r="http://schemas.openxmlformats.org/officeDocument/2006/relationships" xmlns:p="http://schemas.openxmlformats.org/presentationml/2006/main">
   <p:cSld>
     <p:spTree>
@@ -46437,7 +46688,7 @@
             <a:fld id="{2235B30C-86F8-49BD-820E-4721741473E2}" type="slidenum">
               <a:rPr lang="es-CO" smtClean="0"/>
               <a:pPr/>
-              <a:t>47</a:t>
+              <a:t>48</a:t>
             </a:fld>
             <a:endParaRPr lang="es-CO"/>
           </a:p>
@@ -46542,7 +46793,7 @@
 </p:sld>
 </file>
 
-<file path=ppt/slides/slide48.xml><?xml version="1.0" encoding="utf-8"?>
+<file path=ppt/slides/slide49.xml><?xml version="1.0" encoding="utf-8"?>
 <p:sld xmlns:a="http://schemas.openxmlformats.org/drawingml/2006/main" xmlns:r="http://schemas.openxmlformats.org/officeDocument/2006/relationships" xmlns:p="http://schemas.openxmlformats.org/presentationml/2006/main">
   <p:cSld>
     <p:spTree>
@@ -46600,7 +46851,7 @@
             <a:fld id="{2235B30C-86F8-49BD-820E-4721741473E2}" type="slidenum">
               <a:rPr lang="es-CO" smtClean="0"/>
               <a:pPr/>
-              <a:t>48</a:t>
+              <a:t>49</a:t>
             </a:fld>
             <a:endParaRPr lang="es-CO"/>
           </a:p>
@@ -46814,82 +47065,6 @@
 </p:sld>
 </file>
 
-<file path=ppt/slides/slide49.xml><?xml version="1.0" encoding="utf-8"?>
-<p:sld xmlns:a="http://schemas.openxmlformats.org/drawingml/2006/main" xmlns:r="http://schemas.openxmlformats.org/officeDocument/2006/relationships" xmlns:p="http://schemas.openxmlformats.org/presentationml/2006/main">
-  <p:cSld>
-    <p:spTree>
-      <p:nvGrpSpPr>
-        <p:cNvPr id="1" name=""/>
-        <p:cNvGrpSpPr/>
-        <p:nvPr/>
-      </p:nvGrpSpPr>
-      <p:grpSpPr>
-        <a:xfrm>
-          <a:off x="0" y="0"/>
-          <a:ext cx="0" cy="0"/>
-          <a:chOff x="0" y="0"/>
-          <a:chExt cx="0" cy="0"/>
-        </a:xfrm>
-      </p:grpSpPr>
-      <p:sp>
-        <p:nvSpPr>
-          <p:cNvPr id="3" name="Título 2"/>
-          <p:cNvSpPr>
-            <a:spLocks noGrp="1"/>
-          </p:cNvSpPr>
-          <p:nvPr>
-            <p:ph type="title"/>
-          </p:nvPr>
-        </p:nvSpPr>
-        <p:spPr/>
-        <p:txBody>
-          <a:bodyPr/>
-          <a:lstStyle/>
-          <a:p>
-            <a:r>
-              <a:rPr lang="es-CO" dirty="0"/>
-              <a:t>Con el editor online</a:t>
-            </a:r>
-          </a:p>
-        </p:txBody>
-      </p:sp>
-      <p:pic>
-        <p:nvPicPr>
-          <p:cNvPr id="4" name="Imagen 3"/>
-          <p:cNvPicPr>
-            <a:picLocks noChangeAspect="1"/>
-          </p:cNvPicPr>
-          <p:nvPr/>
-        </p:nvPicPr>
-        <p:blipFill>
-          <a:blip r:embed="rId2"/>
-          <a:stretch>
-            <a:fillRect/>
-          </a:stretch>
-        </p:blipFill>
-        <p:spPr>
-          <a:xfrm>
-            <a:off x="675357" y="785626"/>
-            <a:ext cx="7781925" cy="5600700"/>
-          </a:xfrm>
-          <a:prstGeom prst="rect">
-            <a:avLst/>
-          </a:prstGeom>
-        </p:spPr>
-      </p:pic>
-    </p:spTree>
-    <p:extLst>
-      <p:ext uri="{BB962C8B-B14F-4D97-AF65-F5344CB8AC3E}">
-        <p14:creationId xmlns:p14="http://schemas.microsoft.com/office/powerpoint/2010/main" val="454964358"/>
-      </p:ext>
-    </p:extLst>
-  </p:cSld>
-  <p:clrMapOvr>
-    <a:masterClrMapping/>
-  </p:clrMapOvr>
-</p:sld>
-</file>
-
 <file path=ppt/slides/slide5.xml><?xml version="1.0" encoding="utf-8"?>
 <p:sld xmlns:a="http://schemas.openxmlformats.org/drawingml/2006/main" xmlns:r="http://schemas.openxmlformats.org/officeDocument/2006/relationships" xmlns:p="http://schemas.openxmlformats.org/presentationml/2006/main">
   <p:cSld>
@@ -46997,6 +47172,82 @@
 </file>
 
 <file path=ppt/slides/slide50.xml><?xml version="1.0" encoding="utf-8"?>
+<p:sld xmlns:a="http://schemas.openxmlformats.org/drawingml/2006/main" xmlns:r="http://schemas.openxmlformats.org/officeDocument/2006/relationships" xmlns:p="http://schemas.openxmlformats.org/presentationml/2006/main">
+  <p:cSld>
+    <p:spTree>
+      <p:nvGrpSpPr>
+        <p:cNvPr id="1" name=""/>
+        <p:cNvGrpSpPr/>
+        <p:nvPr/>
+      </p:nvGrpSpPr>
+      <p:grpSpPr>
+        <a:xfrm>
+          <a:off x="0" y="0"/>
+          <a:ext cx="0" cy="0"/>
+          <a:chOff x="0" y="0"/>
+          <a:chExt cx="0" cy="0"/>
+        </a:xfrm>
+      </p:grpSpPr>
+      <p:sp>
+        <p:nvSpPr>
+          <p:cNvPr id="3" name="Título 2"/>
+          <p:cNvSpPr>
+            <a:spLocks noGrp="1"/>
+          </p:cNvSpPr>
+          <p:nvPr>
+            <p:ph type="title"/>
+          </p:nvPr>
+        </p:nvSpPr>
+        <p:spPr/>
+        <p:txBody>
+          <a:bodyPr/>
+          <a:lstStyle/>
+          <a:p>
+            <a:r>
+              <a:rPr lang="es-CO" dirty="0"/>
+              <a:t>Con el editor online</a:t>
+            </a:r>
+          </a:p>
+        </p:txBody>
+      </p:sp>
+      <p:pic>
+        <p:nvPicPr>
+          <p:cNvPr id="4" name="Imagen 3"/>
+          <p:cNvPicPr>
+            <a:picLocks noChangeAspect="1"/>
+          </p:cNvPicPr>
+          <p:nvPr/>
+        </p:nvPicPr>
+        <p:blipFill>
+          <a:blip r:embed="rId2"/>
+          <a:stretch>
+            <a:fillRect/>
+          </a:stretch>
+        </p:blipFill>
+        <p:spPr>
+          <a:xfrm>
+            <a:off x="675357" y="785626"/>
+            <a:ext cx="7781925" cy="5600700"/>
+          </a:xfrm>
+          <a:prstGeom prst="rect">
+            <a:avLst/>
+          </a:prstGeom>
+        </p:spPr>
+      </p:pic>
+    </p:spTree>
+    <p:extLst>
+      <p:ext uri="{BB962C8B-B14F-4D97-AF65-F5344CB8AC3E}">
+        <p14:creationId xmlns:p14="http://schemas.microsoft.com/office/powerpoint/2010/main" val="454964358"/>
+      </p:ext>
+    </p:extLst>
+  </p:cSld>
+  <p:clrMapOvr>
+    <a:masterClrMapping/>
+  </p:clrMapOvr>
+</p:sld>
+</file>
+
+<file path=ppt/slides/slide51.xml><?xml version="1.0" encoding="utf-8"?>
 <p:sld xmlns:a="http://schemas.openxmlformats.org/drawingml/2006/main" xmlns:r="http://schemas.openxmlformats.org/officeDocument/2006/relationships" xmlns:p="http://schemas.openxmlformats.org/presentationml/2006/main">
   <p:cSld>
     <p:spTree>

</xml_diff>